<commit_message>
all : rewrite finalized MVC DAO with reading the file into a list then displayed
</commit_message>
<xml_diff>
--- a/PresentationOlivierMOREL.pptx
+++ b/PresentationOlivierMOREL.pptx
@@ -6,8 +6,10 @@
   </p:sldMasterIdLst>
   <p:sldIdLst>
     <p:sldId id="256" r:id="rId2"/>
-    <p:sldId id="257" r:id="rId3"/>
-    <p:sldId id="258" r:id="rId4"/>
+    <p:sldId id="259" r:id="rId3"/>
+    <p:sldId id="260" r:id="rId4"/>
+    <p:sldId id="257" r:id="rId5"/>
+    <p:sldId id="258" r:id="rId6"/>
   </p:sldIdLst>
   <p:sldSz cx="12192000" cy="6858000"/>
   <p:notesSz cx="6858000" cy="9144000"/>
@@ -106,6 +108,11 @@
       </a:defRPr>
     </a:lvl9pPr>
   </p:defaultTextStyle>
+  <p:extLst>
+    <p:ext uri="{EFAFB233-063F-42B5-8137-9DF3F51BA10A}">
+      <p15:sldGuideLst xmlns:p15="http://schemas.microsoft.com/office/powerpoint/2012/main"/>
+    </p:ext>
+  </p:extLst>
 </p:presentation>
 </file>
 
@@ -256,7 +263,7 @@
           <a:p>
             <a:fld id="{D269E595-29A9-41CE-A1D7-342FE993CEF0}" type="datetimeFigureOut">
               <a:rPr lang="fr-FR" smtClean="0"/>
-              <a:t>12/07/2021</a:t>
+              <a:t>08/08/2021</a:t>
             </a:fld>
             <a:endParaRPr lang="fr-FR"/>
           </a:p>
@@ -454,7 +461,7 @@
           <a:p>
             <a:fld id="{D269E595-29A9-41CE-A1D7-342FE993CEF0}" type="datetimeFigureOut">
               <a:rPr lang="fr-FR" smtClean="0"/>
-              <a:t>12/07/2021</a:t>
+              <a:t>08/08/2021</a:t>
             </a:fld>
             <a:endParaRPr lang="fr-FR"/>
           </a:p>
@@ -662,7 +669,7 @@
           <a:p>
             <a:fld id="{D269E595-29A9-41CE-A1D7-342FE993CEF0}" type="datetimeFigureOut">
               <a:rPr lang="fr-FR" smtClean="0"/>
-              <a:t>12/07/2021</a:t>
+              <a:t>08/08/2021</a:t>
             </a:fld>
             <a:endParaRPr lang="fr-FR"/>
           </a:p>
@@ -860,7 +867,7 @@
           <a:p>
             <a:fld id="{D269E595-29A9-41CE-A1D7-342FE993CEF0}" type="datetimeFigureOut">
               <a:rPr lang="fr-FR" smtClean="0"/>
-              <a:t>12/07/2021</a:t>
+              <a:t>08/08/2021</a:t>
             </a:fld>
             <a:endParaRPr lang="fr-FR"/>
           </a:p>
@@ -1135,7 +1142,7 @@
           <a:p>
             <a:fld id="{D269E595-29A9-41CE-A1D7-342FE993CEF0}" type="datetimeFigureOut">
               <a:rPr lang="fr-FR" smtClean="0"/>
-              <a:t>12/07/2021</a:t>
+              <a:t>08/08/2021</a:t>
             </a:fld>
             <a:endParaRPr lang="fr-FR"/>
           </a:p>
@@ -1400,7 +1407,7 @@
           <a:p>
             <a:fld id="{D269E595-29A9-41CE-A1D7-342FE993CEF0}" type="datetimeFigureOut">
               <a:rPr lang="fr-FR" smtClean="0"/>
-              <a:t>12/07/2021</a:t>
+              <a:t>08/08/2021</a:t>
             </a:fld>
             <a:endParaRPr lang="fr-FR"/>
           </a:p>
@@ -1812,7 +1819,7 @@
           <a:p>
             <a:fld id="{D269E595-29A9-41CE-A1D7-342FE993CEF0}" type="datetimeFigureOut">
               <a:rPr lang="fr-FR" smtClean="0"/>
-              <a:t>12/07/2021</a:t>
+              <a:t>08/08/2021</a:t>
             </a:fld>
             <a:endParaRPr lang="fr-FR"/>
           </a:p>
@@ -1953,7 +1960,7 @@
           <a:p>
             <a:fld id="{D269E595-29A9-41CE-A1D7-342FE993CEF0}" type="datetimeFigureOut">
               <a:rPr lang="fr-FR" smtClean="0"/>
-              <a:t>12/07/2021</a:t>
+              <a:t>08/08/2021</a:t>
             </a:fld>
             <a:endParaRPr lang="fr-FR"/>
           </a:p>
@@ -2066,7 +2073,7 @@
           <a:p>
             <a:fld id="{D269E595-29A9-41CE-A1D7-342FE993CEF0}" type="datetimeFigureOut">
               <a:rPr lang="fr-FR" smtClean="0"/>
-              <a:t>12/07/2021</a:t>
+              <a:t>08/08/2021</a:t>
             </a:fld>
             <a:endParaRPr lang="fr-FR"/>
           </a:p>
@@ -2377,7 +2384,7 @@
           <a:p>
             <a:fld id="{D269E595-29A9-41CE-A1D7-342FE993CEF0}" type="datetimeFigureOut">
               <a:rPr lang="fr-FR" smtClean="0"/>
-              <a:t>12/07/2021</a:t>
+              <a:t>08/08/2021</a:t>
             </a:fld>
             <a:endParaRPr lang="fr-FR"/>
           </a:p>
@@ -2665,7 +2672,7 @@
           <a:p>
             <a:fld id="{D269E595-29A9-41CE-A1D7-342FE993CEF0}" type="datetimeFigureOut">
               <a:rPr lang="fr-FR" smtClean="0"/>
-              <a:t>12/07/2021</a:t>
+              <a:t>08/08/2021</a:t>
             </a:fld>
             <a:endParaRPr lang="fr-FR"/>
           </a:p>
@@ -2906,7 +2913,7 @@
           <a:p>
             <a:fld id="{D269E595-29A9-41CE-A1D7-342FE993CEF0}" type="datetimeFigureOut">
               <a:rPr lang="fr-FR" smtClean="0"/>
-              <a:t>12/07/2021</a:t>
+              <a:t>08/08/2021</a:t>
             </a:fld>
             <a:endParaRPr lang="fr-FR"/>
           </a:p>
@@ -3417,6 +3424,487 @@
           <a:chExt cx="0" cy="0"/>
         </a:xfrm>
       </p:grpSpPr>
+      <p:pic>
+        <p:nvPicPr>
+          <p:cNvPr id="8" name="Image 7">
+            <a:extLst>
+              <a:ext uri="{FF2B5EF4-FFF2-40B4-BE49-F238E27FC236}">
+                <a16:creationId xmlns:a16="http://schemas.microsoft.com/office/drawing/2014/main" id="{58F9C281-1414-4CE0-B21D-4E7F33C8D6AE}"/>
+              </a:ext>
+            </a:extLst>
+          </p:cNvPr>
+          <p:cNvPicPr>
+            <a:picLocks noChangeAspect="1"/>
+          </p:cNvPicPr>
+          <p:nvPr/>
+        </p:nvPicPr>
+        <p:blipFill>
+          <a:blip r:embed="rId2"/>
+          <a:stretch>
+            <a:fillRect/>
+          </a:stretch>
+        </p:blipFill>
+        <p:spPr>
+          <a:xfrm>
+            <a:off x="301752" y="235542"/>
+            <a:ext cx="4943665" cy="1060619"/>
+          </a:xfrm>
+          <a:prstGeom prst="rect">
+            <a:avLst/>
+          </a:prstGeom>
+        </p:spPr>
+      </p:pic>
+      <p:cxnSp>
+        <p:nvCxnSpPr>
+          <p:cNvPr id="12" name="Connecteur droit 11">
+            <a:extLst>
+              <a:ext uri="{FF2B5EF4-FFF2-40B4-BE49-F238E27FC236}">
+                <a16:creationId xmlns:a16="http://schemas.microsoft.com/office/drawing/2014/main" id="{9B856A67-47DB-4414-8999-07476E606336}"/>
+              </a:ext>
+            </a:extLst>
+          </p:cNvPr>
+          <p:cNvCxnSpPr>
+            <a:cxnSpLocks/>
+          </p:cNvCxnSpPr>
+          <p:nvPr/>
+        </p:nvCxnSpPr>
+        <p:spPr>
+          <a:xfrm>
+            <a:off x="6022036" y="137160"/>
+            <a:ext cx="0" cy="6574536"/>
+          </a:xfrm>
+          <a:prstGeom prst="line">
+            <a:avLst/>
+          </a:prstGeom>
+        </p:spPr>
+        <p:style>
+          <a:lnRef idx="1">
+            <a:schemeClr val="dk1"/>
+          </a:lnRef>
+          <a:fillRef idx="0">
+            <a:schemeClr val="dk1"/>
+          </a:fillRef>
+          <a:effectRef idx="0">
+            <a:schemeClr val="dk1"/>
+          </a:effectRef>
+          <a:fontRef idx="minor">
+            <a:schemeClr val="tx1"/>
+          </a:fontRef>
+        </p:style>
+      </p:cxnSp>
+      <p:sp>
+        <p:nvSpPr>
+          <p:cNvPr id="13" name="ZoneTexte 12">
+            <a:extLst>
+              <a:ext uri="{FF2B5EF4-FFF2-40B4-BE49-F238E27FC236}">
+                <a16:creationId xmlns:a16="http://schemas.microsoft.com/office/drawing/2014/main" id="{1678D4F0-D956-4ADF-92B1-0E8E4D15E265}"/>
+              </a:ext>
+            </a:extLst>
+          </p:cNvPr>
+          <p:cNvSpPr txBox="1"/>
+          <p:nvPr/>
+        </p:nvSpPr>
+        <p:spPr>
+          <a:xfrm>
+            <a:off x="301752" y="1600200"/>
+            <a:ext cx="5632704" cy="1877437"/>
+          </a:xfrm>
+          <a:prstGeom prst="rect">
+            <a:avLst/>
+          </a:prstGeom>
+          <a:noFill/>
+        </p:spPr>
+        <p:txBody>
+          <a:bodyPr wrap="square" rtlCol="0">
+            <a:spAutoFit/>
+          </a:bodyPr>
+          <a:lstStyle/>
+          <a:p>
+            <a:r>
+              <a:rPr lang="fr-FR" dirty="0" err="1"/>
+              <a:t>GitBash</a:t>
+            </a:r>
+            <a:r>
+              <a:rPr lang="fr-FR" dirty="0"/>
+              <a:t> (</a:t>
+            </a:r>
+            <a:r>
+              <a:rPr lang="fr-FR" dirty="0" err="1"/>
+              <a:t>BashShell</a:t>
+            </a:r>
+            <a:r>
+              <a:rPr lang="fr-FR" dirty="0"/>
+              <a:t>) :</a:t>
+            </a:r>
+          </a:p>
+          <a:p>
+            <a:r>
+              <a:rPr lang="fr-FR" sz="1400" dirty="0"/>
+              <a:t>$ </a:t>
+            </a:r>
+            <a:r>
+              <a:rPr lang="fr-FR" sz="1400" dirty="0" err="1"/>
+              <a:t>mkdir</a:t>
+            </a:r>
+            <a:r>
+              <a:rPr lang="fr-FR" sz="1400" dirty="0"/>
+              <a:t> </a:t>
+            </a:r>
+            <a:r>
+              <a:rPr lang="en-US" sz="1400" dirty="0"/>
+              <a:t>Project_DA_Java_EN_Come_to_the_Rescue_of_a_Java_Application/</a:t>
+            </a:r>
+          </a:p>
+          <a:p>
+            <a:r>
+              <a:rPr lang="en-US" sz="1400" dirty="0"/>
+              <a:t>$ git init</a:t>
+            </a:r>
+          </a:p>
+          <a:p>
+            <a:r>
+              <a:rPr lang="en-US" sz="1400" dirty="0"/>
+              <a:t>$ git remote add origin </a:t>
+            </a:r>
+            <a:r>
+              <a:rPr lang="en-US" sz="1400" dirty="0">
+                <a:hlinkClick r:id="rId3"/>
+              </a:rPr>
+              <a:t>https://github.com/emmo78/Project_DA_Java_EN_Come_to_the_Rescue_of_a_Java_Application.git</a:t>
+            </a:r>
+            <a:endParaRPr lang="en-US" sz="1400" dirty="0"/>
+          </a:p>
+          <a:p>
+            <a:r>
+              <a:rPr lang="en-US" sz="1400" dirty="0"/>
+              <a:t>$ git pull origin master</a:t>
+            </a:r>
+          </a:p>
+        </p:txBody>
+      </p:sp>
+      <p:pic>
+        <p:nvPicPr>
+          <p:cNvPr id="17" name="Image 16">
+            <a:extLst>
+              <a:ext uri="{FF2B5EF4-FFF2-40B4-BE49-F238E27FC236}">
+                <a16:creationId xmlns:a16="http://schemas.microsoft.com/office/drawing/2014/main" id="{7037F388-629B-4A02-BC7D-8CD2F03BECD8}"/>
+              </a:ext>
+            </a:extLst>
+          </p:cNvPr>
+          <p:cNvPicPr>
+            <a:picLocks noChangeAspect="1"/>
+          </p:cNvPicPr>
+          <p:nvPr/>
+        </p:nvPicPr>
+        <p:blipFill>
+          <a:blip r:embed="rId4"/>
+          <a:stretch>
+            <a:fillRect/>
+          </a:stretch>
+        </p:blipFill>
+        <p:spPr>
+          <a:xfrm>
+            <a:off x="245262" y="3595808"/>
+            <a:ext cx="5776774" cy="3262192"/>
+          </a:xfrm>
+          <a:prstGeom prst="rect">
+            <a:avLst/>
+          </a:prstGeom>
+        </p:spPr>
+      </p:pic>
+      <p:sp>
+        <p:nvSpPr>
+          <p:cNvPr id="22" name="ZoneTexte 21">
+            <a:extLst>
+              <a:ext uri="{FF2B5EF4-FFF2-40B4-BE49-F238E27FC236}">
+                <a16:creationId xmlns:a16="http://schemas.microsoft.com/office/drawing/2014/main" id="{5B2F21D7-7BA9-4FFD-8CA3-6B40B31D4A84}"/>
+              </a:ext>
+            </a:extLst>
+          </p:cNvPr>
+          <p:cNvSpPr txBox="1"/>
+          <p:nvPr/>
+        </p:nvSpPr>
+        <p:spPr>
+          <a:xfrm>
+            <a:off x="6077712" y="137160"/>
+            <a:ext cx="5869021" cy="5262979"/>
+          </a:xfrm>
+          <a:prstGeom prst="rect">
+            <a:avLst/>
+          </a:prstGeom>
+          <a:noFill/>
+        </p:spPr>
+        <p:txBody>
+          <a:bodyPr wrap="square" rtlCol="0">
+            <a:spAutoFit/>
+          </a:bodyPr>
+          <a:lstStyle/>
+          <a:p>
+            <a:r>
+              <a:rPr lang="fr-FR" sz="1400" dirty="0"/>
+              <a:t>$ git flow init</a:t>
+            </a:r>
+          </a:p>
+          <a:p>
+            <a:endParaRPr lang="fr-FR" sz="1400" dirty="0"/>
+          </a:p>
+          <a:p>
+            <a:r>
+              <a:rPr lang="fr-FR" sz="1400" dirty="0"/>
+              <a:t>Which branch should be used for bringing forth production releases?</a:t>
+            </a:r>
+          </a:p>
+          <a:p>
+            <a:r>
+              <a:rPr lang="fr-FR" sz="1400" dirty="0"/>
+              <a:t>   - master</a:t>
+            </a:r>
+          </a:p>
+          <a:p>
+            <a:r>
+              <a:rPr lang="fr-FR" sz="1400" dirty="0"/>
+              <a:t>Branch name for production releases: [master]</a:t>
+            </a:r>
+          </a:p>
+          <a:p>
+            <a:r>
+              <a:rPr lang="fr-FR" sz="1400" dirty="0"/>
+              <a:t>Branch name for "next release" development: [develop]</a:t>
+            </a:r>
+          </a:p>
+          <a:p>
+            <a:endParaRPr lang="fr-FR" sz="1400" dirty="0"/>
+          </a:p>
+          <a:p>
+            <a:r>
+              <a:rPr lang="fr-FR" sz="1400" dirty="0"/>
+              <a:t>How to name your supporting branch prefixes?</a:t>
+            </a:r>
+          </a:p>
+          <a:p>
+            <a:r>
+              <a:rPr lang="fr-FR" sz="1400" dirty="0"/>
+              <a:t>Feature branches? [feature/]</a:t>
+            </a:r>
+          </a:p>
+          <a:p>
+            <a:r>
+              <a:rPr lang="fr-FR" sz="1400" dirty="0"/>
+              <a:t>Bugfix branches? [bugfix/]</a:t>
+            </a:r>
+          </a:p>
+          <a:p>
+            <a:r>
+              <a:rPr lang="fr-FR" sz="1400" dirty="0"/>
+              <a:t>Release branches? [release/]</a:t>
+            </a:r>
+          </a:p>
+          <a:p>
+            <a:r>
+              <a:rPr lang="fr-FR" sz="1400" dirty="0"/>
+              <a:t>Hotfix branches? [hotfix/]</a:t>
+            </a:r>
+          </a:p>
+          <a:p>
+            <a:r>
+              <a:rPr lang="fr-FR" sz="1400" dirty="0"/>
+              <a:t>Support branches? [support/]</a:t>
+            </a:r>
+          </a:p>
+          <a:p>
+            <a:r>
+              <a:rPr lang="fr-FR" sz="1400" dirty="0"/>
+              <a:t>Version tag prefix? []</a:t>
+            </a:r>
+          </a:p>
+          <a:p>
+            <a:r>
+              <a:rPr lang="fr-FR" sz="1400" dirty="0"/>
+              <a:t>Hooks and filters directory? [E:/A_Yussuf/A_Home/A_En_Cours/OpenClassrooms_CDJ2E_20220422_20210608/Projet_2/</a:t>
+            </a:r>
+            <a:r>
+              <a:rPr lang="en-US" sz="1400" dirty="0"/>
+              <a:t>Project_DA_Java_EN_Come_to_the_Rescue_of_a_Java_Application</a:t>
+            </a:r>
+            <a:r>
+              <a:rPr lang="fr-FR" sz="1400" dirty="0"/>
+              <a:t>/.git/</a:t>
+            </a:r>
+            <a:r>
+              <a:rPr lang="fr-FR" sz="1400" dirty="0" err="1"/>
+              <a:t>hooks</a:t>
+            </a:r>
+            <a:r>
+              <a:rPr lang="fr-FR" sz="1400" dirty="0"/>
+              <a:t>]</a:t>
+            </a:r>
+          </a:p>
+          <a:p>
+            <a:endParaRPr lang="fr-FR" sz="1400" dirty="0"/>
+          </a:p>
+          <a:p>
+            <a:r>
+              <a:rPr lang="fr-FR" sz="1400" dirty="0"/>
+              <a:t>$  git push -u origin develop</a:t>
+            </a:r>
+          </a:p>
+          <a:p>
+            <a:r>
+              <a:rPr lang="fr-FR" sz="1400" dirty="0"/>
+              <a:t>$ git flow feature start readDataFile</a:t>
+            </a:r>
+          </a:p>
+          <a:p>
+            <a:r>
+              <a:rPr lang="fr-FR" sz="1400" dirty="0"/>
+              <a:t>$ </a:t>
+            </a:r>
+            <a:r>
+              <a:rPr lang="en-US" sz="1400" dirty="0"/>
+              <a:t>git flow feature publish readDataFile</a:t>
+            </a:r>
+            <a:r>
+              <a:rPr lang="fr-FR" sz="1400" dirty="0"/>
+              <a:t> </a:t>
+            </a:r>
+          </a:p>
+          <a:p>
+            <a:endParaRPr lang="fr-FR" sz="1400" dirty="0"/>
+          </a:p>
+          <a:p>
+            <a:r>
+              <a:rPr lang="fr-FR" sz="1400" dirty="0"/>
+              <a:t>Eclipse : Import Projects from Git → Existing local repository → add …</a:t>
+            </a:r>
+          </a:p>
+        </p:txBody>
+      </p:sp>
+    </p:spTree>
+    <p:extLst>
+      <p:ext uri="{BB962C8B-B14F-4D97-AF65-F5344CB8AC3E}">
+        <p14:creationId xmlns:p14="http://schemas.microsoft.com/office/powerpoint/2010/main" val="35758763"/>
+      </p:ext>
+    </p:extLst>
+  </p:cSld>
+  <p:clrMapOvr>
+    <a:masterClrMapping/>
+  </p:clrMapOvr>
+</p:sld>
+</file>
+
+<file path=ppt/slides/slide3.xml><?xml version="1.0" encoding="utf-8"?>
+<p:sld xmlns:a="http://schemas.openxmlformats.org/drawingml/2006/main" xmlns:r="http://schemas.openxmlformats.org/officeDocument/2006/relationships" xmlns:p="http://schemas.openxmlformats.org/presentationml/2006/main">
+  <p:cSld>
+    <p:spTree>
+      <p:nvGrpSpPr>
+        <p:cNvPr id="1" name=""/>
+        <p:cNvGrpSpPr/>
+        <p:nvPr/>
+      </p:nvGrpSpPr>
+      <p:grpSpPr>
+        <a:xfrm>
+          <a:off x="0" y="0"/>
+          <a:ext cx="0" cy="0"/>
+          <a:chOff x="0" y="0"/>
+          <a:chExt cx="0" cy="0"/>
+        </a:xfrm>
+      </p:grpSpPr>
+      <p:pic>
+        <p:nvPicPr>
+          <p:cNvPr id="3" name="Image 2">
+            <a:extLst>
+              <a:ext uri="{FF2B5EF4-FFF2-40B4-BE49-F238E27FC236}">
+                <a16:creationId xmlns:a16="http://schemas.microsoft.com/office/drawing/2014/main" id="{698F6424-BEF5-43C7-A98C-99379376170E}"/>
+              </a:ext>
+            </a:extLst>
+          </p:cNvPr>
+          <p:cNvPicPr>
+            <a:picLocks noChangeAspect="1"/>
+          </p:cNvPicPr>
+          <p:nvPr/>
+        </p:nvPicPr>
+        <p:blipFill>
+          <a:blip r:embed="rId2">
+            <a:extLst>
+              <a:ext uri="{28A0092B-C50C-407E-A947-70E740481C1C}">
+                <a14:useLocalDpi xmlns:a14="http://schemas.microsoft.com/office/drawing/2010/main" val="0"/>
+              </a:ext>
+            </a:extLst>
+          </a:blip>
+          <a:stretch>
+            <a:fillRect/>
+          </a:stretch>
+        </p:blipFill>
+        <p:spPr>
+          <a:xfrm>
+            <a:off x="0" y="0"/>
+            <a:ext cx="5123809" cy="6657143"/>
+          </a:xfrm>
+          <a:prstGeom prst="rect">
+            <a:avLst/>
+          </a:prstGeom>
+        </p:spPr>
+      </p:pic>
+      <p:pic>
+        <p:nvPicPr>
+          <p:cNvPr id="5" name="Image 4">
+            <a:extLst>
+              <a:ext uri="{FF2B5EF4-FFF2-40B4-BE49-F238E27FC236}">
+                <a16:creationId xmlns:a16="http://schemas.microsoft.com/office/drawing/2014/main" id="{611D7F73-2D64-4D57-8FDA-9164D88570DA}"/>
+              </a:ext>
+            </a:extLst>
+          </p:cNvPr>
+          <p:cNvPicPr>
+            <a:picLocks noChangeAspect="1"/>
+          </p:cNvPicPr>
+          <p:nvPr/>
+        </p:nvPicPr>
+        <p:blipFill>
+          <a:blip r:embed="rId3"/>
+          <a:stretch>
+            <a:fillRect/>
+          </a:stretch>
+        </p:blipFill>
+        <p:spPr>
+          <a:xfrm>
+            <a:off x="6379001" y="2485491"/>
+            <a:ext cx="3896269" cy="1686160"/>
+          </a:xfrm>
+          <a:prstGeom prst="rect">
+            <a:avLst/>
+          </a:prstGeom>
+        </p:spPr>
+      </p:pic>
+    </p:spTree>
+    <p:extLst>
+      <p:ext uri="{BB962C8B-B14F-4D97-AF65-F5344CB8AC3E}">
+        <p14:creationId xmlns:p14="http://schemas.microsoft.com/office/powerpoint/2010/main" val="537034982"/>
+      </p:ext>
+    </p:extLst>
+  </p:cSld>
+  <p:clrMapOvr>
+    <a:masterClrMapping/>
+  </p:clrMapOvr>
+</p:sld>
+</file>
+
+<file path=ppt/slides/slide4.xml><?xml version="1.0" encoding="utf-8"?>
+<p:sld xmlns:a="http://schemas.openxmlformats.org/drawingml/2006/main" xmlns:r="http://schemas.openxmlformats.org/officeDocument/2006/relationships" xmlns:p="http://schemas.openxmlformats.org/presentationml/2006/main">
+  <p:cSld>
+    <p:spTree>
+      <p:nvGrpSpPr>
+        <p:cNvPr id="1" name=""/>
+        <p:cNvGrpSpPr/>
+        <p:nvPr/>
+      </p:nvGrpSpPr>
+      <p:grpSpPr>
+        <a:xfrm>
+          <a:off x="0" y="0"/>
+          <a:ext cx="0" cy="0"/>
+          <a:chOff x="0" y="0"/>
+          <a:chExt cx="0" cy="0"/>
+        </a:xfrm>
+      </p:grpSpPr>
       <p:sp>
         <p:nvSpPr>
           <p:cNvPr id="3" name="ZoneTexte 2">
@@ -4015,7 +4503,7 @@
 </p:sld>
 </file>
 
-<file path=ppt/slides/slide3.xml><?xml version="1.0" encoding="utf-8"?>
+<file path=ppt/slides/slide5.xml><?xml version="1.0" encoding="utf-8"?>
 <p:sld xmlns:a="http://schemas.openxmlformats.org/drawingml/2006/main" xmlns:r="http://schemas.openxmlformats.org/officeDocument/2006/relationships" xmlns:p="http://schemas.openxmlformats.org/presentationml/2006/main">
   <p:cSld>
     <p:spTree>
@@ -4046,8 +4534,8 @@
         </p:nvSpPr>
         <p:spPr>
           <a:xfrm>
-            <a:off x="384048" y="374904"/>
-            <a:ext cx="11247120" cy="584775"/>
+            <a:off x="472440" y="374904"/>
+            <a:ext cx="11247120" cy="1015663"/>
           </a:xfrm>
           <a:prstGeom prst="rect">
             <a:avLst/>
@@ -4063,7 +4551,146 @@
             <a:pPr algn="ctr"/>
             <a:r>
               <a:rPr lang="fr-FR" sz="3200" dirty="0"/>
-              <a:t>Organisation Modèle, Vue, Contrôleur</a:t>
+              <a:t>1</a:t>
+            </a:r>
+            <a:r>
+              <a:rPr lang="fr-FR" sz="3200" baseline="30000" dirty="0"/>
+              <a:t>ère</a:t>
+            </a:r>
+            <a:r>
+              <a:rPr lang="fr-FR" sz="3200" dirty="0"/>
+              <a:t> itération : lire le fichier</a:t>
+            </a:r>
+          </a:p>
+          <a:p>
+            <a:endParaRPr lang="fr-FR" sz="1400" dirty="0"/>
+          </a:p>
+          <a:p>
+            <a:r>
+              <a:rPr lang="fr-FR" sz="1400" dirty="0"/>
+              <a:t>Tout d’abord organisation en modèle, vue, </a:t>
+            </a:r>
+            <a:r>
+              <a:rPr lang="fr-FR" sz="1400" dirty="0" err="1"/>
+              <a:t>controleur</a:t>
+            </a:r>
+            <a:endParaRPr lang="fr-FR" sz="1400" dirty="0"/>
+          </a:p>
+        </p:txBody>
+      </p:sp>
+      <p:pic>
+        <p:nvPicPr>
+          <p:cNvPr id="4" name="Image 3">
+            <a:extLst>
+              <a:ext uri="{FF2B5EF4-FFF2-40B4-BE49-F238E27FC236}">
+                <a16:creationId xmlns:a16="http://schemas.microsoft.com/office/drawing/2014/main" id="{ADDBEE4C-B2AB-4A26-8320-3FED74D890EB}"/>
+              </a:ext>
+            </a:extLst>
+          </p:cNvPr>
+          <p:cNvPicPr>
+            <a:picLocks noChangeAspect="1"/>
+          </p:cNvPicPr>
+          <p:nvPr/>
+        </p:nvPicPr>
+        <p:blipFill>
+          <a:blip r:embed="rId2"/>
+          <a:stretch>
+            <a:fillRect/>
+          </a:stretch>
+        </p:blipFill>
+        <p:spPr>
+          <a:xfrm>
+            <a:off x="264409" y="1604707"/>
+            <a:ext cx="4549958" cy="4878389"/>
+          </a:xfrm>
+          <a:prstGeom prst="rect">
+            <a:avLst/>
+          </a:prstGeom>
+        </p:spPr>
+      </p:pic>
+      <p:cxnSp>
+        <p:nvCxnSpPr>
+          <p:cNvPr id="6" name="Connecteur droit 5">
+            <a:extLst>
+              <a:ext uri="{FF2B5EF4-FFF2-40B4-BE49-F238E27FC236}">
+                <a16:creationId xmlns:a16="http://schemas.microsoft.com/office/drawing/2014/main" id="{250CF61C-DC26-49C5-ADD8-56CAE46F5A6F}"/>
+              </a:ext>
+            </a:extLst>
+          </p:cNvPr>
+          <p:cNvCxnSpPr>
+            <a:cxnSpLocks/>
+          </p:cNvCxnSpPr>
+          <p:nvPr/>
+        </p:nvCxnSpPr>
+        <p:spPr>
+          <a:xfrm>
+            <a:off x="4931366" y="994034"/>
+            <a:ext cx="0" cy="5760000"/>
+          </a:xfrm>
+          <a:prstGeom prst="line">
+            <a:avLst/>
+          </a:prstGeom>
+        </p:spPr>
+        <p:style>
+          <a:lnRef idx="1">
+            <a:schemeClr val="dk1"/>
+          </a:lnRef>
+          <a:fillRef idx="0">
+            <a:schemeClr val="dk1"/>
+          </a:fillRef>
+          <a:effectRef idx="0">
+            <a:schemeClr val="dk1"/>
+          </a:effectRef>
+          <a:fontRef idx="minor">
+            <a:schemeClr val="tx1"/>
+          </a:fontRef>
+        </p:style>
+      </p:cxnSp>
+      <p:sp>
+        <p:nvSpPr>
+          <p:cNvPr id="7" name="ZoneTexte 6">
+            <a:extLst>
+              <a:ext uri="{FF2B5EF4-FFF2-40B4-BE49-F238E27FC236}">
+                <a16:creationId xmlns:a16="http://schemas.microsoft.com/office/drawing/2014/main" id="{16E2AC71-5EAB-4CA4-8E0B-D18CBC4309EF}"/>
+              </a:ext>
+            </a:extLst>
+          </p:cNvPr>
+          <p:cNvSpPr txBox="1"/>
+          <p:nvPr/>
+        </p:nvSpPr>
+        <p:spPr>
+          <a:xfrm>
+            <a:off x="5210979" y="1021235"/>
+            <a:ext cx="6491008" cy="646331"/>
+          </a:xfrm>
+          <a:prstGeom prst="rect">
+            <a:avLst/>
+          </a:prstGeom>
+          <a:noFill/>
+        </p:spPr>
+        <p:txBody>
+          <a:bodyPr wrap="none" rtlCol="0">
+            <a:spAutoFit/>
+          </a:bodyPr>
+          <a:lstStyle/>
+          <a:p>
+            <a:r>
+              <a:rPr lang="fr-FR" dirty="0"/>
+              <a:t>Aucune logique dans le main (</a:t>
+            </a:r>
+            <a:r>
+              <a:rPr lang="fr-FR" dirty="0" err="1"/>
+              <a:t>AnalyticsCounter</a:t>
+            </a:r>
+            <a:r>
+              <a:rPr lang="fr-FR" dirty="0"/>
+              <a:t>),</a:t>
+            </a:r>
+          </a:p>
+          <a:p>
+            <a:r>
+              <a:rPr lang="fr-FR" dirty="0"/>
+              <a:t>le contrôleur est un singleton qui contiendra la logique de contrôle.</a:t>
             </a:r>
           </a:p>
         </p:txBody>

</xml_diff>

<commit_message>
new : sort list and collet ii into a set with occurence's frequence
</commit_message>
<xml_diff>
--- a/PresentationOlivierMOREL.pptx
+++ b/PresentationOlivierMOREL.pptx
@@ -10,6 +10,7 @@
     <p:sldId id="260" r:id="rId4"/>
     <p:sldId id="257" r:id="rId5"/>
     <p:sldId id="258" r:id="rId6"/>
+    <p:sldId id="261" r:id="rId7"/>
   </p:sldIdLst>
   <p:sldSz cx="12192000" cy="6858000"/>
   <p:notesSz cx="6858000" cy="9144000"/>
@@ -263,7 +264,7 @@
           <a:p>
             <a:fld id="{D269E595-29A9-41CE-A1D7-342FE993CEF0}" type="datetimeFigureOut">
               <a:rPr lang="fr-FR" smtClean="0"/>
-              <a:t>08/08/2021</a:t>
+              <a:t>09/08/2021</a:t>
             </a:fld>
             <a:endParaRPr lang="fr-FR"/>
           </a:p>
@@ -461,7 +462,7 @@
           <a:p>
             <a:fld id="{D269E595-29A9-41CE-A1D7-342FE993CEF0}" type="datetimeFigureOut">
               <a:rPr lang="fr-FR" smtClean="0"/>
-              <a:t>08/08/2021</a:t>
+              <a:t>09/08/2021</a:t>
             </a:fld>
             <a:endParaRPr lang="fr-FR"/>
           </a:p>
@@ -669,7 +670,7 @@
           <a:p>
             <a:fld id="{D269E595-29A9-41CE-A1D7-342FE993CEF0}" type="datetimeFigureOut">
               <a:rPr lang="fr-FR" smtClean="0"/>
-              <a:t>08/08/2021</a:t>
+              <a:t>09/08/2021</a:t>
             </a:fld>
             <a:endParaRPr lang="fr-FR"/>
           </a:p>
@@ -867,7 +868,7 @@
           <a:p>
             <a:fld id="{D269E595-29A9-41CE-A1D7-342FE993CEF0}" type="datetimeFigureOut">
               <a:rPr lang="fr-FR" smtClean="0"/>
-              <a:t>08/08/2021</a:t>
+              <a:t>09/08/2021</a:t>
             </a:fld>
             <a:endParaRPr lang="fr-FR"/>
           </a:p>
@@ -1142,7 +1143,7 @@
           <a:p>
             <a:fld id="{D269E595-29A9-41CE-A1D7-342FE993CEF0}" type="datetimeFigureOut">
               <a:rPr lang="fr-FR" smtClean="0"/>
-              <a:t>08/08/2021</a:t>
+              <a:t>09/08/2021</a:t>
             </a:fld>
             <a:endParaRPr lang="fr-FR"/>
           </a:p>
@@ -1407,7 +1408,7 @@
           <a:p>
             <a:fld id="{D269E595-29A9-41CE-A1D7-342FE993CEF0}" type="datetimeFigureOut">
               <a:rPr lang="fr-FR" smtClean="0"/>
-              <a:t>08/08/2021</a:t>
+              <a:t>09/08/2021</a:t>
             </a:fld>
             <a:endParaRPr lang="fr-FR"/>
           </a:p>
@@ -1819,7 +1820,7 @@
           <a:p>
             <a:fld id="{D269E595-29A9-41CE-A1D7-342FE993CEF0}" type="datetimeFigureOut">
               <a:rPr lang="fr-FR" smtClean="0"/>
-              <a:t>08/08/2021</a:t>
+              <a:t>09/08/2021</a:t>
             </a:fld>
             <a:endParaRPr lang="fr-FR"/>
           </a:p>
@@ -1960,7 +1961,7 @@
           <a:p>
             <a:fld id="{D269E595-29A9-41CE-A1D7-342FE993CEF0}" type="datetimeFigureOut">
               <a:rPr lang="fr-FR" smtClean="0"/>
-              <a:t>08/08/2021</a:t>
+              <a:t>09/08/2021</a:t>
             </a:fld>
             <a:endParaRPr lang="fr-FR"/>
           </a:p>
@@ -2073,7 +2074,7 @@
           <a:p>
             <a:fld id="{D269E595-29A9-41CE-A1D7-342FE993CEF0}" type="datetimeFigureOut">
               <a:rPr lang="fr-FR" smtClean="0"/>
-              <a:t>08/08/2021</a:t>
+              <a:t>09/08/2021</a:t>
             </a:fld>
             <a:endParaRPr lang="fr-FR"/>
           </a:p>
@@ -2384,7 +2385,7 @@
           <a:p>
             <a:fld id="{D269E595-29A9-41CE-A1D7-342FE993CEF0}" type="datetimeFigureOut">
               <a:rPr lang="fr-FR" smtClean="0"/>
-              <a:t>08/08/2021</a:t>
+              <a:t>09/08/2021</a:t>
             </a:fld>
             <a:endParaRPr lang="fr-FR"/>
           </a:p>
@@ -2672,7 +2673,7 @@
           <a:p>
             <a:fld id="{D269E595-29A9-41CE-A1D7-342FE993CEF0}" type="datetimeFigureOut">
               <a:rPr lang="fr-FR" smtClean="0"/>
-              <a:t>08/08/2021</a:t>
+              <a:t>09/08/2021</a:t>
             </a:fld>
             <a:endParaRPr lang="fr-FR"/>
           </a:p>
@@ -2913,7 +2914,7 @@
           <a:p>
             <a:fld id="{D269E595-29A9-41CE-A1D7-342FE993CEF0}" type="datetimeFigureOut">
               <a:rPr lang="fr-FR" smtClean="0"/>
-              <a:t>08/08/2021</a:t>
+              <a:t>09/08/2021</a:t>
             </a:fld>
             <a:endParaRPr lang="fr-FR"/>
           </a:p>
@@ -4661,7 +4662,7 @@
         <p:spPr>
           <a:xfrm>
             <a:off x="5210979" y="1021235"/>
-            <a:ext cx="6491008" cy="646331"/>
+            <a:ext cx="4793043" cy="369332"/>
           </a:xfrm>
           <a:prstGeom prst="rect">
             <a:avLst/>
@@ -4684,21 +4685,177 @@
             </a:r>
             <a:r>
               <a:rPr lang="fr-FR" dirty="0"/>
-              <a:t>),</a:t>
-            </a:r>
-          </a:p>
+              <a:t>) :</a:t>
+            </a:r>
+          </a:p>
+        </p:txBody>
+      </p:sp>
+      <p:sp>
+        <p:nvSpPr>
+          <p:cNvPr id="3" name="ZoneTexte 2">
+            <a:extLst>
+              <a:ext uri="{FF2B5EF4-FFF2-40B4-BE49-F238E27FC236}">
+                <a16:creationId xmlns:a16="http://schemas.microsoft.com/office/drawing/2014/main" id="{25737779-FF34-47F3-AA8C-963970459FE2}"/>
+              </a:ext>
+            </a:extLst>
+          </p:cNvPr>
+          <p:cNvSpPr txBox="1"/>
+          <p:nvPr/>
+        </p:nvSpPr>
+        <p:spPr>
+          <a:xfrm>
+            <a:off x="5282949" y="3415606"/>
+            <a:ext cx="6841996" cy="2308324"/>
+          </a:xfrm>
+          <a:prstGeom prst="rect">
+            <a:avLst/>
+          </a:prstGeom>
+          <a:noFill/>
+        </p:spPr>
+        <p:txBody>
+          <a:bodyPr wrap="square" rtlCol="0">
+            <a:spAutoFit/>
+          </a:bodyPr>
+          <a:lstStyle/>
           <a:p>
             <a:r>
               <a:rPr lang="fr-FR" dirty="0"/>
-              <a:t>le contrôleur est un singleton qui contiendra la logique de contrôle.</a:t>
-            </a:r>
-          </a:p>
-        </p:txBody>
-      </p:sp>
+              <a:t>Le contrôleur est un singleton qui contiendra la logique de contrôle,</a:t>
+            </a:r>
+          </a:p>
+          <a:p>
+            <a:r>
+              <a:rPr lang="fr-FR" dirty="0"/>
+              <a:t>Pour une seule instance afin d’éviter plusieurs </a:t>
+            </a:r>
+            <a:r>
+              <a:rPr lang="fr-FR" dirty="0" err="1"/>
+              <a:t>reader</a:t>
+            </a:r>
+            <a:r>
+              <a:rPr lang="fr-FR" dirty="0"/>
+              <a:t>/</a:t>
+            </a:r>
+            <a:r>
+              <a:rPr lang="fr-FR" dirty="0" err="1"/>
+              <a:t>writer</a:t>
+            </a:r>
+            <a:endParaRPr lang="fr-FR" dirty="0"/>
+          </a:p>
+          <a:p>
+            <a:r>
+              <a:rPr lang="fr-FR" dirty="0"/>
+              <a:t>sur le même fichier.</a:t>
+            </a:r>
+          </a:p>
+          <a:p>
+            <a:r>
+              <a:rPr lang="fr-FR" dirty="0"/>
+              <a:t>Documentation JDK 1.8 </a:t>
+            </a:r>
+            <a:r>
+              <a:rPr lang="fr-FR" dirty="0" err="1"/>
+              <a:t>FileWriter</a:t>
+            </a:r>
+            <a:r>
+              <a:rPr lang="fr-FR" dirty="0"/>
+              <a:t> : </a:t>
+            </a:r>
+            <a:endParaRPr lang="en-US" dirty="0"/>
+          </a:p>
+          <a:p>
+            <a:r>
+              <a:rPr lang="en-US" dirty="0"/>
+              <a:t>Some platforms, in particular, allow a file to be opened for writing by</a:t>
+            </a:r>
+          </a:p>
+          <a:p>
+            <a:r>
+              <a:rPr lang="en-US" dirty="0"/>
+              <a:t>only one </a:t>
+            </a:r>
+            <a:r>
+              <a:rPr lang="en-US" dirty="0" err="1"/>
+              <a:t>FileWriter</a:t>
+            </a:r>
+            <a:r>
+              <a:rPr lang="en-US" dirty="0"/>
+              <a:t> (or other file-writing object) at a time.</a:t>
+            </a:r>
+          </a:p>
+          <a:p>
+            <a:r>
+              <a:rPr lang="en-US" dirty="0"/>
+              <a:t>In such situations the constructors in this class will fail if the file involved is already open.</a:t>
+            </a:r>
+            <a:endParaRPr lang="fr-FR" dirty="0"/>
+          </a:p>
+        </p:txBody>
+      </p:sp>
+      <p:pic>
+        <p:nvPicPr>
+          <p:cNvPr id="8" name="Image 7">
+            <a:extLst>
+              <a:ext uri="{FF2B5EF4-FFF2-40B4-BE49-F238E27FC236}">
+                <a16:creationId xmlns:a16="http://schemas.microsoft.com/office/drawing/2014/main" id="{C3EED654-CAE4-40D5-B41F-B771DFDFA163}"/>
+              </a:ext>
+            </a:extLst>
+          </p:cNvPr>
+          <p:cNvPicPr>
+            <a:picLocks noChangeAspect="1"/>
+          </p:cNvPicPr>
+          <p:nvPr/>
+        </p:nvPicPr>
+        <p:blipFill>
+          <a:blip r:embed="rId3"/>
+          <a:stretch>
+            <a:fillRect/>
+          </a:stretch>
+        </p:blipFill>
+        <p:spPr>
+          <a:xfrm>
+            <a:off x="5282948" y="1377173"/>
+            <a:ext cx="5430008" cy="1867161"/>
+          </a:xfrm>
+          <a:prstGeom prst="rect">
+            <a:avLst/>
+          </a:prstGeom>
+        </p:spPr>
+      </p:pic>
     </p:spTree>
     <p:extLst>
       <p:ext uri="{BB962C8B-B14F-4D97-AF65-F5344CB8AC3E}">
         <p14:creationId xmlns:p14="http://schemas.microsoft.com/office/powerpoint/2010/main" val="65320426"/>
+      </p:ext>
+    </p:extLst>
+  </p:cSld>
+  <p:clrMapOvr>
+    <a:masterClrMapping/>
+  </p:clrMapOvr>
+</p:sld>
+</file>
+
+<file path=ppt/slides/slide6.xml><?xml version="1.0" encoding="utf-8"?>
+<p:sld xmlns:a="http://schemas.openxmlformats.org/drawingml/2006/main" xmlns:r="http://schemas.openxmlformats.org/officeDocument/2006/relationships" xmlns:p="http://schemas.openxmlformats.org/presentationml/2006/main">
+  <p:cSld>
+    <p:spTree>
+      <p:nvGrpSpPr>
+        <p:cNvPr id="1" name=""/>
+        <p:cNvGrpSpPr/>
+        <p:nvPr/>
+      </p:nvGrpSpPr>
+      <p:grpSpPr>
+        <a:xfrm>
+          <a:off x="0" y="0"/>
+          <a:ext cx="0" cy="0"/>
+          <a:chOff x="0" y="0"/>
+          <a:chExt cx="0" cy="0"/>
+        </a:xfrm>
+      </p:grpSpPr>
+    </p:spTree>
+    <p:extLst>
+      <p:ext uri="{BB962C8B-B14F-4D97-AF65-F5344CB8AC3E}">
+        <p14:creationId xmlns:p14="http://schemas.microsoft.com/office/powerpoint/2010/main" val="514782218"/>
       </p:ext>
     </p:extLst>
   </p:cSld>

</xml_diff>

<commit_message>
feat : feature sort and write symptoms into a file is OK with javadoc end powerpoint presentation
</commit_message>
<xml_diff>
--- a/PresentationOlivierMOREL.pptx
+++ b/PresentationOlivierMOREL.pptx
@@ -11,6 +11,12 @@
     <p:sldId id="257" r:id="rId5"/>
     <p:sldId id="258" r:id="rId6"/>
     <p:sldId id="261" r:id="rId7"/>
+    <p:sldId id="262" r:id="rId8"/>
+    <p:sldId id="263" r:id="rId9"/>
+    <p:sldId id="264" r:id="rId10"/>
+    <p:sldId id="265" r:id="rId11"/>
+    <p:sldId id="266" r:id="rId12"/>
+    <p:sldId id="267" r:id="rId13"/>
   </p:sldIdLst>
   <p:sldSz cx="12192000" cy="6858000"/>
   <p:notesSz cx="6858000" cy="9144000"/>
@@ -3408,6 +3414,413 @@
 </p:sld>
 </file>
 
+<file path=ppt/slides/slide10.xml><?xml version="1.0" encoding="utf-8"?>
+<p:sld xmlns:a="http://schemas.openxmlformats.org/drawingml/2006/main" xmlns:r="http://schemas.openxmlformats.org/officeDocument/2006/relationships" xmlns:p="http://schemas.openxmlformats.org/presentationml/2006/main">
+  <p:cSld>
+    <p:spTree>
+      <p:nvGrpSpPr>
+        <p:cNvPr id="1" name=""/>
+        <p:cNvGrpSpPr/>
+        <p:nvPr/>
+      </p:nvGrpSpPr>
+      <p:grpSpPr>
+        <a:xfrm>
+          <a:off x="0" y="0"/>
+          <a:ext cx="0" cy="0"/>
+          <a:chOff x="0" y="0"/>
+          <a:chExt cx="0" cy="0"/>
+        </a:xfrm>
+      </p:grpSpPr>
+      <p:sp>
+        <p:nvSpPr>
+          <p:cNvPr id="2" name="ZoneTexte 1">
+            <a:extLst>
+              <a:ext uri="{FF2B5EF4-FFF2-40B4-BE49-F238E27FC236}">
+                <a16:creationId xmlns:a16="http://schemas.microsoft.com/office/drawing/2014/main" id="{5318B654-42B3-43A3-A943-2FB7151BA169}"/>
+              </a:ext>
+            </a:extLst>
+          </p:cNvPr>
+          <p:cNvSpPr txBox="1"/>
+          <p:nvPr/>
+        </p:nvSpPr>
+        <p:spPr>
+          <a:xfrm>
+            <a:off x="0" y="0"/>
+            <a:ext cx="12192000" cy="369332"/>
+          </a:xfrm>
+          <a:prstGeom prst="rect">
+            <a:avLst/>
+          </a:prstGeom>
+          <a:noFill/>
+        </p:spPr>
+        <p:txBody>
+          <a:bodyPr wrap="square" rtlCol="0">
+            <a:spAutoFit/>
+          </a:bodyPr>
+          <a:lstStyle/>
+          <a:p>
+            <a:pPr algn="ctr"/>
+            <a:r>
+              <a:rPr lang="fr-FR" dirty="0"/>
+              <a:t>Code dans le contrôleur</a:t>
+            </a:r>
+          </a:p>
+        </p:txBody>
+      </p:sp>
+      <p:pic>
+        <p:nvPicPr>
+          <p:cNvPr id="4" name="Image 3">
+            <a:extLst>
+              <a:ext uri="{FF2B5EF4-FFF2-40B4-BE49-F238E27FC236}">
+                <a16:creationId xmlns:a16="http://schemas.microsoft.com/office/drawing/2014/main" id="{F83C293E-4BE1-4A35-9366-9DBE3D1D1B3F}"/>
+              </a:ext>
+            </a:extLst>
+          </p:cNvPr>
+          <p:cNvPicPr>
+            <a:picLocks noChangeAspect="1"/>
+          </p:cNvPicPr>
+          <p:nvPr/>
+        </p:nvPicPr>
+        <p:blipFill>
+          <a:blip r:embed="rId2"/>
+          <a:stretch>
+            <a:fillRect/>
+          </a:stretch>
+        </p:blipFill>
+        <p:spPr>
+          <a:xfrm>
+            <a:off x="0" y="525449"/>
+            <a:ext cx="5765180" cy="3225755"/>
+          </a:xfrm>
+          <a:prstGeom prst="rect">
+            <a:avLst/>
+          </a:prstGeom>
+        </p:spPr>
+      </p:pic>
+      <p:pic>
+        <p:nvPicPr>
+          <p:cNvPr id="6" name="Image 5">
+            <a:extLst>
+              <a:ext uri="{FF2B5EF4-FFF2-40B4-BE49-F238E27FC236}">
+                <a16:creationId xmlns:a16="http://schemas.microsoft.com/office/drawing/2014/main" id="{F89AC275-D40D-43B6-89F2-C6AC1FA5EFF9}"/>
+              </a:ext>
+            </a:extLst>
+          </p:cNvPr>
+          <p:cNvPicPr>
+            <a:picLocks noChangeAspect="1"/>
+          </p:cNvPicPr>
+          <p:nvPr/>
+        </p:nvPicPr>
+        <p:blipFill>
+          <a:blip r:embed="rId3"/>
+          <a:stretch>
+            <a:fillRect/>
+          </a:stretch>
+        </p:blipFill>
+        <p:spPr>
+          <a:xfrm>
+            <a:off x="3893944" y="3632244"/>
+            <a:ext cx="8298056" cy="3225755"/>
+          </a:xfrm>
+          <a:prstGeom prst="rect">
+            <a:avLst/>
+          </a:prstGeom>
+        </p:spPr>
+      </p:pic>
+    </p:spTree>
+    <p:extLst>
+      <p:ext uri="{BB962C8B-B14F-4D97-AF65-F5344CB8AC3E}">
+        <p14:creationId xmlns:p14="http://schemas.microsoft.com/office/powerpoint/2010/main" val="2239271569"/>
+      </p:ext>
+    </p:extLst>
+  </p:cSld>
+  <p:clrMapOvr>
+    <a:masterClrMapping/>
+  </p:clrMapOvr>
+</p:sld>
+</file>
+
+<file path=ppt/slides/slide11.xml><?xml version="1.0" encoding="utf-8"?>
+<p:sld xmlns:a="http://schemas.openxmlformats.org/drawingml/2006/main" xmlns:r="http://schemas.openxmlformats.org/officeDocument/2006/relationships" xmlns:p="http://schemas.openxmlformats.org/presentationml/2006/main">
+  <p:cSld>
+    <p:spTree>
+      <p:nvGrpSpPr>
+        <p:cNvPr id="1" name=""/>
+        <p:cNvGrpSpPr/>
+        <p:nvPr/>
+      </p:nvGrpSpPr>
+      <p:grpSpPr>
+        <a:xfrm>
+          <a:off x="0" y="0"/>
+          <a:ext cx="0" cy="0"/>
+          <a:chOff x="0" y="0"/>
+          <a:chExt cx="0" cy="0"/>
+        </a:xfrm>
+      </p:grpSpPr>
+      <p:pic>
+        <p:nvPicPr>
+          <p:cNvPr id="3" name="Image 2">
+            <a:extLst>
+              <a:ext uri="{FF2B5EF4-FFF2-40B4-BE49-F238E27FC236}">
+                <a16:creationId xmlns:a16="http://schemas.microsoft.com/office/drawing/2014/main" id="{73652085-D36E-4A42-8D1C-A96CBB7A39C9}"/>
+              </a:ext>
+            </a:extLst>
+          </p:cNvPr>
+          <p:cNvPicPr>
+            <a:picLocks noChangeAspect="1"/>
+          </p:cNvPicPr>
+          <p:nvPr/>
+        </p:nvPicPr>
+        <p:blipFill>
+          <a:blip r:embed="rId2"/>
+          <a:stretch>
+            <a:fillRect/>
+          </a:stretch>
+        </p:blipFill>
+        <p:spPr>
+          <a:xfrm>
+            <a:off x="0" y="825190"/>
+            <a:ext cx="5947164" cy="5207620"/>
+          </a:xfrm>
+          <a:prstGeom prst="rect">
+            <a:avLst/>
+          </a:prstGeom>
+        </p:spPr>
+      </p:pic>
+      <p:pic>
+        <p:nvPicPr>
+          <p:cNvPr id="5" name="Image 4">
+            <a:extLst>
+              <a:ext uri="{FF2B5EF4-FFF2-40B4-BE49-F238E27FC236}">
+                <a16:creationId xmlns:a16="http://schemas.microsoft.com/office/drawing/2014/main" id="{7B1E3D66-0B7E-4CF8-A348-924A4DCAB9F7}"/>
+              </a:ext>
+            </a:extLst>
+          </p:cNvPr>
+          <p:cNvPicPr>
+            <a:picLocks noChangeAspect="1"/>
+          </p:cNvPicPr>
+          <p:nvPr/>
+        </p:nvPicPr>
+        <p:blipFill>
+          <a:blip r:embed="rId3"/>
+          <a:stretch>
+            <a:fillRect/>
+          </a:stretch>
+        </p:blipFill>
+        <p:spPr>
+          <a:xfrm>
+            <a:off x="6047677" y="825190"/>
+            <a:ext cx="5947164" cy="4186904"/>
+          </a:xfrm>
+          <a:prstGeom prst="rect">
+            <a:avLst/>
+          </a:prstGeom>
+        </p:spPr>
+      </p:pic>
+      <p:sp>
+        <p:nvSpPr>
+          <p:cNvPr id="6" name="ZoneTexte 5">
+            <a:extLst>
+              <a:ext uri="{FF2B5EF4-FFF2-40B4-BE49-F238E27FC236}">
+                <a16:creationId xmlns:a16="http://schemas.microsoft.com/office/drawing/2014/main" id="{932DC154-1E7A-45C2-812D-DC0DA34522F0}"/>
+              </a:ext>
+            </a:extLst>
+          </p:cNvPr>
+          <p:cNvSpPr txBox="1"/>
+          <p:nvPr/>
+        </p:nvSpPr>
+        <p:spPr>
+          <a:xfrm>
+            <a:off x="0" y="122663"/>
+            <a:ext cx="12191999" cy="369332"/>
+          </a:xfrm>
+          <a:prstGeom prst="rect">
+            <a:avLst/>
+          </a:prstGeom>
+          <a:noFill/>
+        </p:spPr>
+        <p:txBody>
+          <a:bodyPr wrap="square" rtlCol="0">
+            <a:spAutoFit/>
+          </a:bodyPr>
+          <a:lstStyle/>
+          <a:p>
+            <a:pPr algn="ctr"/>
+            <a:r>
+              <a:rPr lang="fr-FR" dirty="0"/>
+              <a:t>Classe </a:t>
+            </a:r>
+            <a:r>
+              <a:rPr lang="fr-FR" dirty="0" err="1"/>
+              <a:t>SymptomWriteDataToFile</a:t>
+            </a:r>
+            <a:r>
+              <a:rPr lang="fr-FR" dirty="0"/>
+              <a:t> </a:t>
+            </a:r>
+            <a:r>
+              <a:rPr lang="fr-FR" dirty="0" err="1"/>
+              <a:t>implementant</a:t>
+            </a:r>
+            <a:r>
+              <a:rPr lang="fr-FR" dirty="0"/>
+              <a:t> l’interface </a:t>
+            </a:r>
+            <a:r>
+              <a:rPr lang="fr-FR" dirty="0" err="1"/>
+              <a:t>ISymptomIO</a:t>
+            </a:r>
+            <a:endParaRPr lang="fr-FR" dirty="0"/>
+          </a:p>
+        </p:txBody>
+      </p:sp>
+    </p:spTree>
+    <p:extLst>
+      <p:ext uri="{BB962C8B-B14F-4D97-AF65-F5344CB8AC3E}">
+        <p14:creationId xmlns:p14="http://schemas.microsoft.com/office/powerpoint/2010/main" val="179207695"/>
+      </p:ext>
+    </p:extLst>
+  </p:cSld>
+  <p:clrMapOvr>
+    <a:masterClrMapping/>
+  </p:clrMapOvr>
+</p:sld>
+</file>
+
+<file path=ppt/slides/slide12.xml><?xml version="1.0" encoding="utf-8"?>
+<p:sld xmlns:a="http://schemas.openxmlformats.org/drawingml/2006/main" xmlns:r="http://schemas.openxmlformats.org/officeDocument/2006/relationships" xmlns:p="http://schemas.openxmlformats.org/presentationml/2006/main">
+  <p:cSld>
+    <p:spTree>
+      <p:nvGrpSpPr>
+        <p:cNvPr id="1" name=""/>
+        <p:cNvGrpSpPr/>
+        <p:nvPr/>
+      </p:nvGrpSpPr>
+      <p:grpSpPr>
+        <a:xfrm>
+          <a:off x="0" y="0"/>
+          <a:ext cx="0" cy="0"/>
+          <a:chOff x="0" y="0"/>
+          <a:chExt cx="0" cy="0"/>
+        </a:xfrm>
+      </p:grpSpPr>
+      <p:pic>
+        <p:nvPicPr>
+          <p:cNvPr id="3" name="Image 2">
+            <a:extLst>
+              <a:ext uri="{FF2B5EF4-FFF2-40B4-BE49-F238E27FC236}">
+                <a16:creationId xmlns:a16="http://schemas.microsoft.com/office/drawing/2014/main" id="{52820277-3C07-44E9-9AF6-B5A19DA6AE53}"/>
+              </a:ext>
+            </a:extLst>
+          </p:cNvPr>
+          <p:cNvPicPr>
+            <a:picLocks noChangeAspect="1"/>
+          </p:cNvPicPr>
+          <p:nvPr/>
+        </p:nvPicPr>
+        <p:blipFill>
+          <a:blip r:embed="rId2"/>
+          <a:stretch>
+            <a:fillRect/>
+          </a:stretch>
+        </p:blipFill>
+        <p:spPr>
+          <a:xfrm>
+            <a:off x="0" y="746693"/>
+            <a:ext cx="5720576" cy="6119329"/>
+          </a:xfrm>
+          <a:prstGeom prst="rect">
+            <a:avLst/>
+          </a:prstGeom>
+        </p:spPr>
+      </p:pic>
+      <p:sp>
+        <p:nvSpPr>
+          <p:cNvPr id="4" name="ZoneTexte 3">
+            <a:extLst>
+              <a:ext uri="{FF2B5EF4-FFF2-40B4-BE49-F238E27FC236}">
+                <a16:creationId xmlns:a16="http://schemas.microsoft.com/office/drawing/2014/main" id="{46EBF38E-772B-454A-9FEF-85358FD4C281}"/>
+              </a:ext>
+            </a:extLst>
+          </p:cNvPr>
+          <p:cNvSpPr txBox="1"/>
+          <p:nvPr/>
+        </p:nvSpPr>
+        <p:spPr>
+          <a:xfrm>
+            <a:off x="0" y="0"/>
+            <a:ext cx="12192000" cy="646331"/>
+          </a:xfrm>
+          <a:prstGeom prst="rect">
+            <a:avLst/>
+          </a:prstGeom>
+          <a:noFill/>
+        </p:spPr>
+        <p:txBody>
+          <a:bodyPr wrap="square" rtlCol="0">
+            <a:spAutoFit/>
+          </a:bodyPr>
+          <a:lstStyle/>
+          <a:p>
+            <a:pPr algn="ctr"/>
+            <a:r>
+              <a:rPr lang="fr-FR" sz="3600" dirty="0"/>
+              <a:t>La solution </a:t>
+            </a:r>
+            <a:r>
+              <a:rPr lang="fr-FR" sz="3600" dirty="0" err="1"/>
+              <a:t>fonctionelle</a:t>
+            </a:r>
+            <a:r>
+              <a:rPr lang="fr-FR" sz="3600" dirty="0"/>
+              <a:t> et sa vérification</a:t>
+            </a:r>
+          </a:p>
+        </p:txBody>
+      </p:sp>
+      <p:pic>
+        <p:nvPicPr>
+          <p:cNvPr id="6" name="Image 5">
+            <a:extLst>
+              <a:ext uri="{FF2B5EF4-FFF2-40B4-BE49-F238E27FC236}">
+                <a16:creationId xmlns:a16="http://schemas.microsoft.com/office/drawing/2014/main" id="{8C86F1D4-92F7-4A3A-9426-0753AD0F53EA}"/>
+              </a:ext>
+            </a:extLst>
+          </p:cNvPr>
+          <p:cNvPicPr>
+            <a:picLocks noChangeAspect="1"/>
+          </p:cNvPicPr>
+          <p:nvPr/>
+        </p:nvPicPr>
+        <p:blipFill>
+          <a:blip r:embed="rId3"/>
+          <a:stretch>
+            <a:fillRect/>
+          </a:stretch>
+        </p:blipFill>
+        <p:spPr>
+          <a:xfrm>
+            <a:off x="8154280" y="906378"/>
+            <a:ext cx="4037719" cy="5951622"/>
+          </a:xfrm>
+          <a:prstGeom prst="rect">
+            <a:avLst/>
+          </a:prstGeom>
+        </p:spPr>
+      </p:pic>
+    </p:spTree>
+    <p:extLst>
+      <p:ext uri="{BB962C8B-B14F-4D97-AF65-F5344CB8AC3E}">
+        <p14:creationId xmlns:p14="http://schemas.microsoft.com/office/powerpoint/2010/main" val="1150906306"/>
+      </p:ext>
+    </p:extLst>
+  </p:cSld>
+  <p:clrMapOvr>
+    <a:masterClrMapping/>
+  </p:clrMapOvr>
+</p:sld>
+</file>
+
 <file path=ppt/slides/slide2.xml><?xml version="1.0" encoding="utf-8"?>
 <p:sld xmlns:a="http://schemas.openxmlformats.org/drawingml/2006/main" xmlns:r="http://schemas.openxmlformats.org/officeDocument/2006/relationships" xmlns:p="http://schemas.openxmlformats.org/presentationml/2006/main">
   <p:cSld>
@@ -4705,7 +5118,7 @@
         <p:spPr>
           <a:xfrm>
             <a:off x="5282949" y="3415606"/>
-            <a:ext cx="6841996" cy="2308324"/>
+            <a:ext cx="6841996" cy="2585323"/>
           </a:xfrm>
           <a:prstGeom prst="rect">
             <a:avLst/>
@@ -4726,7 +5139,7 @@
           <a:p>
             <a:r>
               <a:rPr lang="fr-FR" dirty="0"/>
-              <a:t>Pour une seule instance afin d’éviter plusieurs </a:t>
+              <a:t>pour une seule instance afin d’éviter plusieurs </a:t>
             </a:r>
             <a:r>
               <a:rPr lang="fr-FR" dirty="0" err="1"/>
@@ -4747,6 +5160,9 @@
               <a:rPr lang="fr-FR" dirty="0"/>
               <a:t>sur le même fichier.</a:t>
             </a:r>
+          </a:p>
+          <a:p>
+            <a:endParaRPr lang="fr-FR" dirty="0"/>
           </a:p>
           <a:p>
             <a:r>
@@ -4852,10 +5268,582 @@
           <a:chExt cx="0" cy="0"/>
         </a:xfrm>
       </p:grpSpPr>
+      <p:pic>
+        <p:nvPicPr>
+          <p:cNvPr id="6" name="Image 5">
+            <a:extLst>
+              <a:ext uri="{FF2B5EF4-FFF2-40B4-BE49-F238E27FC236}">
+                <a16:creationId xmlns:a16="http://schemas.microsoft.com/office/drawing/2014/main" id="{99E6AF4B-CD01-4FFC-AA3E-7A43ED40BF55}"/>
+              </a:ext>
+            </a:extLst>
+          </p:cNvPr>
+          <p:cNvPicPr>
+            <a:picLocks noChangeAspect="1"/>
+          </p:cNvPicPr>
+          <p:nvPr/>
+        </p:nvPicPr>
+        <p:blipFill>
+          <a:blip r:embed="rId2"/>
+          <a:stretch>
+            <a:fillRect/>
+          </a:stretch>
+        </p:blipFill>
+        <p:spPr>
+          <a:xfrm>
+            <a:off x="4843113" y="-36000"/>
+            <a:ext cx="7305" cy="6912000"/>
+          </a:xfrm>
+          <a:prstGeom prst="rect">
+            <a:avLst/>
+          </a:prstGeom>
+        </p:spPr>
+      </p:pic>
+      <p:pic>
+        <p:nvPicPr>
+          <p:cNvPr id="8" name="Image 7">
+            <a:extLst>
+              <a:ext uri="{FF2B5EF4-FFF2-40B4-BE49-F238E27FC236}">
+                <a16:creationId xmlns:a16="http://schemas.microsoft.com/office/drawing/2014/main" id="{20FE2D40-5BD1-4762-BE01-614A4D06B5B6}"/>
+              </a:ext>
+            </a:extLst>
+          </p:cNvPr>
+          <p:cNvPicPr>
+            <a:picLocks noChangeAspect="1"/>
+          </p:cNvPicPr>
+          <p:nvPr/>
+        </p:nvPicPr>
+        <p:blipFill>
+          <a:blip r:embed="rId3"/>
+          <a:stretch>
+            <a:fillRect/>
+          </a:stretch>
+        </p:blipFill>
+        <p:spPr>
+          <a:xfrm>
+            <a:off x="0" y="319489"/>
+            <a:ext cx="4823864" cy="5332164"/>
+          </a:xfrm>
+          <a:prstGeom prst="rect">
+            <a:avLst/>
+          </a:prstGeom>
+        </p:spPr>
+      </p:pic>
+      <p:pic>
+        <p:nvPicPr>
+          <p:cNvPr id="12" name="Image 11">
+            <a:extLst>
+              <a:ext uri="{FF2B5EF4-FFF2-40B4-BE49-F238E27FC236}">
+                <a16:creationId xmlns:a16="http://schemas.microsoft.com/office/drawing/2014/main" id="{4B8AD7C5-569D-419A-BC1A-B8A83C21E79D}"/>
+              </a:ext>
+            </a:extLst>
+          </p:cNvPr>
+          <p:cNvPicPr>
+            <a:picLocks noChangeAspect="1"/>
+          </p:cNvPicPr>
+          <p:nvPr/>
+        </p:nvPicPr>
+        <p:blipFill>
+          <a:blip r:embed="rId4"/>
+          <a:stretch>
+            <a:fillRect/>
+          </a:stretch>
+        </p:blipFill>
+        <p:spPr>
+          <a:xfrm>
+            <a:off x="7656671" y="4465839"/>
+            <a:ext cx="1571844" cy="2410161"/>
+          </a:xfrm>
+          <a:prstGeom prst="rect">
+            <a:avLst/>
+          </a:prstGeom>
+        </p:spPr>
+      </p:pic>
+      <p:pic>
+        <p:nvPicPr>
+          <p:cNvPr id="14" name="Image 13">
+            <a:extLst>
+              <a:ext uri="{FF2B5EF4-FFF2-40B4-BE49-F238E27FC236}">
+                <a16:creationId xmlns:a16="http://schemas.microsoft.com/office/drawing/2014/main" id="{BE78B581-5010-47FA-AF71-6C30E1A4CF14}"/>
+              </a:ext>
+            </a:extLst>
+          </p:cNvPr>
+          <p:cNvPicPr>
+            <a:picLocks noChangeAspect="1"/>
+          </p:cNvPicPr>
+          <p:nvPr/>
+        </p:nvPicPr>
+        <p:blipFill>
+          <a:blip r:embed="rId5"/>
+          <a:stretch>
+            <a:fillRect/>
+          </a:stretch>
+        </p:blipFill>
+        <p:spPr>
+          <a:xfrm>
+            <a:off x="4869667" y="0"/>
+            <a:ext cx="7411484" cy="4610743"/>
+          </a:xfrm>
+          <a:prstGeom prst="rect">
+            <a:avLst/>
+          </a:prstGeom>
+        </p:spPr>
+      </p:pic>
     </p:spTree>
     <p:extLst>
       <p:ext uri="{BB962C8B-B14F-4D97-AF65-F5344CB8AC3E}">
         <p14:creationId xmlns:p14="http://schemas.microsoft.com/office/powerpoint/2010/main" val="514782218"/>
+      </p:ext>
+    </p:extLst>
+  </p:cSld>
+  <p:clrMapOvr>
+    <a:masterClrMapping/>
+  </p:clrMapOvr>
+</p:sld>
+</file>
+
+<file path=ppt/slides/slide7.xml><?xml version="1.0" encoding="utf-8"?>
+<p:sld xmlns:a="http://schemas.openxmlformats.org/drawingml/2006/main" xmlns:r="http://schemas.openxmlformats.org/officeDocument/2006/relationships" xmlns:p="http://schemas.openxmlformats.org/presentationml/2006/main">
+  <p:cSld>
+    <p:spTree>
+      <p:nvGrpSpPr>
+        <p:cNvPr id="1" name=""/>
+        <p:cNvGrpSpPr/>
+        <p:nvPr/>
+      </p:nvGrpSpPr>
+      <p:grpSpPr>
+        <a:xfrm>
+          <a:off x="0" y="0"/>
+          <a:ext cx="0" cy="0"/>
+          <a:chOff x="0" y="0"/>
+          <a:chExt cx="0" cy="0"/>
+        </a:xfrm>
+      </p:grpSpPr>
+      <p:pic>
+        <p:nvPicPr>
+          <p:cNvPr id="3" name="Image 2">
+            <a:extLst>
+              <a:ext uri="{FF2B5EF4-FFF2-40B4-BE49-F238E27FC236}">
+                <a16:creationId xmlns:a16="http://schemas.microsoft.com/office/drawing/2014/main" id="{9B30A8D6-0F83-4472-AC51-386C70876241}"/>
+              </a:ext>
+            </a:extLst>
+          </p:cNvPr>
+          <p:cNvPicPr>
+            <a:picLocks noChangeAspect="1"/>
+          </p:cNvPicPr>
+          <p:nvPr/>
+        </p:nvPicPr>
+        <p:blipFill>
+          <a:blip r:embed="rId2"/>
+          <a:stretch>
+            <a:fillRect/>
+          </a:stretch>
+        </p:blipFill>
+        <p:spPr>
+          <a:xfrm>
+            <a:off x="-1" y="36623"/>
+            <a:ext cx="5497418" cy="6798740"/>
+          </a:xfrm>
+          <a:prstGeom prst="rect">
+            <a:avLst/>
+          </a:prstGeom>
+        </p:spPr>
+      </p:pic>
+      <p:pic>
+        <p:nvPicPr>
+          <p:cNvPr id="5" name="Image 4">
+            <a:extLst>
+              <a:ext uri="{FF2B5EF4-FFF2-40B4-BE49-F238E27FC236}">
+                <a16:creationId xmlns:a16="http://schemas.microsoft.com/office/drawing/2014/main" id="{2279C8BA-74F6-4469-AF2B-1AB9DD8AC092}"/>
+              </a:ext>
+            </a:extLst>
+          </p:cNvPr>
+          <p:cNvPicPr>
+            <a:picLocks noChangeAspect="1"/>
+          </p:cNvPicPr>
+          <p:nvPr/>
+        </p:nvPicPr>
+        <p:blipFill>
+          <a:blip r:embed="rId3"/>
+          <a:stretch>
+            <a:fillRect/>
+          </a:stretch>
+        </p:blipFill>
+        <p:spPr>
+          <a:xfrm>
+            <a:off x="7192359" y="0"/>
+            <a:ext cx="4858078" cy="6858000"/>
+          </a:xfrm>
+          <a:prstGeom prst="rect">
+            <a:avLst/>
+          </a:prstGeom>
+        </p:spPr>
+      </p:pic>
+    </p:spTree>
+    <p:extLst>
+      <p:ext uri="{BB962C8B-B14F-4D97-AF65-F5344CB8AC3E}">
+        <p14:creationId xmlns:p14="http://schemas.microsoft.com/office/powerpoint/2010/main" val="2781402994"/>
+      </p:ext>
+    </p:extLst>
+  </p:cSld>
+  <p:clrMapOvr>
+    <a:masterClrMapping/>
+  </p:clrMapOvr>
+</p:sld>
+</file>
+
+<file path=ppt/slides/slide8.xml><?xml version="1.0" encoding="utf-8"?>
+<p:sld xmlns:a="http://schemas.openxmlformats.org/drawingml/2006/main" xmlns:r="http://schemas.openxmlformats.org/officeDocument/2006/relationships" xmlns:p="http://schemas.openxmlformats.org/presentationml/2006/main">
+  <p:cSld>
+    <p:spTree>
+      <p:nvGrpSpPr>
+        <p:cNvPr id="1" name=""/>
+        <p:cNvGrpSpPr/>
+        <p:nvPr/>
+      </p:nvGrpSpPr>
+      <p:grpSpPr>
+        <a:xfrm>
+          <a:off x="0" y="0"/>
+          <a:ext cx="0" cy="0"/>
+          <a:chOff x="0" y="0"/>
+          <a:chExt cx="0" cy="0"/>
+        </a:xfrm>
+      </p:grpSpPr>
+      <p:pic>
+        <p:nvPicPr>
+          <p:cNvPr id="3" name="Image 2">
+            <a:extLst>
+              <a:ext uri="{FF2B5EF4-FFF2-40B4-BE49-F238E27FC236}">
+                <a16:creationId xmlns:a16="http://schemas.microsoft.com/office/drawing/2014/main" id="{BC113DD8-E2D0-4F68-AAFB-95E773EBF7E3}"/>
+              </a:ext>
+            </a:extLst>
+          </p:cNvPr>
+          <p:cNvPicPr>
+            <a:picLocks noChangeAspect="1"/>
+          </p:cNvPicPr>
+          <p:nvPr/>
+        </p:nvPicPr>
+        <p:blipFill>
+          <a:blip r:embed="rId2"/>
+          <a:stretch>
+            <a:fillRect/>
+          </a:stretch>
+        </p:blipFill>
+        <p:spPr>
+          <a:xfrm>
+            <a:off x="0" y="0"/>
+            <a:ext cx="5649113" cy="2886478"/>
+          </a:xfrm>
+          <a:prstGeom prst="rect">
+            <a:avLst/>
+          </a:prstGeom>
+        </p:spPr>
+      </p:pic>
+      <p:sp>
+        <p:nvSpPr>
+          <p:cNvPr id="4" name="ZoneTexte 3">
+            <a:extLst>
+              <a:ext uri="{FF2B5EF4-FFF2-40B4-BE49-F238E27FC236}">
+                <a16:creationId xmlns:a16="http://schemas.microsoft.com/office/drawing/2014/main" id="{9570EB15-1DD7-4671-8AAE-6805F6685D74}"/>
+              </a:ext>
+            </a:extLst>
+          </p:cNvPr>
+          <p:cNvSpPr txBox="1"/>
+          <p:nvPr/>
+        </p:nvSpPr>
+        <p:spPr>
+          <a:xfrm>
+            <a:off x="189571" y="3100039"/>
+            <a:ext cx="12002429" cy="3570208"/>
+          </a:xfrm>
+          <a:prstGeom prst="rect">
+            <a:avLst/>
+          </a:prstGeom>
+          <a:noFill/>
+        </p:spPr>
+        <p:txBody>
+          <a:bodyPr wrap="square" rtlCol="0">
+            <a:spAutoFit/>
+          </a:bodyPr>
+          <a:lstStyle/>
+          <a:p>
+            <a:r>
+              <a:rPr lang="fr-FR" dirty="0"/>
+              <a:t>Puis </a:t>
+            </a:r>
+            <a:r>
+              <a:rPr lang="fr-FR" dirty="0" err="1"/>
+              <a:t>GitBash</a:t>
+            </a:r>
+            <a:r>
+              <a:rPr lang="fr-FR" dirty="0"/>
+              <a:t> :</a:t>
+            </a:r>
+          </a:p>
+          <a:p>
+            <a:r>
+              <a:rPr lang="fr-FR" dirty="0"/>
+              <a:t>$ git flow </a:t>
+            </a:r>
+            <a:r>
+              <a:rPr lang="fr-FR" dirty="0" err="1"/>
+              <a:t>feature</a:t>
+            </a:r>
+            <a:r>
+              <a:rPr lang="fr-FR" dirty="0"/>
+              <a:t> finish </a:t>
+            </a:r>
+            <a:r>
+              <a:rPr lang="fr-FR" dirty="0" err="1"/>
+              <a:t>readDataFile</a:t>
+            </a:r>
+            <a:endParaRPr lang="fr-FR" dirty="0"/>
+          </a:p>
+          <a:p>
+            <a:r>
+              <a:rPr lang="fr-FR" dirty="0"/>
+              <a:t>$ git flow release start ‘0.1.0’</a:t>
+            </a:r>
+          </a:p>
+          <a:p>
+            <a:r>
+              <a:rPr lang="fr-FR" dirty="0"/>
+              <a:t>$ git flow release finish ‘0.1.0’</a:t>
+            </a:r>
+          </a:p>
+          <a:p>
+            <a:r>
+              <a:rPr lang="fr-FR" dirty="0"/>
+              <a:t>$ git push –tags</a:t>
+            </a:r>
+          </a:p>
+          <a:p>
+            <a:endParaRPr lang="fr-FR" dirty="0"/>
+          </a:p>
+          <a:p>
+            <a:pPr algn="ctr"/>
+            <a:r>
+              <a:rPr lang="fr-FR" sz="3200" dirty="0"/>
+              <a:t>2</a:t>
+            </a:r>
+            <a:r>
+              <a:rPr lang="fr-FR" sz="3200" baseline="30000" dirty="0"/>
+              <a:t>ème</a:t>
+            </a:r>
+            <a:r>
+              <a:rPr lang="fr-FR" sz="3200" dirty="0"/>
+              <a:t> itération : écrire le fichier </a:t>
+            </a:r>
+            <a:r>
+              <a:rPr lang="fr-FR" sz="3200" dirty="0" err="1"/>
+              <a:t>result.out</a:t>
+            </a:r>
+            <a:r>
+              <a:rPr lang="fr-FR" sz="3200" dirty="0"/>
+              <a:t> par </a:t>
+            </a:r>
+            <a:r>
+              <a:rPr lang="fr-FR" sz="3200" dirty="0" err="1"/>
+              <a:t>odre</a:t>
+            </a:r>
+            <a:r>
+              <a:rPr lang="fr-FR" sz="3200" dirty="0"/>
+              <a:t> alphabétique des </a:t>
+            </a:r>
+            <a:r>
+              <a:rPr lang="fr-FR" sz="3200" dirty="0" err="1"/>
+              <a:t>symptomes</a:t>
+            </a:r>
+            <a:r>
+              <a:rPr lang="fr-FR" sz="3200" dirty="0"/>
+              <a:t> avec leur occurrences</a:t>
+            </a:r>
+          </a:p>
+          <a:p>
+            <a:endParaRPr lang="fr-FR" dirty="0"/>
+          </a:p>
+          <a:p>
+            <a:r>
+              <a:rPr lang="fr-FR" dirty="0"/>
+              <a:t>$ git flow </a:t>
+            </a:r>
+            <a:r>
+              <a:rPr lang="fr-FR" dirty="0" err="1"/>
+              <a:t>feature</a:t>
+            </a:r>
+            <a:r>
+              <a:rPr lang="fr-FR" dirty="0"/>
+              <a:t> start </a:t>
+            </a:r>
+            <a:r>
+              <a:rPr lang="fr-FR" dirty="0" err="1"/>
+              <a:t>writeOutFile</a:t>
+            </a:r>
+            <a:endParaRPr lang="fr-FR" dirty="0"/>
+          </a:p>
+          <a:p>
+            <a:r>
+              <a:rPr lang="fr-FR" dirty="0"/>
+              <a:t>$ git flow </a:t>
+            </a:r>
+            <a:r>
+              <a:rPr lang="fr-FR" dirty="0" err="1"/>
+              <a:t>feature</a:t>
+            </a:r>
+            <a:r>
+              <a:rPr lang="fr-FR" dirty="0"/>
+              <a:t> </a:t>
+            </a:r>
+            <a:r>
+              <a:rPr lang="fr-FR" dirty="0" err="1"/>
+              <a:t>publish</a:t>
+            </a:r>
+            <a:r>
+              <a:rPr lang="fr-FR" dirty="0"/>
+              <a:t> </a:t>
+            </a:r>
+            <a:r>
+              <a:rPr lang="fr-FR" dirty="0" err="1"/>
+              <a:t>writeOutFile</a:t>
+            </a:r>
+            <a:endParaRPr lang="fr-FR" dirty="0"/>
+          </a:p>
+        </p:txBody>
+      </p:sp>
+    </p:spTree>
+    <p:extLst>
+      <p:ext uri="{BB962C8B-B14F-4D97-AF65-F5344CB8AC3E}">
+        <p14:creationId xmlns:p14="http://schemas.microsoft.com/office/powerpoint/2010/main" val="1554430861"/>
+      </p:ext>
+    </p:extLst>
+  </p:cSld>
+  <p:clrMapOvr>
+    <a:masterClrMapping/>
+  </p:clrMapOvr>
+</p:sld>
+</file>
+
+<file path=ppt/slides/slide9.xml><?xml version="1.0" encoding="utf-8"?>
+<p:sld xmlns:a="http://schemas.openxmlformats.org/drawingml/2006/main" xmlns:r="http://schemas.openxmlformats.org/officeDocument/2006/relationships" xmlns:p="http://schemas.openxmlformats.org/presentationml/2006/main">
+  <p:cSld>
+    <p:spTree>
+      <p:nvGrpSpPr>
+        <p:cNvPr id="1" name=""/>
+        <p:cNvGrpSpPr/>
+        <p:nvPr/>
+      </p:nvGrpSpPr>
+      <p:grpSpPr>
+        <a:xfrm>
+          <a:off x="0" y="0"/>
+          <a:ext cx="0" cy="0"/>
+          <a:chOff x="0" y="0"/>
+          <a:chExt cx="0" cy="0"/>
+        </a:xfrm>
+      </p:grpSpPr>
+      <p:sp>
+        <p:nvSpPr>
+          <p:cNvPr id="2" name="ZoneTexte 1">
+            <a:extLst>
+              <a:ext uri="{FF2B5EF4-FFF2-40B4-BE49-F238E27FC236}">
+                <a16:creationId xmlns:a16="http://schemas.microsoft.com/office/drawing/2014/main" id="{05724800-76F5-41D9-86F3-323C1D60D124}"/>
+              </a:ext>
+            </a:extLst>
+          </p:cNvPr>
+          <p:cNvSpPr txBox="1"/>
+          <p:nvPr/>
+        </p:nvSpPr>
+        <p:spPr>
+          <a:xfrm>
+            <a:off x="167268" y="223024"/>
+            <a:ext cx="11732956" cy="830997"/>
+          </a:xfrm>
+          <a:prstGeom prst="rect">
+            <a:avLst/>
+          </a:prstGeom>
+          <a:noFill/>
+        </p:spPr>
+        <p:txBody>
+          <a:bodyPr wrap="none" rtlCol="0">
+            <a:spAutoFit/>
+          </a:bodyPr>
+          <a:lstStyle/>
+          <a:p>
+            <a:r>
+              <a:rPr lang="fr-FR" sz="2400" dirty="0"/>
+              <a:t>Le modèle en classe abstraite « Occurrences » permet de répondre à l’exigence de réécriture</a:t>
+            </a:r>
+          </a:p>
+          <a:p>
+            <a:r>
+              <a:rPr lang="fr-FR" sz="2400" dirty="0"/>
+              <a:t>pour que le code soit réutilisable, quel que soit le nombre de symptômes à suivre.</a:t>
+            </a:r>
+          </a:p>
+        </p:txBody>
+      </p:sp>
+      <p:pic>
+        <p:nvPicPr>
+          <p:cNvPr id="4" name="Image 3">
+            <a:extLst>
+              <a:ext uri="{FF2B5EF4-FFF2-40B4-BE49-F238E27FC236}">
+                <a16:creationId xmlns:a16="http://schemas.microsoft.com/office/drawing/2014/main" id="{70B58316-7AB4-47BF-881B-DC55BA8AD599}"/>
+              </a:ext>
+            </a:extLst>
+          </p:cNvPr>
+          <p:cNvPicPr>
+            <a:picLocks noChangeAspect="1"/>
+          </p:cNvPicPr>
+          <p:nvPr/>
+        </p:nvPicPr>
+        <p:blipFill>
+          <a:blip r:embed="rId2"/>
+          <a:stretch>
+            <a:fillRect/>
+          </a:stretch>
+        </p:blipFill>
+        <p:spPr>
+          <a:xfrm>
+            <a:off x="0" y="1054021"/>
+            <a:ext cx="5809786" cy="5891471"/>
+          </a:xfrm>
+          <a:prstGeom prst="rect">
+            <a:avLst/>
+          </a:prstGeom>
+        </p:spPr>
+      </p:pic>
+      <p:pic>
+        <p:nvPicPr>
+          <p:cNvPr id="6" name="Image 5">
+            <a:extLst>
+              <a:ext uri="{FF2B5EF4-FFF2-40B4-BE49-F238E27FC236}">
+                <a16:creationId xmlns:a16="http://schemas.microsoft.com/office/drawing/2014/main" id="{BC67C041-B608-4C00-9301-4DF503CE1503}"/>
+              </a:ext>
+            </a:extLst>
+          </p:cNvPr>
+          <p:cNvPicPr>
+            <a:picLocks noChangeAspect="1"/>
+          </p:cNvPicPr>
+          <p:nvPr/>
+        </p:nvPicPr>
+        <p:blipFill>
+          <a:blip r:embed="rId3"/>
+          <a:stretch>
+            <a:fillRect/>
+          </a:stretch>
+        </p:blipFill>
+        <p:spPr>
+          <a:xfrm>
+            <a:off x="7294771" y="1041246"/>
+            <a:ext cx="4772721" cy="5816754"/>
+          </a:xfrm>
+          <a:prstGeom prst="rect">
+            <a:avLst/>
+          </a:prstGeom>
+        </p:spPr>
+      </p:pic>
+    </p:spTree>
+    <p:extLst>
+      <p:ext uri="{BB962C8B-B14F-4D97-AF65-F5344CB8AC3E}">
+        <p14:creationId xmlns:p14="http://schemas.microsoft.com/office/powerpoint/2010/main" val="4233947543"/>
       </p:ext>
     </p:extLst>
   </p:cSld>

</xml_diff>

<commit_message>
docs : ending presentation
</commit_message>
<xml_diff>
--- a/PresentationOlivierMOREL.pptx
+++ b/PresentationOlivierMOREL.pptx
@@ -6,8 +6,8 @@
   </p:sldMasterIdLst>
   <p:sldIdLst>
     <p:sldId id="256" r:id="rId2"/>
-    <p:sldId id="259" r:id="rId3"/>
-    <p:sldId id="260" r:id="rId4"/>
+    <p:sldId id="268" r:id="rId3"/>
+    <p:sldId id="269" r:id="rId4"/>
     <p:sldId id="257" r:id="rId5"/>
     <p:sldId id="258" r:id="rId6"/>
     <p:sldId id="261" r:id="rId7"/>
@@ -270,7 +270,7 @@
           <a:p>
             <a:fld id="{D269E595-29A9-41CE-A1D7-342FE993CEF0}" type="datetimeFigureOut">
               <a:rPr lang="fr-FR" smtClean="0"/>
-              <a:t>09/08/2021</a:t>
+              <a:t>11/08/2021</a:t>
             </a:fld>
             <a:endParaRPr lang="fr-FR"/>
           </a:p>
@@ -468,7 +468,7 @@
           <a:p>
             <a:fld id="{D269E595-29A9-41CE-A1D7-342FE993CEF0}" type="datetimeFigureOut">
               <a:rPr lang="fr-FR" smtClean="0"/>
-              <a:t>09/08/2021</a:t>
+              <a:t>11/08/2021</a:t>
             </a:fld>
             <a:endParaRPr lang="fr-FR"/>
           </a:p>
@@ -676,7 +676,7 @@
           <a:p>
             <a:fld id="{D269E595-29A9-41CE-A1D7-342FE993CEF0}" type="datetimeFigureOut">
               <a:rPr lang="fr-FR" smtClean="0"/>
-              <a:t>09/08/2021</a:t>
+              <a:t>11/08/2021</a:t>
             </a:fld>
             <a:endParaRPr lang="fr-FR"/>
           </a:p>
@@ -874,7 +874,7 @@
           <a:p>
             <a:fld id="{D269E595-29A9-41CE-A1D7-342FE993CEF0}" type="datetimeFigureOut">
               <a:rPr lang="fr-FR" smtClean="0"/>
-              <a:t>09/08/2021</a:t>
+              <a:t>11/08/2021</a:t>
             </a:fld>
             <a:endParaRPr lang="fr-FR"/>
           </a:p>
@@ -1149,7 +1149,7 @@
           <a:p>
             <a:fld id="{D269E595-29A9-41CE-A1D7-342FE993CEF0}" type="datetimeFigureOut">
               <a:rPr lang="fr-FR" smtClean="0"/>
-              <a:t>09/08/2021</a:t>
+              <a:t>11/08/2021</a:t>
             </a:fld>
             <a:endParaRPr lang="fr-FR"/>
           </a:p>
@@ -1414,7 +1414,7 @@
           <a:p>
             <a:fld id="{D269E595-29A9-41CE-A1D7-342FE993CEF0}" type="datetimeFigureOut">
               <a:rPr lang="fr-FR" smtClean="0"/>
-              <a:t>09/08/2021</a:t>
+              <a:t>11/08/2021</a:t>
             </a:fld>
             <a:endParaRPr lang="fr-FR"/>
           </a:p>
@@ -1826,7 +1826,7 @@
           <a:p>
             <a:fld id="{D269E595-29A9-41CE-A1D7-342FE993CEF0}" type="datetimeFigureOut">
               <a:rPr lang="fr-FR" smtClean="0"/>
-              <a:t>09/08/2021</a:t>
+              <a:t>11/08/2021</a:t>
             </a:fld>
             <a:endParaRPr lang="fr-FR"/>
           </a:p>
@@ -1967,7 +1967,7 @@
           <a:p>
             <a:fld id="{D269E595-29A9-41CE-A1D7-342FE993CEF0}" type="datetimeFigureOut">
               <a:rPr lang="fr-FR" smtClean="0"/>
-              <a:t>09/08/2021</a:t>
+              <a:t>11/08/2021</a:t>
             </a:fld>
             <a:endParaRPr lang="fr-FR"/>
           </a:p>
@@ -2080,7 +2080,7 @@
           <a:p>
             <a:fld id="{D269E595-29A9-41CE-A1D7-342FE993CEF0}" type="datetimeFigureOut">
               <a:rPr lang="fr-FR" smtClean="0"/>
-              <a:t>09/08/2021</a:t>
+              <a:t>11/08/2021</a:t>
             </a:fld>
             <a:endParaRPr lang="fr-FR"/>
           </a:p>
@@ -2391,7 +2391,7 @@
           <a:p>
             <a:fld id="{D269E595-29A9-41CE-A1D7-342FE993CEF0}" type="datetimeFigureOut">
               <a:rPr lang="fr-FR" smtClean="0"/>
-              <a:t>09/08/2021</a:t>
+              <a:t>11/08/2021</a:t>
             </a:fld>
             <a:endParaRPr lang="fr-FR"/>
           </a:p>
@@ -2679,7 +2679,7 @@
           <a:p>
             <a:fld id="{D269E595-29A9-41CE-A1D7-342FE993CEF0}" type="datetimeFigureOut">
               <a:rPr lang="fr-FR" smtClean="0"/>
-              <a:t>09/08/2021</a:t>
+              <a:t>11/08/2021</a:t>
             </a:fld>
             <a:endParaRPr lang="fr-FR"/>
           </a:p>
@@ -2920,7 +2920,7 @@
           <a:p>
             <a:fld id="{D269E595-29A9-41CE-A1D7-342FE993CEF0}" type="datetimeFigureOut">
               <a:rPr lang="fr-FR" smtClean="0"/>
-              <a:t>09/08/2021</a:t>
+              <a:t>11/08/2021</a:t>
             </a:fld>
             <a:endParaRPr lang="fr-FR"/>
           </a:p>
@@ -3462,7 +3462,7 @@
             <a:pPr algn="ctr"/>
             <a:r>
               <a:rPr lang="fr-FR" dirty="0"/>
-              <a:t>Code dans le contrôleur</a:t>
+              <a:t>Code dans le contrôleur : utilisation des objets modèles.</a:t>
             </a:r>
           </a:p>
         </p:txBody>
@@ -3489,7 +3489,7 @@
         </p:blipFill>
         <p:spPr>
           <a:xfrm>
-            <a:off x="0" y="525449"/>
+            <a:off x="0" y="369332"/>
             <a:ext cx="5765180" cy="3225755"/>
           </a:xfrm>
           <a:prstGeom prst="rect">
@@ -3519,7 +3519,7 @@
         </p:blipFill>
         <p:spPr>
           <a:xfrm>
-            <a:off x="3893944" y="3632244"/>
+            <a:off x="0" y="3595087"/>
             <a:ext cx="8298056" cy="3225755"/>
           </a:xfrm>
           <a:prstGeom prst="rect">
@@ -3648,29 +3648,8 @@
             <a:pPr algn="ctr"/>
             <a:r>
               <a:rPr lang="fr-FR" dirty="0"/>
-              <a:t>Classe </a:t>
-            </a:r>
-            <a:r>
-              <a:rPr lang="fr-FR" dirty="0" err="1"/>
-              <a:t>SymptomWriteDataToFile</a:t>
-            </a:r>
-            <a:r>
-              <a:rPr lang="fr-FR" dirty="0"/>
-              <a:t> </a:t>
-            </a:r>
-            <a:r>
-              <a:rPr lang="fr-FR" dirty="0" err="1"/>
-              <a:t>implementant</a:t>
-            </a:r>
-            <a:r>
-              <a:rPr lang="fr-FR" dirty="0"/>
-              <a:t> l’interface </a:t>
-            </a:r>
-            <a:r>
-              <a:rPr lang="fr-FR" dirty="0" err="1"/>
-              <a:t>ISymptomIO</a:t>
-            </a:r>
-            <a:endParaRPr lang="fr-FR" dirty="0"/>
+              <a:t> DAO : implémentation de l’interface pour écrire les données dans le fichier :</a:t>
+            </a:r>
           </a:p>
         </p:txBody>
       </p:sp>
@@ -3765,15 +3744,7 @@
             <a:pPr algn="ctr"/>
             <a:r>
               <a:rPr lang="fr-FR" sz="3600" dirty="0"/>
-              <a:t>La solution </a:t>
-            </a:r>
-            <a:r>
-              <a:rPr lang="fr-FR" sz="3600" dirty="0" err="1"/>
-              <a:t>fonctionelle</a:t>
-            </a:r>
-            <a:r>
-              <a:rPr lang="fr-FR" sz="3600" dirty="0"/>
-              <a:t> et sa vérification</a:t>
+              <a:t>La solution fonctionnelle et sa vérification</a:t>
             </a:r>
           </a:p>
         </p:txBody>
@@ -3838,357 +3809,116 @@
           <a:chExt cx="0" cy="0"/>
         </a:xfrm>
       </p:grpSpPr>
-      <p:pic>
-        <p:nvPicPr>
-          <p:cNvPr id="8" name="Image 7">
-            <a:extLst>
-              <a:ext uri="{FF2B5EF4-FFF2-40B4-BE49-F238E27FC236}">
-                <a16:creationId xmlns:a16="http://schemas.microsoft.com/office/drawing/2014/main" id="{58F9C281-1414-4CE0-B21D-4E7F33C8D6AE}"/>
-              </a:ext>
-            </a:extLst>
-          </p:cNvPr>
-          <p:cNvPicPr>
-            <a:picLocks noChangeAspect="1"/>
-          </p:cNvPicPr>
-          <p:nvPr/>
-        </p:nvPicPr>
-        <p:blipFill>
-          <a:blip r:embed="rId2"/>
-          <a:stretch>
-            <a:fillRect/>
-          </a:stretch>
-        </p:blipFill>
-        <p:spPr>
-          <a:xfrm>
-            <a:off x="301752" y="235542"/>
-            <a:ext cx="4943665" cy="1060619"/>
-          </a:xfrm>
-          <a:prstGeom prst="rect">
-            <a:avLst/>
-          </a:prstGeom>
-        </p:spPr>
-      </p:pic>
-      <p:cxnSp>
-        <p:nvCxnSpPr>
-          <p:cNvPr id="12" name="Connecteur droit 11">
-            <a:extLst>
-              <a:ext uri="{FF2B5EF4-FFF2-40B4-BE49-F238E27FC236}">
-                <a16:creationId xmlns:a16="http://schemas.microsoft.com/office/drawing/2014/main" id="{9B856A67-47DB-4414-8999-07476E606336}"/>
-              </a:ext>
-            </a:extLst>
-          </p:cNvPr>
-          <p:cNvCxnSpPr>
-            <a:cxnSpLocks/>
-          </p:cNvCxnSpPr>
-          <p:nvPr/>
-        </p:nvCxnSpPr>
-        <p:spPr>
-          <a:xfrm>
-            <a:off x="6022036" y="137160"/>
-            <a:ext cx="0" cy="6574536"/>
-          </a:xfrm>
-          <a:prstGeom prst="line">
-            <a:avLst/>
-          </a:prstGeom>
-        </p:spPr>
-        <p:style>
-          <a:lnRef idx="1">
-            <a:schemeClr val="dk1"/>
-          </a:lnRef>
-          <a:fillRef idx="0">
-            <a:schemeClr val="dk1"/>
-          </a:fillRef>
-          <a:effectRef idx="0">
-            <a:schemeClr val="dk1"/>
-          </a:effectRef>
-          <a:fontRef idx="minor">
-            <a:schemeClr val="tx1"/>
-          </a:fontRef>
-        </p:style>
-      </p:cxnSp>
-      <p:sp>
-        <p:nvSpPr>
-          <p:cNvPr id="13" name="ZoneTexte 12">
-            <a:extLst>
-              <a:ext uri="{FF2B5EF4-FFF2-40B4-BE49-F238E27FC236}">
-                <a16:creationId xmlns:a16="http://schemas.microsoft.com/office/drawing/2014/main" id="{1678D4F0-D956-4ADF-92B1-0E8E4D15E265}"/>
-              </a:ext>
-            </a:extLst>
-          </p:cNvPr>
-          <p:cNvSpPr txBox="1"/>
-          <p:nvPr/>
-        </p:nvSpPr>
-        <p:spPr>
-          <a:xfrm>
-            <a:off x="301752" y="1600200"/>
-            <a:ext cx="5632704" cy="1877437"/>
-          </a:xfrm>
-          <a:prstGeom prst="rect">
-            <a:avLst/>
-          </a:prstGeom>
-          <a:noFill/>
-        </p:spPr>
-        <p:txBody>
-          <a:bodyPr wrap="square" rtlCol="0">
-            <a:spAutoFit/>
-          </a:bodyPr>
-          <a:lstStyle/>
-          <a:p>
-            <a:r>
-              <a:rPr lang="fr-FR" dirty="0" err="1"/>
-              <a:t>GitBash</a:t>
-            </a:r>
+      <p:sp>
+        <p:nvSpPr>
+          <p:cNvPr id="2" name="Titre 1">
+            <a:extLst>
+              <a:ext uri="{FF2B5EF4-FFF2-40B4-BE49-F238E27FC236}">
+                <a16:creationId xmlns:a16="http://schemas.microsoft.com/office/drawing/2014/main" id="{71B8B1D2-694D-4124-BFA6-F2C501B35109}"/>
+              </a:ext>
+            </a:extLst>
+          </p:cNvPr>
+          <p:cNvSpPr>
+            <a:spLocks noGrp="1"/>
+          </p:cNvSpPr>
+          <p:nvPr>
+            <p:ph type="title"/>
+          </p:nvPr>
+        </p:nvSpPr>
+        <p:spPr/>
+        <p:txBody>
+          <a:bodyPr/>
+          <a:lstStyle/>
+          <a:p>
+            <a:pPr algn="ctr"/>
             <a:r>
               <a:rPr lang="fr-FR" dirty="0"/>
-              <a:t> (</a:t>
-            </a:r>
-            <a:r>
-              <a:rPr lang="fr-FR" dirty="0" err="1"/>
-              <a:t>BashShell</a:t>
-            </a:r>
+              <a:t>Le besoin</a:t>
+            </a:r>
+          </a:p>
+        </p:txBody>
+      </p:sp>
+      <p:sp>
+        <p:nvSpPr>
+          <p:cNvPr id="3" name="Espace réservé du contenu 2">
+            <a:extLst>
+              <a:ext uri="{FF2B5EF4-FFF2-40B4-BE49-F238E27FC236}">
+                <a16:creationId xmlns:a16="http://schemas.microsoft.com/office/drawing/2014/main" id="{7C9B0652-5A35-430D-A916-25405324295F}"/>
+              </a:ext>
+            </a:extLst>
+          </p:cNvPr>
+          <p:cNvSpPr>
+            <a:spLocks noGrp="1"/>
+          </p:cNvSpPr>
+          <p:nvPr>
+            <p:ph idx="1"/>
+          </p:nvPr>
+        </p:nvSpPr>
+        <p:spPr/>
+        <p:txBody>
+          <a:bodyPr/>
+          <a:lstStyle/>
+          <a:p>
+            <a:pPr>
+              <a:spcAft>
+                <a:spcPts val="1200"/>
+              </a:spcAft>
+            </a:pPr>
             <a:r>
               <a:rPr lang="fr-FR" dirty="0"/>
-              <a:t>) :</a:t>
-            </a:r>
-          </a:p>
-          <a:p>
-            <a:r>
-              <a:rPr lang="fr-FR" sz="1400" dirty="0"/>
-              <a:t>$ </a:t>
-            </a:r>
-            <a:r>
-              <a:rPr lang="fr-FR" sz="1400" dirty="0" err="1"/>
-              <a:t>mkdir</a:t>
-            </a:r>
-            <a:r>
-              <a:rPr lang="fr-FR" sz="1400" dirty="0"/>
-              <a:t> </a:t>
-            </a:r>
-            <a:r>
-              <a:rPr lang="en-US" sz="1400" dirty="0"/>
-              <a:t>Project_DA_Java_EN_Come_to_the_Rescue_of_a_Java_Application/</a:t>
-            </a:r>
-          </a:p>
-          <a:p>
-            <a:r>
-              <a:rPr lang="en-US" sz="1400" dirty="0"/>
-              <a:t>$ git init</a:t>
-            </a:r>
-          </a:p>
-          <a:p>
-            <a:r>
-              <a:rPr lang="en-US" sz="1400" dirty="0"/>
-              <a:t>$ git remote add origin </a:t>
-            </a:r>
-            <a:r>
-              <a:rPr lang="en-US" sz="1400" dirty="0">
-                <a:hlinkClick r:id="rId3"/>
-              </a:rPr>
-              <a:t>https://github.com/emmo78/Project_DA_Java_EN_Come_to_the_Rescue_of_a_Java_Application.git</a:t>
-            </a:r>
-            <a:endParaRPr lang="en-US" sz="1400" dirty="0"/>
-          </a:p>
-          <a:p>
-            <a:r>
-              <a:rPr lang="en-US" sz="1400" dirty="0"/>
-              <a:t>$ git pull origin master</a:t>
-            </a:r>
-          </a:p>
-        </p:txBody>
-      </p:sp>
-      <p:pic>
-        <p:nvPicPr>
-          <p:cNvPr id="17" name="Image 16">
-            <a:extLst>
-              <a:ext uri="{FF2B5EF4-FFF2-40B4-BE49-F238E27FC236}">
-                <a16:creationId xmlns:a16="http://schemas.microsoft.com/office/drawing/2014/main" id="{7037F388-629B-4A02-BC7D-8CD2F03BECD8}"/>
-              </a:ext>
-            </a:extLst>
-          </p:cNvPr>
-          <p:cNvPicPr>
-            <a:picLocks noChangeAspect="1"/>
-          </p:cNvPicPr>
-          <p:nvPr/>
-        </p:nvPicPr>
-        <p:blipFill>
-          <a:blip r:embed="rId4"/>
-          <a:stretch>
-            <a:fillRect/>
-          </a:stretch>
-        </p:blipFill>
-        <p:spPr>
-          <a:xfrm>
-            <a:off x="245262" y="3595808"/>
-            <a:ext cx="5776774" cy="3262192"/>
-          </a:xfrm>
-          <a:prstGeom prst="rect">
-            <a:avLst/>
-          </a:prstGeom>
-        </p:spPr>
-      </p:pic>
-      <p:sp>
-        <p:nvSpPr>
-          <p:cNvPr id="22" name="ZoneTexte 21">
-            <a:extLst>
-              <a:ext uri="{FF2B5EF4-FFF2-40B4-BE49-F238E27FC236}">
-                <a16:creationId xmlns:a16="http://schemas.microsoft.com/office/drawing/2014/main" id="{5B2F21D7-7BA9-4FFD-8CA3-6B40B31D4A84}"/>
-              </a:ext>
-            </a:extLst>
-          </p:cNvPr>
-          <p:cNvSpPr txBox="1"/>
-          <p:nvPr/>
-        </p:nvSpPr>
-        <p:spPr>
-          <a:xfrm>
-            <a:off x="6077712" y="137160"/>
-            <a:ext cx="5869021" cy="5262979"/>
-          </a:xfrm>
-          <a:prstGeom prst="rect">
-            <a:avLst/>
-          </a:prstGeom>
-          <a:noFill/>
-        </p:spPr>
-        <p:txBody>
-          <a:bodyPr wrap="square" rtlCol="0">
-            <a:spAutoFit/>
-          </a:bodyPr>
-          <a:lstStyle/>
-          <a:p>
-            <a:r>
-              <a:rPr lang="fr-FR" sz="1400" dirty="0"/>
-              <a:t>$ git flow init</a:t>
-            </a:r>
-          </a:p>
-          <a:p>
-            <a:endParaRPr lang="fr-FR" sz="1400" dirty="0"/>
-          </a:p>
-          <a:p>
-            <a:r>
-              <a:rPr lang="fr-FR" sz="1400" dirty="0"/>
-              <a:t>Which branch should be used for bringing forth production releases?</a:t>
-            </a:r>
-          </a:p>
-          <a:p>
-            <a:r>
-              <a:rPr lang="fr-FR" sz="1400" dirty="0"/>
-              <a:t>   - master</a:t>
-            </a:r>
-          </a:p>
-          <a:p>
-            <a:r>
-              <a:rPr lang="fr-FR" sz="1400" dirty="0"/>
-              <a:t>Branch name for production releases: [master]</a:t>
-            </a:r>
-          </a:p>
-          <a:p>
-            <a:r>
-              <a:rPr lang="fr-FR" sz="1400" dirty="0"/>
-              <a:t>Branch name for "next release" development: [develop]</a:t>
-            </a:r>
-          </a:p>
-          <a:p>
-            <a:endParaRPr lang="fr-FR" sz="1400" dirty="0"/>
-          </a:p>
-          <a:p>
-            <a:r>
-              <a:rPr lang="fr-FR" sz="1400" dirty="0"/>
-              <a:t>How to name your supporting branch prefixes?</a:t>
-            </a:r>
-          </a:p>
-          <a:p>
-            <a:r>
-              <a:rPr lang="fr-FR" sz="1400" dirty="0"/>
-              <a:t>Feature branches? [feature/]</a:t>
-            </a:r>
-          </a:p>
-          <a:p>
-            <a:r>
-              <a:rPr lang="fr-FR" sz="1400" dirty="0"/>
-              <a:t>Bugfix branches? [bugfix/]</a:t>
-            </a:r>
-          </a:p>
-          <a:p>
-            <a:r>
-              <a:rPr lang="fr-FR" sz="1400" dirty="0"/>
-              <a:t>Release branches? [release/]</a:t>
-            </a:r>
-          </a:p>
-          <a:p>
-            <a:r>
-              <a:rPr lang="fr-FR" sz="1400" dirty="0"/>
-              <a:t>Hotfix branches? [hotfix/]</a:t>
-            </a:r>
-          </a:p>
-          <a:p>
-            <a:r>
-              <a:rPr lang="fr-FR" sz="1400" dirty="0"/>
-              <a:t>Support branches? [support/]</a:t>
-            </a:r>
-          </a:p>
-          <a:p>
-            <a:r>
-              <a:rPr lang="fr-FR" sz="1400" dirty="0"/>
-              <a:t>Version tag prefix? []</a:t>
-            </a:r>
-          </a:p>
-          <a:p>
-            <a:r>
-              <a:rPr lang="fr-FR" sz="1400" dirty="0"/>
-              <a:t>Hooks and filters directory? [E:/A_Yussuf/A_Home/A_En_Cours/OpenClassrooms_CDJ2E_20220422_20210608/Projet_2/</a:t>
-            </a:r>
-            <a:r>
-              <a:rPr lang="en-US" sz="1400" dirty="0"/>
-              <a:t>Project_DA_Java_EN_Come_to_the_Rescue_of_a_Java_Application</a:t>
-            </a:r>
-            <a:r>
-              <a:rPr lang="fr-FR" sz="1400" dirty="0"/>
-              <a:t>/.git/</a:t>
-            </a:r>
-            <a:r>
-              <a:rPr lang="fr-FR" sz="1400" dirty="0" err="1"/>
-              <a:t>hooks</a:t>
-            </a:r>
-            <a:r>
-              <a:rPr lang="fr-FR" sz="1400" dirty="0"/>
-              <a:t>]</a:t>
-            </a:r>
-          </a:p>
-          <a:p>
-            <a:endParaRPr lang="fr-FR" sz="1400" dirty="0"/>
-          </a:p>
-          <a:p>
-            <a:r>
-              <a:rPr lang="fr-FR" sz="1400" dirty="0"/>
-              <a:t>$  git push -u origin develop</a:t>
-            </a:r>
-          </a:p>
-          <a:p>
-            <a:r>
-              <a:rPr lang="fr-FR" sz="1400" dirty="0"/>
-              <a:t>$ git flow feature start readDataFile</a:t>
-            </a:r>
-          </a:p>
-          <a:p>
-            <a:r>
-              <a:rPr lang="fr-FR" sz="1400" dirty="0"/>
-              <a:t>$ </a:t>
-            </a:r>
-            <a:r>
-              <a:rPr lang="en-US" sz="1400" dirty="0"/>
-              <a:t>git flow feature publish readDataFile</a:t>
-            </a:r>
-            <a:r>
-              <a:rPr lang="fr-FR" sz="1400" dirty="0"/>
-              <a:t> </a:t>
-            </a:r>
-          </a:p>
-          <a:p>
-            <a:endParaRPr lang="fr-FR" sz="1400" dirty="0"/>
-          </a:p>
-          <a:p>
-            <a:r>
-              <a:rPr lang="fr-FR" sz="1400" dirty="0"/>
-              <a:t>Eclipse : Import Projects from Git → Existing local repository → add …</a:t>
+              <a:t>Solution fonctionnelle :</a:t>
+            </a:r>
+          </a:p>
+          <a:p>
+            <a:pPr lvl="1">
+              <a:spcAft>
+                <a:spcPts val="1200"/>
+              </a:spcAft>
+              <a:buFont typeface="Wingdings" panose="05000000000000000000" pitchFamily="2" charset="2"/>
+              <a:buChar char="Ø"/>
+            </a:pPr>
+            <a:r>
+              <a:rPr lang="fr-FR" dirty="0"/>
+              <a:t> lire correctement les données depuis le fichier</a:t>
+            </a:r>
+          </a:p>
+          <a:p>
+            <a:pPr lvl="1">
+              <a:spcAft>
+                <a:spcPts val="1200"/>
+              </a:spcAft>
+              <a:buFont typeface="Wingdings" panose="05000000000000000000" pitchFamily="2" charset="2"/>
+              <a:buChar char="Ø"/>
+            </a:pPr>
+            <a:r>
+              <a:rPr lang="fr-FR" dirty="0"/>
+              <a:t> les trier en ordre alphabétique</a:t>
+            </a:r>
+          </a:p>
+          <a:p>
+            <a:pPr lvl="1">
+              <a:spcAft>
+                <a:spcPts val="1200"/>
+              </a:spcAft>
+              <a:buFont typeface="Wingdings" panose="05000000000000000000" pitchFamily="2" charset="2"/>
+              <a:buChar char="Ø"/>
+            </a:pPr>
+            <a:r>
+              <a:rPr lang="fr-FR" dirty="0"/>
+              <a:t> compter le nombre d’occurrence de chaque symptôme</a:t>
+            </a:r>
+          </a:p>
+          <a:p>
+            <a:pPr lvl="1">
+              <a:spcAft>
+                <a:spcPts val="1200"/>
+              </a:spcAft>
+              <a:buFont typeface="Wingdings" panose="05000000000000000000" pitchFamily="2" charset="2"/>
+              <a:buChar char="Ø"/>
+            </a:pPr>
+            <a:r>
+              <a:rPr lang="fr-FR" dirty="0"/>
+              <a:t> afficher et écrire dans un fichier tous les symptômes avec leur(s) occurrence(s) respective(s) dans l’ordre alphabétique</a:t>
             </a:r>
           </a:p>
         </p:txBody>
@@ -4196,7 +3926,7 @@
     </p:spTree>
     <p:extLst>
       <p:ext uri="{BB962C8B-B14F-4D97-AF65-F5344CB8AC3E}">
-        <p14:creationId xmlns:p14="http://schemas.microsoft.com/office/powerpoint/2010/main" val="35758763"/>
+        <p14:creationId xmlns:p14="http://schemas.microsoft.com/office/powerpoint/2010/main" val="3411694865"/>
       </p:ext>
     </p:extLst>
   </p:cSld>
@@ -4223,76 +3953,208 @@
           <a:chExt cx="0" cy="0"/>
         </a:xfrm>
       </p:grpSpPr>
-      <p:pic>
-        <p:nvPicPr>
-          <p:cNvPr id="3" name="Image 2">
-            <a:extLst>
-              <a:ext uri="{FF2B5EF4-FFF2-40B4-BE49-F238E27FC236}">
-                <a16:creationId xmlns:a16="http://schemas.microsoft.com/office/drawing/2014/main" id="{698F6424-BEF5-43C7-A98C-99379376170E}"/>
-              </a:ext>
-            </a:extLst>
-          </p:cNvPr>
-          <p:cNvPicPr>
-            <a:picLocks noChangeAspect="1"/>
-          </p:cNvPicPr>
-          <p:nvPr/>
-        </p:nvPicPr>
-        <p:blipFill>
-          <a:blip r:embed="rId2">
-            <a:extLst>
-              <a:ext uri="{28A0092B-C50C-407E-A947-70E740481C1C}">
-                <a14:useLocalDpi xmlns:a14="http://schemas.microsoft.com/office/drawing/2010/main" val="0"/>
-              </a:ext>
-            </a:extLst>
-          </a:blip>
-          <a:stretch>
-            <a:fillRect/>
-          </a:stretch>
-        </p:blipFill>
-        <p:spPr>
-          <a:xfrm>
-            <a:off x="0" y="0"/>
-            <a:ext cx="5123809" cy="6657143"/>
-          </a:xfrm>
-          <a:prstGeom prst="rect">
-            <a:avLst/>
-          </a:prstGeom>
-        </p:spPr>
-      </p:pic>
-      <p:pic>
-        <p:nvPicPr>
-          <p:cNvPr id="5" name="Image 4">
-            <a:extLst>
-              <a:ext uri="{FF2B5EF4-FFF2-40B4-BE49-F238E27FC236}">
-                <a16:creationId xmlns:a16="http://schemas.microsoft.com/office/drawing/2014/main" id="{611D7F73-2D64-4D57-8FDA-9164D88570DA}"/>
-              </a:ext>
-            </a:extLst>
-          </p:cNvPr>
-          <p:cNvPicPr>
-            <a:picLocks noChangeAspect="1"/>
-          </p:cNvPicPr>
-          <p:nvPr/>
-        </p:nvPicPr>
-        <p:blipFill>
-          <a:blip r:embed="rId3"/>
-          <a:stretch>
-            <a:fillRect/>
-          </a:stretch>
-        </p:blipFill>
-        <p:spPr>
-          <a:xfrm>
-            <a:off x="6379001" y="2485491"/>
-            <a:ext cx="3896269" cy="1686160"/>
-          </a:xfrm>
-          <a:prstGeom prst="rect">
-            <a:avLst/>
-          </a:prstGeom>
-        </p:spPr>
-      </p:pic>
+      <p:sp>
+        <p:nvSpPr>
+          <p:cNvPr id="2" name="Titre 1">
+            <a:extLst>
+              <a:ext uri="{FF2B5EF4-FFF2-40B4-BE49-F238E27FC236}">
+                <a16:creationId xmlns:a16="http://schemas.microsoft.com/office/drawing/2014/main" id="{42EC595B-F242-4543-A4EB-D42B84EE2613}"/>
+              </a:ext>
+            </a:extLst>
+          </p:cNvPr>
+          <p:cNvSpPr>
+            <a:spLocks noGrp="1"/>
+          </p:cNvSpPr>
+          <p:nvPr>
+            <p:ph type="title"/>
+          </p:nvPr>
+        </p:nvSpPr>
+        <p:spPr/>
+        <p:txBody>
+          <a:bodyPr/>
+          <a:lstStyle/>
+          <a:p>
+            <a:pPr algn="ctr"/>
+            <a:r>
+              <a:rPr lang="fr-FR" dirty="0"/>
+              <a:t>Les contraintes</a:t>
+            </a:r>
+          </a:p>
+        </p:txBody>
+      </p:sp>
+      <p:sp>
+        <p:nvSpPr>
+          <p:cNvPr id="3" name="Espace réservé du contenu 2">
+            <a:extLst>
+              <a:ext uri="{FF2B5EF4-FFF2-40B4-BE49-F238E27FC236}">
+                <a16:creationId xmlns:a16="http://schemas.microsoft.com/office/drawing/2014/main" id="{15EDCA51-41BE-49FE-A2C4-320E6D755AA5}"/>
+              </a:ext>
+            </a:extLst>
+          </p:cNvPr>
+          <p:cNvSpPr>
+            <a:spLocks noGrp="1"/>
+          </p:cNvSpPr>
+          <p:nvPr>
+            <p:ph idx="1"/>
+          </p:nvPr>
+        </p:nvSpPr>
+        <p:spPr/>
+        <p:txBody>
+          <a:bodyPr/>
+          <a:lstStyle/>
+          <a:p>
+            <a:pPr>
+              <a:spcBef>
+                <a:spcPts val="600"/>
+              </a:spcBef>
+              <a:buFont typeface="Wingdings" panose="05000000000000000000" pitchFamily="2" charset="2"/>
+              <a:buChar char="Ø"/>
+            </a:pPr>
+            <a:r>
+              <a:rPr lang="fr-FR" dirty="0"/>
+              <a:t> utilisation </a:t>
+            </a:r>
+            <a:r>
+              <a:rPr lang="fr-FR" dirty="0" err="1"/>
+              <a:t>d’eclipse</a:t>
+            </a:r>
+            <a:r>
+              <a:rPr lang="fr-FR" dirty="0"/>
+              <a:t> et de Git flow</a:t>
+            </a:r>
+          </a:p>
+          <a:p>
+            <a:pPr>
+              <a:spcBef>
+                <a:spcPts val="600"/>
+              </a:spcBef>
+              <a:buFont typeface="Wingdings" panose="05000000000000000000" pitchFamily="2" charset="2"/>
+              <a:buChar char="Ø"/>
+            </a:pPr>
+            <a:r>
+              <a:rPr lang="fr-FR" dirty="0"/>
+              <a:t> langue anglaise pour le code et les données </a:t>
+            </a:r>
+          </a:p>
+          <a:p>
+            <a:pPr>
+              <a:spcBef>
+                <a:spcPts val="600"/>
+              </a:spcBef>
+              <a:buFont typeface="Wingdings" panose="05000000000000000000" pitchFamily="2" charset="2"/>
+              <a:buChar char="Ø"/>
+            </a:pPr>
+            <a:r>
+              <a:rPr lang="fr-FR" dirty="0"/>
+              <a:t> code initial à récupérer sur un repository </a:t>
+            </a:r>
+          </a:p>
+          <a:p>
+            <a:pPr>
+              <a:spcBef>
+                <a:spcPts val="600"/>
+              </a:spcBef>
+              <a:buFont typeface="Wingdings" panose="05000000000000000000" pitchFamily="2" charset="2"/>
+              <a:buChar char="Ø"/>
+            </a:pPr>
+            <a:r>
+              <a:rPr lang="fr-FR" dirty="0"/>
+              <a:t> réécrire code simple et lisible</a:t>
+            </a:r>
+          </a:p>
+          <a:p>
+            <a:pPr>
+              <a:spcBef>
+                <a:spcPts val="600"/>
+              </a:spcBef>
+              <a:buFont typeface="Wingdings" panose="05000000000000000000" pitchFamily="2" charset="2"/>
+              <a:buChar char="Ø"/>
+            </a:pPr>
+            <a:r>
+              <a:rPr lang="fr-FR" dirty="0"/>
+              <a:t> le code doit être réutilisable quelque soit le nombre de symptôme</a:t>
+            </a:r>
+          </a:p>
+          <a:p>
+            <a:pPr>
+              <a:spcBef>
+                <a:spcPts val="600"/>
+              </a:spcBef>
+              <a:buFont typeface="Wingdings" panose="05000000000000000000" pitchFamily="2" charset="2"/>
+              <a:buChar char="Ø"/>
+            </a:pPr>
+            <a:r>
+              <a:rPr lang="fr-FR" dirty="0"/>
+              <a:t> traitement des exceptions</a:t>
+            </a:r>
+          </a:p>
+          <a:p>
+            <a:pPr>
+              <a:spcBef>
+                <a:spcPts val="600"/>
+              </a:spcBef>
+              <a:buFont typeface="Wingdings" panose="05000000000000000000" pitchFamily="2" charset="2"/>
+              <a:buChar char="Ø"/>
+            </a:pPr>
+            <a:r>
+              <a:rPr lang="fr-FR" dirty="0"/>
+              <a:t> fermeture des ressources</a:t>
+            </a:r>
+          </a:p>
+          <a:p>
+            <a:pPr>
+              <a:spcBef>
+                <a:spcPts val="600"/>
+              </a:spcBef>
+              <a:buFont typeface="Wingdings" panose="05000000000000000000" pitchFamily="2" charset="2"/>
+              <a:buChar char="Ø"/>
+            </a:pPr>
+            <a:r>
+              <a:rPr lang="fr-FR" dirty="0"/>
+              <a:t> symptom.txt est le fichier à lire</a:t>
+            </a:r>
+          </a:p>
+          <a:p>
+            <a:pPr>
+              <a:spcBef>
+                <a:spcPts val="600"/>
+              </a:spcBef>
+              <a:buFont typeface="Wingdings" panose="05000000000000000000" pitchFamily="2" charset="2"/>
+              <a:buChar char="Ø"/>
+            </a:pPr>
+            <a:r>
+              <a:rPr lang="fr-FR" dirty="0"/>
+              <a:t> code documenté : </a:t>
+            </a:r>
+            <a:r>
+              <a:rPr lang="fr-FR" dirty="0" err="1"/>
+              <a:t>JavaDoc</a:t>
+            </a:r>
+            <a:r>
+              <a:rPr lang="fr-FR" dirty="0"/>
+              <a:t> et commentaires utiles</a:t>
+            </a:r>
+          </a:p>
+          <a:p>
+            <a:pPr>
+              <a:buFont typeface="Wingdings" panose="05000000000000000000" pitchFamily="2" charset="2"/>
+              <a:buChar char="Ø"/>
+            </a:pPr>
+            <a:endParaRPr lang="fr-FR" dirty="0"/>
+          </a:p>
+          <a:p>
+            <a:pPr>
+              <a:buFont typeface="Wingdings" panose="05000000000000000000" pitchFamily="2" charset="2"/>
+              <a:buChar char="Ø"/>
+            </a:pPr>
+            <a:endParaRPr lang="fr-FR" dirty="0"/>
+          </a:p>
+        </p:txBody>
+      </p:sp>
     </p:spTree>
     <p:extLst>
       <p:ext uri="{BB962C8B-B14F-4D97-AF65-F5344CB8AC3E}">
-        <p14:creationId xmlns:p14="http://schemas.microsoft.com/office/powerpoint/2010/main" val="537034982"/>
+        <p14:creationId xmlns:p14="http://schemas.microsoft.com/office/powerpoint/2010/main" val="2643357192"/>
       </p:ext>
     </p:extLst>
   </p:cSld>
@@ -4319,181 +4181,12 @@
           <a:chExt cx="0" cy="0"/>
         </a:xfrm>
       </p:grpSpPr>
-      <p:sp>
-        <p:nvSpPr>
-          <p:cNvPr id="3" name="ZoneTexte 2">
-            <a:extLst>
-              <a:ext uri="{FF2B5EF4-FFF2-40B4-BE49-F238E27FC236}">
-                <a16:creationId xmlns:a16="http://schemas.microsoft.com/office/drawing/2014/main" id="{FD864966-30FC-47AE-BEFC-0E4D454A281E}"/>
-              </a:ext>
-            </a:extLst>
-          </p:cNvPr>
-          <p:cNvSpPr txBox="1"/>
-          <p:nvPr/>
-        </p:nvSpPr>
-        <p:spPr>
-          <a:xfrm>
-            <a:off x="402336" y="448056"/>
-            <a:ext cx="9809096" cy="646331"/>
-          </a:xfrm>
-          <a:prstGeom prst="rect">
-            <a:avLst/>
-          </a:prstGeom>
-          <a:noFill/>
-        </p:spPr>
-        <p:txBody>
-          <a:bodyPr wrap="none" rtlCol="0">
-            <a:spAutoFit/>
-          </a:bodyPr>
-          <a:lstStyle/>
-          <a:p>
-            <a:r>
-              <a:rPr lang="en-US" sz="1800" dirty="0" err="1">
-                <a:solidFill>
-                  <a:srgbClr val="000000"/>
-                </a:solidFill>
-                <a:latin typeface="Consolas" panose="020B0609020204030204" pitchFamily="49" charset="0"/>
-              </a:rPr>
-              <a:t>BufferedReader</a:t>
-            </a:r>
-            <a:r>
-              <a:rPr lang="en-US" sz="1800" dirty="0">
-                <a:solidFill>
-                  <a:srgbClr val="000000"/>
-                </a:solidFill>
-                <a:latin typeface="Consolas" panose="020B0609020204030204" pitchFamily="49" charset="0"/>
-              </a:rPr>
-              <a:t> </a:t>
-            </a:r>
-            <a:r>
-              <a:rPr lang="en-US" sz="1800" u="sng" dirty="0">
-                <a:solidFill>
-                  <a:srgbClr val="6A3E3E"/>
-                </a:solidFill>
-                <a:latin typeface="Consolas" panose="020B0609020204030204" pitchFamily="49" charset="0"/>
-              </a:rPr>
-              <a:t>reader</a:t>
-            </a:r>
-            <a:r>
-              <a:rPr lang="en-US" sz="1800" u="sng" dirty="0">
-                <a:solidFill>
-                  <a:srgbClr val="000000"/>
-                </a:solidFill>
-                <a:latin typeface="Consolas" panose="020B0609020204030204" pitchFamily="49" charset="0"/>
-              </a:rPr>
-              <a:t> = </a:t>
-            </a:r>
-            <a:r>
-              <a:rPr lang="en-US" sz="1800" b="1" u="sng" dirty="0">
-                <a:solidFill>
-                  <a:srgbClr val="7F0055"/>
-                </a:solidFill>
-                <a:latin typeface="Consolas" panose="020B0609020204030204" pitchFamily="49" charset="0"/>
-              </a:rPr>
-              <a:t>new</a:t>
-            </a:r>
-            <a:r>
-              <a:rPr lang="en-US" sz="1800" b="1" u="sng" dirty="0">
-                <a:solidFill>
-                  <a:srgbClr val="000000"/>
-                </a:solidFill>
-                <a:latin typeface="Consolas" panose="020B0609020204030204" pitchFamily="49" charset="0"/>
-              </a:rPr>
-              <a:t> </a:t>
-            </a:r>
-            <a:r>
-              <a:rPr lang="en-US" sz="1800" b="1" u="sng" dirty="0" err="1">
-                <a:solidFill>
-                  <a:srgbClr val="000000"/>
-                </a:solidFill>
-                <a:latin typeface="Consolas" panose="020B0609020204030204" pitchFamily="49" charset="0"/>
-              </a:rPr>
-              <a:t>BufferedReader</a:t>
-            </a:r>
-            <a:r>
-              <a:rPr lang="en-US" sz="1800" b="1" u="sng" dirty="0">
-                <a:solidFill>
-                  <a:srgbClr val="000000"/>
-                </a:solidFill>
-                <a:latin typeface="Consolas" panose="020B0609020204030204" pitchFamily="49" charset="0"/>
-              </a:rPr>
-              <a:t> (</a:t>
-            </a:r>
-            <a:r>
-              <a:rPr lang="en-US" sz="1800" b="1" u="sng" dirty="0">
-                <a:solidFill>
-                  <a:srgbClr val="7F0055"/>
-                </a:solidFill>
-                <a:latin typeface="Consolas" panose="020B0609020204030204" pitchFamily="49" charset="0"/>
-              </a:rPr>
-              <a:t>new</a:t>
-            </a:r>
-            <a:r>
-              <a:rPr lang="en-US" sz="1800" b="1" u="sng" dirty="0">
-                <a:solidFill>
-                  <a:srgbClr val="000000"/>
-                </a:solidFill>
-                <a:latin typeface="Consolas" panose="020B0609020204030204" pitchFamily="49" charset="0"/>
-              </a:rPr>
-              <a:t> </a:t>
-            </a:r>
-            <a:r>
-              <a:rPr lang="en-US" sz="1800" b="1" u="sng" dirty="0" err="1">
-                <a:solidFill>
-                  <a:srgbClr val="000000"/>
-                </a:solidFill>
-                <a:latin typeface="Consolas" panose="020B0609020204030204" pitchFamily="49" charset="0"/>
-              </a:rPr>
-              <a:t>FileReader</a:t>
-            </a:r>
-            <a:r>
-              <a:rPr lang="en-US" sz="1800" b="1" u="sng" dirty="0">
-                <a:solidFill>
-                  <a:srgbClr val="000000"/>
-                </a:solidFill>
-                <a:latin typeface="Consolas" panose="020B0609020204030204" pitchFamily="49" charset="0"/>
-              </a:rPr>
-              <a:t>(</a:t>
-            </a:r>
-            <a:r>
-              <a:rPr lang="en-US" sz="1800" b="1" u="sng" dirty="0">
-                <a:solidFill>
-                  <a:srgbClr val="2A00FF"/>
-                </a:solidFill>
-                <a:latin typeface="Consolas" panose="020B0609020204030204" pitchFamily="49" charset="0"/>
-              </a:rPr>
-              <a:t>"symptoms.txt"</a:t>
-            </a:r>
-            <a:r>
-              <a:rPr lang="en-US" sz="1800" b="1" u="sng" dirty="0">
-                <a:solidFill>
-                  <a:srgbClr val="000000"/>
-                </a:solidFill>
-                <a:latin typeface="Consolas" panose="020B0609020204030204" pitchFamily="49" charset="0"/>
-              </a:rPr>
-              <a:t>));</a:t>
-            </a:r>
-          </a:p>
-          <a:p>
-            <a:r>
-              <a:rPr lang="fr-FR" sz="1800" dirty="0">
-                <a:solidFill>
-                  <a:srgbClr val="FF0000"/>
-                </a:solidFill>
-                <a:latin typeface="Consolas" panose="020B0609020204030204" pitchFamily="49" charset="0"/>
-              </a:rPr>
-              <a:t>symptoms.txt (Le fichier spécifié est introuvable)</a:t>
-            </a:r>
-            <a:endParaRPr lang="fr-FR" dirty="0"/>
-          </a:p>
-        </p:txBody>
-      </p:sp>
       <p:pic>
         <p:nvPicPr>
-          <p:cNvPr id="11" name="Image 10">
-            <a:extLst>
-              <a:ext uri="{FF2B5EF4-FFF2-40B4-BE49-F238E27FC236}">
-                <a16:creationId xmlns:a16="http://schemas.microsoft.com/office/drawing/2014/main" id="{C58B9377-18C8-4244-B90C-0C130726C80F}"/>
+          <p:cNvPr id="15" name="Image 14">
+            <a:extLst>
+              <a:ext uri="{FF2B5EF4-FFF2-40B4-BE49-F238E27FC236}">
+                <a16:creationId xmlns:a16="http://schemas.microsoft.com/office/drawing/2014/main" id="{37A43F00-E365-4C73-A8B0-806408C80B66}"/>
               </a:ext>
             </a:extLst>
           </p:cNvPr>
@@ -4510,8 +4203,8 @@
         </p:blipFill>
         <p:spPr>
           <a:xfrm>
-            <a:off x="402336" y="1281112"/>
-            <a:ext cx="3409950" cy="638175"/>
+            <a:off x="7565838" y="2405062"/>
+            <a:ext cx="3838575" cy="2047875"/>
           </a:xfrm>
           <a:prstGeom prst="rect">
             <a:avLst/>
@@ -4520,10 +4213,10 @@
       </p:pic>
       <p:sp>
         <p:nvSpPr>
-          <p:cNvPr id="12" name="ZoneTexte 11">
-            <a:extLst>
-              <a:ext uri="{FF2B5EF4-FFF2-40B4-BE49-F238E27FC236}">
-                <a16:creationId xmlns:a16="http://schemas.microsoft.com/office/drawing/2014/main" id="{DAD15A49-815E-4ACD-96D9-68B051A932A5}"/>
+          <p:cNvPr id="16" name="ZoneTexte 15">
+            <a:extLst>
+              <a:ext uri="{FF2B5EF4-FFF2-40B4-BE49-F238E27FC236}">
+                <a16:creationId xmlns:a16="http://schemas.microsoft.com/office/drawing/2014/main" id="{9B51C028-58AD-4B1D-8D92-636A6BB32CEB}"/>
               </a:ext>
             </a:extLst>
           </p:cNvPr>
@@ -4532,8 +4225,8 @@
         </p:nvSpPr>
         <p:spPr>
           <a:xfrm>
-            <a:off x="4270249" y="1094387"/>
-            <a:ext cx="7519415" cy="1200329"/>
+            <a:off x="402336" y="5773531"/>
+            <a:ext cx="7452360" cy="369332"/>
           </a:xfrm>
           <a:prstGeom prst="rect">
             <a:avLst/>
@@ -4547,196 +4240,24 @@
           <a:lstStyle/>
           <a:p>
             <a:r>
-              <a:rPr lang="en-US" dirty="0"/>
-              <a:t>By default the classes in the java.io package always resolve relative pathnames against the current user directory. This directory is named by the system property </a:t>
-            </a:r>
-            <a:r>
-              <a:rPr lang="en-US" dirty="0">
-                <a:highlight>
-                  <a:srgbClr val="FFFF00"/>
-                </a:highlight>
-              </a:rPr>
-              <a:t>user.dir</a:t>
-            </a:r>
-            <a:r>
-              <a:rPr lang="en-US" dirty="0"/>
-              <a:t>, and is typically the directory in which the Java virtual machine was invoked.</a:t>
-            </a:r>
-            <a:endParaRPr lang="fr-FR" dirty="0"/>
-          </a:p>
-        </p:txBody>
-      </p:sp>
-      <p:sp>
-        <p:nvSpPr>
-          <p:cNvPr id="13" name="ZoneTexte 12">
-            <a:extLst>
-              <a:ext uri="{FF2B5EF4-FFF2-40B4-BE49-F238E27FC236}">
-                <a16:creationId xmlns:a16="http://schemas.microsoft.com/office/drawing/2014/main" id="{C866E660-53DC-43A7-8F25-3DECC4693802}"/>
-              </a:ext>
-            </a:extLst>
-          </p:cNvPr>
-          <p:cNvSpPr txBox="1"/>
-          <p:nvPr/>
-        </p:nvSpPr>
-        <p:spPr>
-          <a:xfrm>
-            <a:off x="402336" y="2825496"/>
-            <a:ext cx="5883342" cy="923330"/>
-          </a:xfrm>
-          <a:prstGeom prst="rect">
-            <a:avLst/>
-          </a:prstGeom>
-          <a:noFill/>
-        </p:spPr>
-        <p:txBody>
-          <a:bodyPr wrap="none" rtlCol="0">
-            <a:spAutoFit/>
-          </a:bodyPr>
-          <a:lstStyle/>
-          <a:p>
-            <a:pPr algn="l"/>
-            <a:r>
               <a:rPr lang="en-US" sz="1800" dirty="0">
                 <a:solidFill>
                   <a:srgbClr val="000000"/>
                 </a:solidFill>
                 <a:latin typeface="Consolas" panose="020B0609020204030204" pitchFamily="49" charset="0"/>
               </a:rPr>
-              <a:t>String </a:t>
-            </a:r>
-            <a:r>
-              <a:rPr lang="en-US" sz="1800" dirty="0">
-                <a:solidFill>
-                  <a:srgbClr val="6A3E3E"/>
-                </a:solidFill>
-                <a:latin typeface="Consolas" panose="020B0609020204030204" pitchFamily="49" charset="0"/>
-              </a:rPr>
-              <a:t>path</a:t>
-            </a:r>
-            <a:r>
-              <a:rPr lang="en-US" sz="1800" dirty="0">
-                <a:solidFill>
-                  <a:srgbClr val="000000"/>
-                </a:solidFill>
-                <a:latin typeface="Consolas" panose="020B0609020204030204" pitchFamily="49" charset="0"/>
-              </a:rPr>
-              <a:t> = </a:t>
-            </a:r>
-            <a:r>
-              <a:rPr lang="en-US" sz="1800" dirty="0" err="1">
-                <a:solidFill>
-                  <a:srgbClr val="000000"/>
-                </a:solidFill>
-                <a:latin typeface="Consolas" panose="020B0609020204030204" pitchFamily="49" charset="0"/>
-              </a:rPr>
-              <a:t>System.</a:t>
-            </a:r>
-            <a:r>
-              <a:rPr lang="en-US" sz="1800" i="1" dirty="0" err="1">
-                <a:solidFill>
-                  <a:srgbClr val="000000"/>
-                </a:solidFill>
-                <a:latin typeface="Consolas" panose="020B0609020204030204" pitchFamily="49" charset="0"/>
-              </a:rPr>
-              <a:t>getProperty</a:t>
-            </a:r>
-            <a:r>
-              <a:rPr lang="en-US" sz="1800" i="1" dirty="0">
-                <a:solidFill>
-                  <a:srgbClr val="000000"/>
-                </a:solidFill>
-                <a:latin typeface="Consolas" panose="020B0609020204030204" pitchFamily="49" charset="0"/>
-              </a:rPr>
-              <a:t>(</a:t>
-            </a:r>
-            <a:r>
-              <a:rPr lang="en-US" sz="1800" i="1" dirty="0">
-                <a:solidFill>
-                  <a:srgbClr val="2A00FF"/>
-                </a:solidFill>
-                <a:latin typeface="Consolas" panose="020B0609020204030204" pitchFamily="49" charset="0"/>
-              </a:rPr>
-              <a:t>"user.dir"</a:t>
-            </a:r>
-            <a:r>
-              <a:rPr lang="en-US" sz="1800" i="1" dirty="0">
-                <a:solidFill>
-                  <a:srgbClr val="000000"/>
-                </a:solidFill>
-                <a:latin typeface="Consolas" panose="020B0609020204030204" pitchFamily="49" charset="0"/>
-              </a:rPr>
-              <a:t>);</a:t>
-            </a:r>
-          </a:p>
-          <a:p>
-            <a:pPr algn="l"/>
-            <a:r>
-              <a:rPr lang="fr-FR" sz="1800" dirty="0" err="1">
-                <a:solidFill>
-                  <a:srgbClr val="000000"/>
-                </a:solidFill>
-                <a:latin typeface="Consolas" panose="020B0609020204030204" pitchFamily="49" charset="0"/>
-              </a:rPr>
-              <a:t>System.</a:t>
-            </a:r>
-            <a:r>
-              <a:rPr lang="fr-FR" sz="1800" b="1" i="1" dirty="0" err="1">
-                <a:solidFill>
-                  <a:srgbClr val="0000C0"/>
-                </a:solidFill>
-                <a:latin typeface="Consolas" panose="020B0609020204030204" pitchFamily="49" charset="0"/>
-              </a:rPr>
-              <a:t>out</a:t>
-            </a:r>
-            <a:r>
-              <a:rPr lang="fr-FR" sz="1800" b="1" i="1" dirty="0" err="1">
-                <a:solidFill>
-                  <a:srgbClr val="000000"/>
-                </a:solidFill>
-                <a:latin typeface="Consolas" panose="020B0609020204030204" pitchFamily="49" charset="0"/>
-              </a:rPr>
-              <a:t>.println</a:t>
-            </a:r>
-            <a:r>
-              <a:rPr lang="fr-FR" sz="1800" b="1" i="1" dirty="0">
-                <a:solidFill>
-                  <a:srgbClr val="000000"/>
-                </a:solidFill>
-                <a:latin typeface="Consolas" panose="020B0609020204030204" pitchFamily="49" charset="0"/>
-              </a:rPr>
-              <a:t>(</a:t>
-            </a:r>
-            <a:r>
-              <a:rPr lang="fr-FR" sz="1800" b="1" i="1" dirty="0" err="1">
-                <a:solidFill>
-                  <a:srgbClr val="6A3E3E"/>
-                </a:solidFill>
-                <a:latin typeface="Consolas" panose="020B0609020204030204" pitchFamily="49" charset="0"/>
-              </a:rPr>
-              <a:t>path</a:t>
-            </a:r>
-            <a:r>
-              <a:rPr lang="fr-FR" sz="1800" b="1" i="1" dirty="0">
-                <a:solidFill>
-                  <a:srgbClr val="000000"/>
-                </a:solidFill>
-                <a:latin typeface="Consolas" panose="020B0609020204030204" pitchFamily="49" charset="0"/>
-              </a:rPr>
-              <a:t>);</a:t>
-            </a:r>
-          </a:p>
-          <a:p>
-            <a:pPr algn="l"/>
+              <a:t> </a:t>
+            </a:r>
             <a:endParaRPr lang="fr-FR" dirty="0"/>
           </a:p>
         </p:txBody>
       </p:sp>
       <p:pic>
         <p:nvPicPr>
-          <p:cNvPr id="15" name="Image 14">
-            <a:extLst>
-              <a:ext uri="{FF2B5EF4-FFF2-40B4-BE49-F238E27FC236}">
-                <a16:creationId xmlns:a16="http://schemas.microsoft.com/office/drawing/2014/main" id="{37A43F00-E365-4C73-A8B0-806408C80B66}"/>
+          <p:cNvPr id="18" name="Image 17">
+            <a:extLst>
+              <a:ext uri="{FF2B5EF4-FFF2-40B4-BE49-F238E27FC236}">
+                <a16:creationId xmlns:a16="http://schemas.microsoft.com/office/drawing/2014/main" id="{4A78C9B5-54B7-424F-9051-2A52073F18E5}"/>
               </a:ext>
             </a:extLst>
           </p:cNvPr>
@@ -4753,150 +4274,7 @@
         </p:blipFill>
         <p:spPr>
           <a:xfrm>
-            <a:off x="7102792" y="2145900"/>
-            <a:ext cx="3838575" cy="2047875"/>
-          </a:xfrm>
-          <a:prstGeom prst="rect">
-            <a:avLst/>
-          </a:prstGeom>
-        </p:spPr>
-      </p:pic>
-      <p:sp>
-        <p:nvSpPr>
-          <p:cNvPr id="16" name="ZoneTexte 15">
-            <a:extLst>
-              <a:ext uri="{FF2B5EF4-FFF2-40B4-BE49-F238E27FC236}">
-                <a16:creationId xmlns:a16="http://schemas.microsoft.com/office/drawing/2014/main" id="{9B51C028-58AD-4B1D-8D92-636A6BB32CEB}"/>
-              </a:ext>
-            </a:extLst>
-          </p:cNvPr>
-          <p:cNvSpPr txBox="1"/>
-          <p:nvPr/>
-        </p:nvSpPr>
-        <p:spPr>
-          <a:xfrm>
-            <a:off x="301752" y="4539889"/>
-            <a:ext cx="7452360" cy="369332"/>
-          </a:xfrm>
-          <a:prstGeom prst="rect">
-            <a:avLst/>
-          </a:prstGeom>
-          <a:noFill/>
-        </p:spPr>
-        <p:txBody>
-          <a:bodyPr wrap="square" rtlCol="0">
-            <a:spAutoFit/>
-          </a:bodyPr>
-          <a:lstStyle/>
-          <a:p>
-            <a:r>
-              <a:rPr lang="en-US" sz="1800" dirty="0">
-                <a:solidFill>
-                  <a:srgbClr val="000000"/>
-                </a:solidFill>
-                <a:latin typeface="Consolas" panose="020B0609020204030204" pitchFamily="49" charset="0"/>
-              </a:rPr>
-              <a:t> (</a:t>
-            </a:r>
-            <a:r>
-              <a:rPr lang="en-US" sz="1800" b="1" dirty="0">
-                <a:solidFill>
-                  <a:srgbClr val="7F0055"/>
-                </a:solidFill>
-                <a:latin typeface="Consolas" panose="020B0609020204030204" pitchFamily="49" charset="0"/>
-              </a:rPr>
-              <a:t>new</a:t>
-            </a:r>
-            <a:r>
-              <a:rPr lang="en-US" sz="1800" b="1" dirty="0">
-                <a:solidFill>
-                  <a:srgbClr val="000000"/>
-                </a:solidFill>
-                <a:latin typeface="Consolas" panose="020B0609020204030204" pitchFamily="49" charset="0"/>
-              </a:rPr>
-              <a:t> </a:t>
-            </a:r>
-            <a:r>
-              <a:rPr lang="en-US" sz="1800" b="1" dirty="0" err="1">
-                <a:solidFill>
-                  <a:srgbClr val="000000"/>
-                </a:solidFill>
-                <a:latin typeface="Consolas" panose="020B0609020204030204" pitchFamily="49" charset="0"/>
-              </a:rPr>
-              <a:t>FileReader</a:t>
-            </a:r>
-            <a:r>
-              <a:rPr lang="en-US" sz="1800" b="1" dirty="0">
-                <a:solidFill>
-                  <a:srgbClr val="000000"/>
-                </a:solidFill>
-                <a:latin typeface="Consolas" panose="020B0609020204030204" pitchFamily="49" charset="0"/>
-              </a:rPr>
-              <a:t>(</a:t>
-            </a:r>
-            <a:r>
-              <a:rPr lang="en-US" sz="1800" b="1" dirty="0">
-                <a:solidFill>
-                  <a:srgbClr val="6A3E3E"/>
-                </a:solidFill>
-                <a:latin typeface="Consolas" panose="020B0609020204030204" pitchFamily="49" charset="0"/>
-              </a:rPr>
-              <a:t>path</a:t>
-            </a:r>
-            <a:r>
-              <a:rPr lang="en-US" sz="1800" b="1" dirty="0">
-                <a:solidFill>
-                  <a:srgbClr val="000000"/>
-                </a:solidFill>
-                <a:latin typeface="Consolas" panose="020B0609020204030204" pitchFamily="49" charset="0"/>
-              </a:rPr>
-              <a:t>+</a:t>
-            </a:r>
-            <a:r>
-              <a:rPr lang="en-US" sz="1800" b="1" dirty="0">
-                <a:solidFill>
-                  <a:srgbClr val="2A00FF"/>
-                </a:solidFill>
-                <a:latin typeface="Consolas" panose="020B0609020204030204" pitchFamily="49" charset="0"/>
-              </a:rPr>
-              <a:t>"/Project02Eclipse/symptoms.txt"</a:t>
-            </a:r>
-            <a:r>
-              <a:rPr lang="en-US" sz="1800" b="1" dirty="0">
-                <a:solidFill>
-                  <a:srgbClr val="000000"/>
-                </a:solidFill>
-                <a:latin typeface="Consolas" panose="020B0609020204030204" pitchFamily="49" charset="0"/>
-              </a:rPr>
-              <a:t>));</a:t>
-            </a:r>
-            <a:endParaRPr lang="fr-FR" dirty="0"/>
-          </a:p>
-        </p:txBody>
-      </p:sp>
-      <p:pic>
-        <p:nvPicPr>
-          <p:cNvPr id="18" name="Image 17">
-            <a:extLst>
-              <a:ext uri="{FF2B5EF4-FFF2-40B4-BE49-F238E27FC236}">
-                <a16:creationId xmlns:a16="http://schemas.microsoft.com/office/drawing/2014/main" id="{4A78C9B5-54B7-424F-9051-2A52073F18E5}"/>
-              </a:ext>
-            </a:extLst>
-          </p:cNvPr>
-          <p:cNvPicPr>
-            <a:picLocks noChangeAspect="1"/>
-          </p:cNvPicPr>
-          <p:nvPr/>
-        </p:nvPicPr>
-        <p:blipFill>
-          <a:blip r:embed="rId4"/>
-          <a:stretch>
-            <a:fillRect/>
-          </a:stretch>
-        </p:blipFill>
-        <p:spPr>
-          <a:xfrm>
-            <a:off x="9082719" y="4238244"/>
+            <a:off x="7565838" y="4686300"/>
             <a:ext cx="2257425" cy="2171700"/>
           </a:xfrm>
           <a:prstGeom prst="rect">
@@ -4904,6 +4282,572 @@
           </a:prstGeom>
         </p:spPr>
       </p:pic>
+      <p:sp>
+        <p:nvSpPr>
+          <p:cNvPr id="7" name="ZoneTexte 6">
+            <a:extLst>
+              <a:ext uri="{FF2B5EF4-FFF2-40B4-BE49-F238E27FC236}">
+                <a16:creationId xmlns:a16="http://schemas.microsoft.com/office/drawing/2014/main" id="{A8863757-63B1-4153-983D-CE35976DB629}"/>
+              </a:ext>
+            </a:extLst>
+          </p:cNvPr>
+          <p:cNvSpPr txBox="1"/>
+          <p:nvPr/>
+        </p:nvSpPr>
+        <p:spPr>
+          <a:xfrm>
+            <a:off x="402336" y="323961"/>
+            <a:ext cx="11286744" cy="4708981"/>
+          </a:xfrm>
+          <a:prstGeom prst="rect">
+            <a:avLst/>
+          </a:prstGeom>
+          <a:noFill/>
+        </p:spPr>
+        <p:txBody>
+          <a:bodyPr wrap="square" rtlCol="0">
+            <a:spAutoFit/>
+          </a:bodyPr>
+          <a:lstStyle/>
+          <a:p>
+            <a:pPr>
+              <a:spcAft>
+                <a:spcPts val="600"/>
+              </a:spcAft>
+            </a:pPr>
+            <a:r>
+              <a:rPr lang="fr-FR" sz="2400" dirty="0"/>
+              <a:t>Test du code original :</a:t>
+            </a:r>
+          </a:p>
+          <a:p>
+            <a:r>
+              <a:rPr lang="en-US" dirty="0" err="1">
+                <a:solidFill>
+                  <a:srgbClr val="000000"/>
+                </a:solidFill>
+                <a:latin typeface="Consolas" panose="020B0609020204030204" pitchFamily="49" charset="0"/>
+              </a:rPr>
+              <a:t>BufferedReader</a:t>
+            </a:r>
+            <a:r>
+              <a:rPr lang="en-US" dirty="0">
+                <a:solidFill>
+                  <a:srgbClr val="000000"/>
+                </a:solidFill>
+                <a:latin typeface="Consolas" panose="020B0609020204030204" pitchFamily="49" charset="0"/>
+              </a:rPr>
+              <a:t> </a:t>
+            </a:r>
+            <a:r>
+              <a:rPr lang="en-US" u="sng" dirty="0">
+                <a:solidFill>
+                  <a:srgbClr val="6A3E3E"/>
+                </a:solidFill>
+                <a:latin typeface="Consolas" panose="020B0609020204030204" pitchFamily="49" charset="0"/>
+              </a:rPr>
+              <a:t>reader</a:t>
+            </a:r>
+            <a:r>
+              <a:rPr lang="en-US" u="sng" dirty="0">
+                <a:solidFill>
+                  <a:srgbClr val="000000"/>
+                </a:solidFill>
+                <a:latin typeface="Consolas" panose="020B0609020204030204" pitchFamily="49" charset="0"/>
+              </a:rPr>
+              <a:t> = </a:t>
+            </a:r>
+            <a:r>
+              <a:rPr lang="en-US" b="1" u="sng" dirty="0">
+                <a:solidFill>
+                  <a:srgbClr val="7F0055"/>
+                </a:solidFill>
+                <a:latin typeface="Consolas" panose="020B0609020204030204" pitchFamily="49" charset="0"/>
+              </a:rPr>
+              <a:t>new</a:t>
+            </a:r>
+            <a:r>
+              <a:rPr lang="en-US" b="1" u="sng" dirty="0">
+                <a:solidFill>
+                  <a:srgbClr val="000000"/>
+                </a:solidFill>
+                <a:latin typeface="Consolas" panose="020B0609020204030204" pitchFamily="49" charset="0"/>
+              </a:rPr>
+              <a:t> </a:t>
+            </a:r>
+            <a:r>
+              <a:rPr lang="en-US" b="1" u="sng" dirty="0" err="1">
+                <a:solidFill>
+                  <a:srgbClr val="000000"/>
+                </a:solidFill>
+                <a:latin typeface="Consolas" panose="020B0609020204030204" pitchFamily="49" charset="0"/>
+              </a:rPr>
+              <a:t>BufferedReader</a:t>
+            </a:r>
+            <a:r>
+              <a:rPr lang="en-US" b="1" u="sng" dirty="0">
+                <a:solidFill>
+                  <a:srgbClr val="000000"/>
+                </a:solidFill>
+                <a:latin typeface="Consolas" panose="020B0609020204030204" pitchFamily="49" charset="0"/>
+              </a:rPr>
+              <a:t> (</a:t>
+            </a:r>
+            <a:r>
+              <a:rPr lang="en-US" b="1" u="sng" dirty="0">
+                <a:solidFill>
+                  <a:srgbClr val="7F0055"/>
+                </a:solidFill>
+                <a:latin typeface="Consolas" panose="020B0609020204030204" pitchFamily="49" charset="0"/>
+              </a:rPr>
+              <a:t>new</a:t>
+            </a:r>
+            <a:r>
+              <a:rPr lang="en-US" b="1" u="sng" dirty="0">
+                <a:solidFill>
+                  <a:srgbClr val="000000"/>
+                </a:solidFill>
+                <a:latin typeface="Consolas" panose="020B0609020204030204" pitchFamily="49" charset="0"/>
+              </a:rPr>
+              <a:t> </a:t>
+            </a:r>
+            <a:r>
+              <a:rPr lang="en-US" b="1" u="sng" dirty="0" err="1">
+                <a:solidFill>
+                  <a:srgbClr val="000000"/>
+                </a:solidFill>
+                <a:latin typeface="Consolas" panose="020B0609020204030204" pitchFamily="49" charset="0"/>
+              </a:rPr>
+              <a:t>FileReader</a:t>
+            </a:r>
+            <a:r>
+              <a:rPr lang="en-US" b="1" u="sng" dirty="0">
+                <a:solidFill>
+                  <a:srgbClr val="000000"/>
+                </a:solidFill>
+                <a:latin typeface="Consolas" panose="020B0609020204030204" pitchFamily="49" charset="0"/>
+              </a:rPr>
+              <a:t>(</a:t>
+            </a:r>
+            <a:r>
+              <a:rPr lang="en-US" b="1" u="sng" dirty="0">
+                <a:solidFill>
+                  <a:srgbClr val="2A00FF"/>
+                </a:solidFill>
+                <a:latin typeface="Consolas" panose="020B0609020204030204" pitchFamily="49" charset="0"/>
+              </a:rPr>
+              <a:t>"symptoms.txt"</a:t>
+            </a:r>
+            <a:r>
+              <a:rPr lang="en-US" b="1" u="sng" dirty="0">
+                <a:solidFill>
+                  <a:srgbClr val="000000"/>
+                </a:solidFill>
+                <a:latin typeface="Consolas" panose="020B0609020204030204" pitchFamily="49" charset="0"/>
+              </a:rPr>
+              <a:t>));</a:t>
+            </a:r>
+          </a:p>
+          <a:p>
+            <a:r>
+              <a:rPr lang="fr-FR" dirty="0">
+                <a:solidFill>
+                  <a:srgbClr val="FF0000"/>
+                </a:solidFill>
+                <a:latin typeface="Consolas" panose="020B0609020204030204" pitchFamily="49" charset="0"/>
+              </a:rPr>
+              <a:t>symptoms.txt (Le fichier spécifié est introuvable)</a:t>
+            </a:r>
+          </a:p>
+          <a:p>
+            <a:endParaRPr lang="fr-FR" sz="1200" dirty="0">
+              <a:solidFill>
+                <a:srgbClr val="FF0000"/>
+              </a:solidFill>
+              <a:latin typeface="Consolas" panose="020B0609020204030204" pitchFamily="49" charset="0"/>
+            </a:endParaRPr>
+          </a:p>
+          <a:p>
+            <a:pPr>
+              <a:spcAft>
+                <a:spcPts val="600"/>
+              </a:spcAft>
+            </a:pPr>
+            <a:r>
+              <a:rPr lang="fr-FR" sz="2400" dirty="0"/>
+              <a:t>docs.oracle.com/</a:t>
+            </a:r>
+            <a:r>
+              <a:rPr lang="fr-FR" sz="2400" dirty="0" err="1"/>
+              <a:t>javase</a:t>
+            </a:r>
+            <a:r>
+              <a:rPr lang="fr-FR" sz="2400" dirty="0"/>
+              <a:t>/8/docs/api/ , Class File :</a:t>
+            </a:r>
+          </a:p>
+          <a:p>
+            <a:pPr>
+              <a:spcAft>
+                <a:spcPts val="600"/>
+              </a:spcAft>
+            </a:pPr>
+            <a:r>
+              <a:rPr lang="en-US" dirty="0"/>
+              <a:t>By default the classes in the java.io package always resolve relative pathnames against the current user directory. This directory is named by the system property </a:t>
+            </a:r>
+            <a:r>
+              <a:rPr lang="en-US" dirty="0" err="1">
+                <a:highlight>
+                  <a:srgbClr val="FFFF00"/>
+                </a:highlight>
+              </a:rPr>
+              <a:t>user.dir</a:t>
+            </a:r>
+            <a:r>
+              <a:rPr lang="en-US" dirty="0">
+                <a:highlight>
+                  <a:srgbClr val="FFFF00"/>
+                </a:highlight>
+              </a:rPr>
+              <a:t> </a:t>
+            </a:r>
+            <a:r>
+              <a:rPr lang="en-US" dirty="0"/>
+              <a:t>…</a:t>
+            </a:r>
+          </a:p>
+          <a:p>
+            <a:pPr>
+              <a:spcAft>
+                <a:spcPts val="600"/>
+              </a:spcAft>
+            </a:pPr>
+            <a:endParaRPr lang="en-US" sz="1200" dirty="0"/>
+          </a:p>
+          <a:p>
+            <a:pPr>
+              <a:spcAft>
+                <a:spcPts val="600"/>
+              </a:spcAft>
+            </a:pPr>
+            <a:r>
+              <a:rPr lang="en-US" sz="2400" dirty="0" err="1"/>
+              <a:t>Ajout</a:t>
+            </a:r>
+            <a:r>
+              <a:rPr lang="en-US" sz="2400" dirty="0"/>
+              <a:t> du code : </a:t>
+            </a:r>
+          </a:p>
+          <a:p>
+            <a:pPr algn="l"/>
+            <a:r>
+              <a:rPr lang="en-US" dirty="0">
+                <a:solidFill>
+                  <a:srgbClr val="000000"/>
+                </a:solidFill>
+                <a:latin typeface="Consolas" panose="020B0609020204030204" pitchFamily="49" charset="0"/>
+              </a:rPr>
+              <a:t>String </a:t>
+            </a:r>
+            <a:r>
+              <a:rPr lang="en-US" dirty="0">
+                <a:solidFill>
+                  <a:srgbClr val="6A3E3E"/>
+                </a:solidFill>
+                <a:latin typeface="Consolas" panose="020B0609020204030204" pitchFamily="49" charset="0"/>
+              </a:rPr>
+              <a:t>path</a:t>
+            </a:r>
+            <a:r>
+              <a:rPr lang="en-US" dirty="0">
+                <a:solidFill>
+                  <a:srgbClr val="000000"/>
+                </a:solidFill>
+                <a:latin typeface="Consolas" panose="020B0609020204030204" pitchFamily="49" charset="0"/>
+              </a:rPr>
+              <a:t> = </a:t>
+            </a:r>
+            <a:r>
+              <a:rPr lang="en-US" dirty="0" err="1">
+                <a:solidFill>
+                  <a:srgbClr val="000000"/>
+                </a:solidFill>
+                <a:latin typeface="Consolas" panose="020B0609020204030204" pitchFamily="49" charset="0"/>
+              </a:rPr>
+              <a:t>System.</a:t>
+            </a:r>
+            <a:r>
+              <a:rPr lang="en-US" i="1" dirty="0" err="1">
+                <a:solidFill>
+                  <a:srgbClr val="000000"/>
+                </a:solidFill>
+                <a:latin typeface="Consolas" panose="020B0609020204030204" pitchFamily="49" charset="0"/>
+              </a:rPr>
+              <a:t>getProperty</a:t>
+            </a:r>
+            <a:r>
+              <a:rPr lang="en-US" i="1" dirty="0">
+                <a:solidFill>
+                  <a:srgbClr val="000000"/>
+                </a:solidFill>
+                <a:latin typeface="Consolas" panose="020B0609020204030204" pitchFamily="49" charset="0"/>
+              </a:rPr>
+              <a:t>(</a:t>
+            </a:r>
+            <a:r>
+              <a:rPr lang="en-US" i="1" dirty="0">
+                <a:solidFill>
+                  <a:srgbClr val="2A00FF"/>
+                </a:solidFill>
+                <a:latin typeface="Consolas" panose="020B0609020204030204" pitchFamily="49" charset="0"/>
+              </a:rPr>
+              <a:t>"</a:t>
+            </a:r>
+            <a:r>
+              <a:rPr lang="en-US" i="1" dirty="0" err="1">
+                <a:solidFill>
+                  <a:srgbClr val="2A00FF"/>
+                </a:solidFill>
+                <a:latin typeface="Consolas" panose="020B0609020204030204" pitchFamily="49" charset="0"/>
+              </a:rPr>
+              <a:t>user.dir</a:t>
+            </a:r>
+            <a:r>
+              <a:rPr lang="en-US" i="1" dirty="0">
+                <a:solidFill>
+                  <a:srgbClr val="2A00FF"/>
+                </a:solidFill>
+                <a:latin typeface="Consolas" panose="020B0609020204030204" pitchFamily="49" charset="0"/>
+              </a:rPr>
+              <a:t>"</a:t>
+            </a:r>
+            <a:r>
+              <a:rPr lang="en-US" i="1" dirty="0">
+                <a:solidFill>
+                  <a:srgbClr val="000000"/>
+                </a:solidFill>
+                <a:latin typeface="Consolas" panose="020B0609020204030204" pitchFamily="49" charset="0"/>
+              </a:rPr>
+              <a:t>);</a:t>
+            </a:r>
+          </a:p>
+          <a:p>
+            <a:pPr algn="l"/>
+            <a:r>
+              <a:rPr lang="fr-FR" dirty="0" err="1">
+                <a:solidFill>
+                  <a:srgbClr val="000000"/>
+                </a:solidFill>
+                <a:latin typeface="Consolas" panose="020B0609020204030204" pitchFamily="49" charset="0"/>
+              </a:rPr>
+              <a:t>System.</a:t>
+            </a:r>
+            <a:r>
+              <a:rPr lang="fr-FR" b="1" i="1" dirty="0" err="1">
+                <a:solidFill>
+                  <a:srgbClr val="0000C0"/>
+                </a:solidFill>
+                <a:latin typeface="Consolas" panose="020B0609020204030204" pitchFamily="49" charset="0"/>
+              </a:rPr>
+              <a:t>out</a:t>
+            </a:r>
+            <a:r>
+              <a:rPr lang="fr-FR" b="1" i="1" dirty="0" err="1">
+                <a:solidFill>
+                  <a:srgbClr val="000000"/>
+                </a:solidFill>
+                <a:latin typeface="Consolas" panose="020B0609020204030204" pitchFamily="49" charset="0"/>
+              </a:rPr>
+              <a:t>.println</a:t>
+            </a:r>
+            <a:r>
+              <a:rPr lang="fr-FR" b="1" i="1" dirty="0">
+                <a:solidFill>
+                  <a:srgbClr val="000000"/>
+                </a:solidFill>
+                <a:latin typeface="Consolas" panose="020B0609020204030204" pitchFamily="49" charset="0"/>
+              </a:rPr>
+              <a:t>(</a:t>
+            </a:r>
+            <a:r>
+              <a:rPr lang="fr-FR" b="1" i="1" dirty="0" err="1">
+                <a:solidFill>
+                  <a:srgbClr val="6A3E3E"/>
+                </a:solidFill>
+                <a:latin typeface="Consolas" panose="020B0609020204030204" pitchFamily="49" charset="0"/>
+              </a:rPr>
+              <a:t>path</a:t>
+            </a:r>
+            <a:r>
+              <a:rPr lang="fr-FR" b="1" i="1" dirty="0">
+                <a:solidFill>
+                  <a:srgbClr val="000000"/>
+                </a:solidFill>
+                <a:latin typeface="Consolas" panose="020B0609020204030204" pitchFamily="49" charset="0"/>
+              </a:rPr>
+              <a:t>);</a:t>
+            </a:r>
+          </a:p>
+          <a:p>
+            <a:pPr algn="l"/>
+            <a:endParaRPr lang="fr-FR" b="1" i="1" dirty="0">
+              <a:solidFill>
+                <a:srgbClr val="000000"/>
+              </a:solidFill>
+              <a:latin typeface="Consolas" panose="020B0609020204030204" pitchFamily="49" charset="0"/>
+            </a:endParaRPr>
+          </a:p>
+          <a:p>
+            <a:pPr>
+              <a:spcAft>
+                <a:spcPts val="600"/>
+              </a:spcAft>
+            </a:pPr>
+            <a:r>
+              <a:rPr lang="en-US" sz="2400" dirty="0"/>
+              <a:t>Modification du code :</a:t>
+            </a:r>
+          </a:p>
+          <a:p>
+            <a:pPr>
+              <a:spcAft>
+                <a:spcPts val="600"/>
+              </a:spcAft>
+            </a:pPr>
+            <a:r>
+              <a:rPr lang="en-US" dirty="0">
+                <a:solidFill>
+                  <a:srgbClr val="000000"/>
+                </a:solidFill>
+                <a:latin typeface="Consolas" panose="020B0609020204030204" pitchFamily="49" charset="0"/>
+              </a:rPr>
+              <a:t>(</a:t>
+            </a:r>
+            <a:r>
+              <a:rPr lang="en-US" b="1" dirty="0">
+                <a:solidFill>
+                  <a:srgbClr val="7F0055"/>
+                </a:solidFill>
+                <a:latin typeface="Consolas" panose="020B0609020204030204" pitchFamily="49" charset="0"/>
+              </a:rPr>
+              <a:t>new</a:t>
+            </a:r>
+            <a:r>
+              <a:rPr lang="en-US" b="1" dirty="0">
+                <a:solidFill>
+                  <a:srgbClr val="000000"/>
+                </a:solidFill>
+                <a:latin typeface="Consolas" panose="020B0609020204030204" pitchFamily="49" charset="0"/>
+              </a:rPr>
+              <a:t> </a:t>
+            </a:r>
+            <a:r>
+              <a:rPr lang="en-US" b="1" dirty="0" err="1">
+                <a:solidFill>
+                  <a:srgbClr val="000000"/>
+                </a:solidFill>
+                <a:latin typeface="Consolas" panose="020B0609020204030204" pitchFamily="49" charset="0"/>
+              </a:rPr>
+              <a:t>FileReader</a:t>
+            </a:r>
+            <a:r>
+              <a:rPr lang="en-US" b="1" dirty="0">
+                <a:solidFill>
+                  <a:srgbClr val="000000"/>
+                </a:solidFill>
+                <a:latin typeface="Consolas" panose="020B0609020204030204" pitchFamily="49" charset="0"/>
+              </a:rPr>
+              <a:t>(</a:t>
+            </a:r>
+            <a:r>
+              <a:rPr lang="en-US" b="1" dirty="0">
+                <a:solidFill>
+                  <a:srgbClr val="6A3E3E"/>
+                </a:solidFill>
+                <a:latin typeface="Consolas" panose="020B0609020204030204" pitchFamily="49" charset="0"/>
+              </a:rPr>
+              <a:t>path</a:t>
+            </a:r>
+            <a:r>
+              <a:rPr lang="en-US" b="1" dirty="0">
+                <a:solidFill>
+                  <a:srgbClr val="000000"/>
+                </a:solidFill>
+                <a:latin typeface="Consolas" panose="020B0609020204030204" pitchFamily="49" charset="0"/>
+              </a:rPr>
+              <a:t>+</a:t>
+            </a:r>
+            <a:r>
+              <a:rPr lang="en-US" b="1" dirty="0">
+                <a:solidFill>
+                  <a:srgbClr val="2A00FF"/>
+                </a:solidFill>
+                <a:latin typeface="Consolas" panose="020B0609020204030204" pitchFamily="49" charset="0"/>
+              </a:rPr>
+              <a:t>"/Project02Eclipse/symptoms.txt"</a:t>
+            </a:r>
+            <a:r>
+              <a:rPr lang="en-US" b="1" dirty="0">
+                <a:solidFill>
+                  <a:srgbClr val="000000"/>
+                </a:solidFill>
+                <a:latin typeface="Consolas" panose="020B0609020204030204" pitchFamily="49" charset="0"/>
+              </a:rPr>
+              <a:t>));</a:t>
+            </a:r>
+            <a:endParaRPr lang="en-US" dirty="0"/>
+          </a:p>
+        </p:txBody>
+      </p:sp>
+      <p:cxnSp>
+        <p:nvCxnSpPr>
+          <p:cNvPr id="19" name="Connecteur : en angle 18">
+            <a:extLst>
+              <a:ext uri="{FF2B5EF4-FFF2-40B4-BE49-F238E27FC236}">
+                <a16:creationId xmlns:a16="http://schemas.microsoft.com/office/drawing/2014/main" id="{257998A5-154C-4A03-B211-DF906111591E}"/>
+              </a:ext>
+            </a:extLst>
+          </p:cNvPr>
+          <p:cNvCxnSpPr>
+            <a:cxnSpLocks/>
+          </p:cNvCxnSpPr>
+          <p:nvPr/>
+        </p:nvCxnSpPr>
+        <p:spPr>
+          <a:xfrm flipV="1">
+            <a:off x="3727263" y="2503170"/>
+            <a:ext cx="3838575" cy="1234440"/>
+          </a:xfrm>
+          <a:prstGeom prst="bentConnector3">
+            <a:avLst>
+              <a:gd name="adj1" fmla="val 68759"/>
+            </a:avLst>
+          </a:prstGeom>
+          <a:ln w="25400">
+            <a:solidFill>
+              <a:schemeClr val="tx1"/>
+            </a:solidFill>
+            <a:headEnd type="triangle"/>
+            <a:tailEnd type="triangle"/>
+          </a:ln>
+        </p:spPr>
+        <p:style>
+          <a:lnRef idx="1">
+            <a:schemeClr val="accent1"/>
+          </a:lnRef>
+          <a:fillRef idx="0">
+            <a:schemeClr val="accent1"/>
+          </a:fillRef>
+          <a:effectRef idx="0">
+            <a:schemeClr val="accent1"/>
+          </a:effectRef>
+          <a:fontRef idx="minor">
+            <a:schemeClr val="tx1"/>
+          </a:fontRef>
+        </p:style>
+      </p:cxnSp>
     </p:spTree>
     <p:extLst>
       <p:ext uri="{BB962C8B-B14F-4D97-AF65-F5344CB8AC3E}">
@@ -4948,8 +4892,8 @@
         </p:nvSpPr>
         <p:spPr>
           <a:xfrm>
-            <a:off x="472440" y="374904"/>
-            <a:ext cx="11247120" cy="1015663"/>
+            <a:off x="264409" y="286149"/>
+            <a:ext cx="11634221" cy="584775"/>
           </a:xfrm>
           <a:prstGeom prst="rect">
             <a:avLst/>
@@ -4975,20 +4919,6 @@
               <a:rPr lang="fr-FR" sz="3200" dirty="0"/>
               <a:t> itération : lire le fichier</a:t>
             </a:r>
-          </a:p>
-          <a:p>
-            <a:endParaRPr lang="fr-FR" sz="1400" dirty="0"/>
-          </a:p>
-          <a:p>
-            <a:r>
-              <a:rPr lang="fr-FR" sz="1400" dirty="0"/>
-              <a:t>Tout d’abord organisation en modèle, vue, </a:t>
-            </a:r>
-            <a:r>
-              <a:rPr lang="fr-FR" sz="1400" dirty="0" err="1"/>
-              <a:t>controleur</a:t>
-            </a:r>
-            <a:endParaRPr lang="fr-FR" sz="1400" dirty="0"/>
           </a:p>
         </p:txBody>
       </p:sp>
@@ -5117,8 +5047,8 @@
         </p:nvSpPr>
         <p:spPr>
           <a:xfrm>
-            <a:off x="5282949" y="3415606"/>
-            <a:ext cx="6841996" cy="2585323"/>
+            <a:off x="5048366" y="4023591"/>
+            <a:ext cx="6841996" cy="1754326"/>
           </a:xfrm>
           <a:prstGeom prst="rect">
             <a:avLst/>
@@ -5130,37 +5060,6 @@
             <a:spAutoFit/>
           </a:bodyPr>
           <a:lstStyle/>
-          <a:p>
-            <a:r>
-              <a:rPr lang="fr-FR" dirty="0"/>
-              <a:t>Le contrôleur est un singleton qui contiendra la logique de contrôle,</a:t>
-            </a:r>
-          </a:p>
-          <a:p>
-            <a:r>
-              <a:rPr lang="fr-FR" dirty="0"/>
-              <a:t>pour une seule instance afin d’éviter plusieurs </a:t>
-            </a:r>
-            <a:r>
-              <a:rPr lang="fr-FR" dirty="0" err="1"/>
-              <a:t>reader</a:t>
-            </a:r>
-            <a:r>
-              <a:rPr lang="fr-FR" dirty="0"/>
-              <a:t>/</a:t>
-            </a:r>
-            <a:r>
-              <a:rPr lang="fr-FR" dirty="0" err="1"/>
-              <a:t>writer</a:t>
-            </a:r>
-            <a:endParaRPr lang="fr-FR" dirty="0"/>
-          </a:p>
-          <a:p>
-            <a:r>
-              <a:rPr lang="fr-FR" dirty="0"/>
-              <a:t>sur le même fichier.</a:t>
-            </a:r>
-          </a:p>
           <a:p>
             <a:endParaRPr lang="fr-FR" dirty="0"/>
           </a:p>
@@ -5230,7 +5129,7 @@
         </p:blipFill>
         <p:spPr>
           <a:xfrm>
-            <a:off x="5282948" y="1377173"/>
+            <a:off x="5282949" y="1513677"/>
             <a:ext cx="5430008" cy="1867161"/>
           </a:xfrm>
           <a:prstGeom prst="rect">
@@ -5238,6 +5137,50 @@
           </a:prstGeom>
         </p:spPr>
       </p:pic>
+      <p:sp>
+        <p:nvSpPr>
+          <p:cNvPr id="5" name="ZoneTexte 4">
+            <a:extLst>
+              <a:ext uri="{FF2B5EF4-FFF2-40B4-BE49-F238E27FC236}">
+                <a16:creationId xmlns:a16="http://schemas.microsoft.com/office/drawing/2014/main" id="{DB0609E4-1F72-48CB-8C05-D669F23EE721}"/>
+              </a:ext>
+            </a:extLst>
+          </p:cNvPr>
+          <p:cNvSpPr txBox="1"/>
+          <p:nvPr/>
+        </p:nvSpPr>
+        <p:spPr>
+          <a:xfrm>
+            <a:off x="293370" y="860486"/>
+            <a:ext cx="4657750" cy="923330"/>
+          </a:xfrm>
+          <a:prstGeom prst="rect">
+            <a:avLst/>
+          </a:prstGeom>
+          <a:noFill/>
+        </p:spPr>
+        <p:txBody>
+          <a:bodyPr wrap="none" rtlCol="0">
+            <a:spAutoFit/>
+          </a:bodyPr>
+          <a:lstStyle/>
+          <a:p>
+            <a:r>
+              <a:rPr lang="fr-FR" dirty="0"/>
+              <a:t>Tout d’abord organisation en modèle, vue,</a:t>
+            </a:r>
+          </a:p>
+          <a:p>
+            <a:r>
+              <a:rPr lang="fr-FR" dirty="0"/>
+              <a:t>contrôleur et objet d’accès aux données (DAO) :</a:t>
+            </a:r>
+          </a:p>
+          <a:p>
+            <a:endParaRPr lang="fr-FR" dirty="0"/>
+          </a:p>
+        </p:txBody>
+      </p:sp>
     </p:spTree>
     <p:extLst>
       <p:ext uri="{BB962C8B-B14F-4D97-AF65-F5344CB8AC3E}">
@@ -5320,7 +5263,7 @@
         </p:blipFill>
         <p:spPr>
           <a:xfrm>
-            <a:off x="0" y="319489"/>
+            <a:off x="0" y="1525836"/>
             <a:ext cx="4823864" cy="5332164"/>
           </a:xfrm>
           <a:prstGeom prst="rect">
@@ -5350,8 +5293,8 @@
         </p:blipFill>
         <p:spPr>
           <a:xfrm>
-            <a:off x="7656671" y="4465839"/>
-            <a:ext cx="1571844" cy="2410161"/>
+            <a:off x="7565231" y="4610743"/>
+            <a:ext cx="1465602" cy="2247257"/>
           </a:xfrm>
           <a:prstGeom prst="rect">
             <a:avLst/>
@@ -5388,6 +5331,96 @@
           </a:prstGeom>
         </p:spPr>
       </p:pic>
+      <p:sp>
+        <p:nvSpPr>
+          <p:cNvPr id="7" name="ZoneTexte 6">
+            <a:extLst>
+              <a:ext uri="{FF2B5EF4-FFF2-40B4-BE49-F238E27FC236}">
+                <a16:creationId xmlns:a16="http://schemas.microsoft.com/office/drawing/2014/main" id="{D80E86C4-7E62-4AFB-A9B8-EDABAF87EBF7}"/>
+              </a:ext>
+            </a:extLst>
+          </p:cNvPr>
+          <p:cNvSpPr txBox="1"/>
+          <p:nvPr/>
+        </p:nvSpPr>
+        <p:spPr>
+          <a:xfrm>
+            <a:off x="-4125" y="0"/>
+            <a:ext cx="4847238" cy="1354217"/>
+          </a:xfrm>
+          <a:prstGeom prst="rect">
+            <a:avLst/>
+          </a:prstGeom>
+          <a:noFill/>
+        </p:spPr>
+        <p:txBody>
+          <a:bodyPr wrap="square">
+            <a:spAutoFit/>
+          </a:bodyPr>
+          <a:lstStyle/>
+          <a:p>
+            <a:pPr>
+              <a:spcAft>
+                <a:spcPts val="600"/>
+              </a:spcAft>
+            </a:pPr>
+            <a:r>
+              <a:rPr lang="fr-FR" dirty="0"/>
+              <a:t>Le contrôleur (</a:t>
+            </a:r>
+            <a:r>
+              <a:rPr lang="fr-FR" dirty="0" err="1"/>
+              <a:t>AnalitycsController</a:t>
+            </a:r>
+            <a:r>
+              <a:rPr lang="fr-FR" dirty="0"/>
+              <a:t>) :</a:t>
+            </a:r>
+          </a:p>
+          <a:p>
+            <a:pPr marL="285750" indent="-285750">
+              <a:spcAft>
+                <a:spcPts val="600"/>
+              </a:spcAft>
+              <a:buFont typeface="Wingdings" panose="05000000000000000000" pitchFamily="2" charset="2"/>
+              <a:buChar char="Ø"/>
+            </a:pPr>
+            <a:r>
+              <a:rPr lang="fr-FR" dirty="0"/>
+              <a:t>contiendra la logique de contrôle</a:t>
+            </a:r>
+          </a:p>
+          <a:p>
+            <a:pPr marL="285750" indent="-285750">
+              <a:spcAft>
+                <a:spcPts val="600"/>
+              </a:spcAft>
+              <a:buFont typeface="Wingdings" panose="05000000000000000000" pitchFamily="2" charset="2"/>
+              <a:buChar char="Ø"/>
+            </a:pPr>
+            <a:r>
+              <a:rPr lang="fr-FR" dirty="0"/>
+              <a:t>singleton : une seule instance afin d’éviter plusieurs </a:t>
+            </a:r>
+            <a:r>
+              <a:rPr lang="fr-FR" dirty="0" err="1"/>
+              <a:t>reader</a:t>
+            </a:r>
+            <a:r>
+              <a:rPr lang="fr-FR" dirty="0"/>
+              <a:t>/</a:t>
+            </a:r>
+            <a:r>
+              <a:rPr lang="fr-FR" dirty="0" err="1"/>
+              <a:t>writer</a:t>
+            </a:r>
+            <a:r>
+              <a:rPr lang="fr-FR" dirty="0"/>
+              <a:t> sur le même fichier</a:t>
+            </a:r>
+          </a:p>
+        </p:txBody>
+      </p:sp>
     </p:spTree>
     <p:extLst>
       <p:ext uri="{BB962C8B-B14F-4D97-AF65-F5344CB8AC3E}">
@@ -5440,8 +5473,8 @@
         </p:blipFill>
         <p:spPr>
           <a:xfrm>
-            <a:off x="-1" y="36623"/>
-            <a:ext cx="5497418" cy="6798740"/>
+            <a:off x="0" y="674867"/>
+            <a:ext cx="4999642" cy="6183133"/>
           </a:xfrm>
           <a:prstGeom prst="rect">
             <a:avLst/>
@@ -5472,6 +5505,87 @@
           <a:xfrm>
             <a:off x="7192359" y="0"/>
             <a:ext cx="4858078" cy="6858000"/>
+          </a:xfrm>
+          <a:prstGeom prst="rect">
+            <a:avLst/>
+          </a:prstGeom>
+        </p:spPr>
+      </p:pic>
+      <p:sp>
+        <p:nvSpPr>
+          <p:cNvPr id="6" name="ZoneTexte 5">
+            <a:extLst>
+              <a:ext uri="{FF2B5EF4-FFF2-40B4-BE49-F238E27FC236}">
+                <a16:creationId xmlns:a16="http://schemas.microsoft.com/office/drawing/2014/main" id="{5ECDF928-E529-4DEF-9744-6B547C3200BB}"/>
+              </a:ext>
+            </a:extLst>
+          </p:cNvPr>
+          <p:cNvSpPr txBox="1"/>
+          <p:nvPr/>
+        </p:nvSpPr>
+        <p:spPr>
+          <a:xfrm>
+            <a:off x="-1905" y="0"/>
+            <a:ext cx="6892197" cy="646331"/>
+          </a:xfrm>
+          <a:prstGeom prst="rect">
+            <a:avLst/>
+          </a:prstGeom>
+          <a:noFill/>
+        </p:spPr>
+        <p:txBody>
+          <a:bodyPr wrap="square">
+            <a:spAutoFit/>
+          </a:bodyPr>
+          <a:lstStyle/>
+          <a:p>
+            <a:r>
+              <a:rPr lang="fr-FR" dirty="0"/>
+              <a:t>DAO : interface (</a:t>
+            </a:r>
+            <a:r>
+              <a:rPr lang="fr-FR" dirty="0" err="1"/>
+              <a:t>ISymptomIO</a:t>
+            </a:r>
+            <a:r>
+              <a:rPr lang="fr-FR" dirty="0"/>
+              <a:t>) et implémentation (</a:t>
+            </a:r>
+            <a:r>
+              <a:rPr lang="fr-FR" dirty="0" err="1"/>
+              <a:t>SymptomReadDataFromFile</a:t>
+            </a:r>
+            <a:r>
+              <a:rPr lang="fr-FR" dirty="0"/>
+              <a:t>) :</a:t>
+            </a:r>
+          </a:p>
+        </p:txBody>
+      </p:sp>
+      <p:pic>
+        <p:nvPicPr>
+          <p:cNvPr id="7" name="Image 6">
+            <a:extLst>
+              <a:ext uri="{FF2B5EF4-FFF2-40B4-BE49-F238E27FC236}">
+                <a16:creationId xmlns:a16="http://schemas.microsoft.com/office/drawing/2014/main" id="{B328AAE6-05A7-42CA-BFF1-F26C64BF160D}"/>
+              </a:ext>
+            </a:extLst>
+          </p:cNvPr>
+          <p:cNvPicPr>
+            <a:picLocks noChangeAspect="1"/>
+          </p:cNvPicPr>
+          <p:nvPr/>
+        </p:nvPicPr>
+        <p:blipFill>
+          <a:blip r:embed="rId4"/>
+          <a:stretch>
+            <a:fillRect/>
+          </a:stretch>
+        </p:blipFill>
+        <p:spPr>
+          <a:xfrm>
+            <a:off x="7037673" y="-27000"/>
+            <a:ext cx="7305" cy="6912000"/>
           </a:xfrm>
           <a:prstGeom prst="rect">
             <a:avLst/>
@@ -5508,52 +5622,22 @@
           <a:chExt cx="0" cy="0"/>
         </a:xfrm>
       </p:grpSpPr>
-      <p:pic>
-        <p:nvPicPr>
-          <p:cNvPr id="3" name="Image 2">
-            <a:extLst>
-              <a:ext uri="{FF2B5EF4-FFF2-40B4-BE49-F238E27FC236}">
-                <a16:creationId xmlns:a16="http://schemas.microsoft.com/office/drawing/2014/main" id="{BC113DD8-E2D0-4F68-AAFB-95E773EBF7E3}"/>
-              </a:ext>
-            </a:extLst>
-          </p:cNvPr>
-          <p:cNvPicPr>
-            <a:picLocks noChangeAspect="1"/>
-          </p:cNvPicPr>
+      <p:sp>
+        <p:nvSpPr>
+          <p:cNvPr id="4" name="ZoneTexte 3">
+            <a:extLst>
+              <a:ext uri="{FF2B5EF4-FFF2-40B4-BE49-F238E27FC236}">
+                <a16:creationId xmlns:a16="http://schemas.microsoft.com/office/drawing/2014/main" id="{9570EB15-1DD7-4671-8AAE-6805F6685D74}"/>
+              </a:ext>
+            </a:extLst>
+          </p:cNvPr>
+          <p:cNvSpPr txBox="1"/>
           <p:nvPr/>
-        </p:nvPicPr>
-        <p:blipFill>
-          <a:blip r:embed="rId2"/>
-          <a:stretch>
-            <a:fillRect/>
-          </a:stretch>
-        </p:blipFill>
+        </p:nvSpPr>
         <p:spPr>
           <a:xfrm>
-            <a:off x="0" y="0"/>
-            <a:ext cx="5649113" cy="2886478"/>
-          </a:xfrm>
-          <a:prstGeom prst="rect">
-            <a:avLst/>
-          </a:prstGeom>
-        </p:spPr>
-      </p:pic>
-      <p:sp>
-        <p:nvSpPr>
-          <p:cNvPr id="4" name="ZoneTexte 3">
-            <a:extLst>
-              <a:ext uri="{FF2B5EF4-FFF2-40B4-BE49-F238E27FC236}">
-                <a16:creationId xmlns:a16="http://schemas.microsoft.com/office/drawing/2014/main" id="{9570EB15-1DD7-4671-8AAE-6805F6685D74}"/>
-              </a:ext>
-            </a:extLst>
-          </p:cNvPr>
-          <p:cNvSpPr txBox="1"/>
-          <p:nvPr/>
-        </p:nvSpPr>
-        <p:spPr>
-          <a:xfrm>
-            <a:off x="189571" y="3100039"/>
-            <a:ext cx="12002429" cy="3570208"/>
+            <a:off x="527220" y="173959"/>
+            <a:ext cx="11165669" cy="1354217"/>
           </a:xfrm>
           <a:prstGeom prst="rect">
             <a:avLst/>
@@ -5566,146 +5650,82 @@
           </a:bodyPr>
           <a:lstStyle/>
           <a:p>
-            <a:r>
-              <a:rPr lang="fr-FR" dirty="0"/>
-              <a:t>Puis </a:t>
-            </a:r>
-            <a:r>
-              <a:rPr lang="fr-FR" dirty="0" err="1"/>
-              <a:t>GitBash</a:t>
-            </a:r>
-            <a:r>
-              <a:rPr lang="fr-FR" dirty="0"/>
-              <a:t> :</a:t>
-            </a:r>
-          </a:p>
-          <a:p>
-            <a:r>
-              <a:rPr lang="fr-FR" dirty="0"/>
-              <a:t>$ git flow </a:t>
-            </a:r>
-            <a:r>
-              <a:rPr lang="fr-FR" dirty="0" err="1"/>
-              <a:t>feature</a:t>
-            </a:r>
-            <a:r>
-              <a:rPr lang="fr-FR" dirty="0"/>
-              <a:t> finish </a:t>
-            </a:r>
-            <a:r>
-              <a:rPr lang="fr-FR" dirty="0" err="1"/>
-              <a:t>readDataFile</a:t>
-            </a:r>
+            <a:pPr algn="ctr"/>
+            <a:r>
+              <a:rPr lang="fr-FR" sz="3200" dirty="0"/>
+              <a:t>2ème itération : écrire le fichier result.out par ordre alphabétique des symptômes avec leurs occurrences</a:t>
+            </a:r>
+          </a:p>
+          <a:p>
             <a:endParaRPr lang="fr-FR" dirty="0"/>
           </a:p>
-          <a:p>
-            <a:r>
-              <a:rPr lang="fr-FR" dirty="0"/>
-              <a:t>$ git flow release start ‘0.1.0’</a:t>
-            </a:r>
-          </a:p>
-          <a:p>
-            <a:r>
-              <a:rPr lang="fr-FR" dirty="0"/>
-              <a:t>$ git flow release finish ‘0.1.0’</a:t>
-            </a:r>
-          </a:p>
-          <a:p>
-            <a:r>
-              <a:rPr lang="fr-FR" dirty="0"/>
-              <a:t>$ git push –tags</a:t>
-            </a:r>
-          </a:p>
-          <a:p>
-            <a:endParaRPr lang="fr-FR" dirty="0"/>
-          </a:p>
-          <a:p>
-            <a:pPr algn="ctr"/>
-            <a:r>
-              <a:rPr lang="fr-FR" sz="3200" dirty="0"/>
-              <a:t>2</a:t>
-            </a:r>
-            <a:r>
-              <a:rPr lang="fr-FR" sz="3200" baseline="30000" dirty="0"/>
-              <a:t>ème</a:t>
-            </a:r>
-            <a:r>
-              <a:rPr lang="fr-FR" sz="3200" dirty="0"/>
-              <a:t> itération : écrire le fichier </a:t>
-            </a:r>
-            <a:r>
-              <a:rPr lang="fr-FR" sz="3200" dirty="0" err="1"/>
-              <a:t>result.out</a:t>
-            </a:r>
-            <a:r>
-              <a:rPr lang="fr-FR" sz="3200" dirty="0"/>
-              <a:t> par </a:t>
-            </a:r>
-            <a:r>
-              <a:rPr lang="fr-FR" sz="3200" dirty="0" err="1"/>
-              <a:t>odre</a:t>
-            </a:r>
-            <a:r>
-              <a:rPr lang="fr-FR" sz="3200" dirty="0"/>
-              <a:t> alphabétique des </a:t>
-            </a:r>
-            <a:r>
-              <a:rPr lang="fr-FR" sz="3200" dirty="0" err="1"/>
-              <a:t>symptomes</a:t>
-            </a:r>
-            <a:r>
-              <a:rPr lang="fr-FR" sz="3200" dirty="0"/>
-              <a:t> avec leur occurrences</a:t>
-            </a:r>
-          </a:p>
-          <a:p>
-            <a:endParaRPr lang="fr-FR" dirty="0"/>
-          </a:p>
-          <a:p>
-            <a:r>
-              <a:rPr lang="fr-FR" dirty="0"/>
-              <a:t>$ git flow </a:t>
-            </a:r>
-            <a:r>
-              <a:rPr lang="fr-FR" dirty="0" err="1"/>
-              <a:t>feature</a:t>
-            </a:r>
-            <a:r>
-              <a:rPr lang="fr-FR" dirty="0"/>
-              <a:t> start </a:t>
-            </a:r>
-            <a:r>
-              <a:rPr lang="fr-FR" dirty="0" err="1"/>
-              <a:t>writeOutFile</a:t>
-            </a:r>
-            <a:endParaRPr lang="fr-FR" dirty="0"/>
-          </a:p>
-          <a:p>
-            <a:r>
-              <a:rPr lang="fr-FR" dirty="0"/>
-              <a:t>$ git flow </a:t>
-            </a:r>
-            <a:r>
-              <a:rPr lang="fr-FR" dirty="0" err="1"/>
-              <a:t>feature</a:t>
-            </a:r>
-            <a:r>
-              <a:rPr lang="fr-FR" dirty="0"/>
-              <a:t> </a:t>
-            </a:r>
-            <a:r>
-              <a:rPr lang="fr-FR" dirty="0" err="1"/>
-              <a:t>publish</a:t>
-            </a:r>
-            <a:r>
-              <a:rPr lang="fr-FR" dirty="0"/>
-              <a:t> </a:t>
-            </a:r>
-            <a:r>
-              <a:rPr lang="fr-FR" dirty="0" err="1"/>
-              <a:t>writeOutFile</a:t>
-            </a:r>
-            <a:endParaRPr lang="fr-FR" dirty="0"/>
+        </p:txBody>
+      </p:sp>
+      <p:sp>
+        <p:nvSpPr>
+          <p:cNvPr id="5" name="ZoneTexte 4">
+            <a:extLst>
+              <a:ext uri="{FF2B5EF4-FFF2-40B4-BE49-F238E27FC236}">
+                <a16:creationId xmlns:a16="http://schemas.microsoft.com/office/drawing/2014/main" id="{B578FD59-F066-4008-BF6B-A46AEFBAEFC7}"/>
+              </a:ext>
+            </a:extLst>
+          </p:cNvPr>
+          <p:cNvSpPr txBox="1"/>
+          <p:nvPr/>
+        </p:nvSpPr>
+        <p:spPr>
+          <a:xfrm>
+            <a:off x="527219" y="2200414"/>
+            <a:ext cx="11165669" cy="2908489"/>
+          </a:xfrm>
+          <a:prstGeom prst="rect">
+            <a:avLst/>
+          </a:prstGeom>
+          <a:noFill/>
+        </p:spPr>
+        <p:txBody>
+          <a:bodyPr wrap="square" rtlCol="0">
+            <a:spAutoFit/>
+          </a:bodyPr>
+          <a:lstStyle/>
+          <a:p>
+            <a:pPr>
+              <a:spcAft>
+                <a:spcPts val="600"/>
+              </a:spcAft>
+            </a:pPr>
+            <a:r>
+              <a:rPr lang="fr-FR" sz="2400" dirty="0"/>
+              <a:t>Le modèle en classe abstraite (Occurrence) permet de répondre à l’exigence de réemployabilité du code : un objet instancié par symptôme.</a:t>
+            </a:r>
+          </a:p>
+          <a:p>
+            <a:pPr>
+              <a:spcAft>
+                <a:spcPts val="600"/>
+              </a:spcAft>
+            </a:pPr>
+            <a:r>
+              <a:rPr lang="fr-FR" sz="2400" dirty="0"/>
+              <a:t>Les champs décrivent les caractéristiques de l’objet (nom et nombre d’occurrence) et les méthodes les actions sur les caractéristiques de l’objet (lecture et modification selon la logique métier).</a:t>
+            </a:r>
+          </a:p>
+          <a:p>
+            <a:pPr>
+              <a:spcAft>
+                <a:spcPts val="600"/>
+              </a:spcAft>
+            </a:pPr>
+            <a:r>
+              <a:rPr lang="fr-FR" sz="2400" dirty="0"/>
+              <a:t>Le constructeur permet d’initialiser les champs (nom transmis).</a:t>
+            </a:r>
+          </a:p>
+          <a:p>
+            <a:r>
+              <a:rPr lang="fr-FR" sz="2400" dirty="0"/>
+              <a:t>Cf. diapo suivante</a:t>
+            </a:r>
           </a:p>
         </p:txBody>
       </p:sp>
@@ -5739,47 +5759,6 @@
           <a:chExt cx="0" cy="0"/>
         </a:xfrm>
       </p:grpSpPr>
-      <p:sp>
-        <p:nvSpPr>
-          <p:cNvPr id="2" name="ZoneTexte 1">
-            <a:extLst>
-              <a:ext uri="{FF2B5EF4-FFF2-40B4-BE49-F238E27FC236}">
-                <a16:creationId xmlns:a16="http://schemas.microsoft.com/office/drawing/2014/main" id="{05724800-76F5-41D9-86F3-323C1D60D124}"/>
-              </a:ext>
-            </a:extLst>
-          </p:cNvPr>
-          <p:cNvSpPr txBox="1"/>
-          <p:nvPr/>
-        </p:nvSpPr>
-        <p:spPr>
-          <a:xfrm>
-            <a:off x="167268" y="223024"/>
-            <a:ext cx="11732956" cy="830997"/>
-          </a:xfrm>
-          <a:prstGeom prst="rect">
-            <a:avLst/>
-          </a:prstGeom>
-          <a:noFill/>
-        </p:spPr>
-        <p:txBody>
-          <a:bodyPr wrap="none" rtlCol="0">
-            <a:spAutoFit/>
-          </a:bodyPr>
-          <a:lstStyle/>
-          <a:p>
-            <a:r>
-              <a:rPr lang="fr-FR" sz="2400" dirty="0"/>
-              <a:t>Le modèle en classe abstraite « Occurrences » permet de répondre à l’exigence de réécriture</a:t>
-            </a:r>
-          </a:p>
-          <a:p>
-            <a:r>
-              <a:rPr lang="fr-FR" sz="2400" dirty="0"/>
-              <a:t>pour que le code soit réutilisable, quel que soit le nombre de symptômes à suivre.</a:t>
-            </a:r>
-          </a:p>
-        </p:txBody>
-      </p:sp>
       <p:pic>
         <p:nvPicPr>
           <p:cNvPr id="4" name="Image 3">
@@ -5802,8 +5781,8 @@
         </p:blipFill>
         <p:spPr>
           <a:xfrm>
-            <a:off x="0" y="1054021"/>
-            <a:ext cx="5809786" cy="5891471"/>
+            <a:off x="0" y="684689"/>
+            <a:ext cx="6096000" cy="6181709"/>
           </a:xfrm>
           <a:prstGeom prst="rect">
             <a:avLst/>
@@ -5832,14 +5811,49 @@
         </p:blipFill>
         <p:spPr>
           <a:xfrm>
-            <a:off x="7294771" y="1041246"/>
-            <a:ext cx="4772721" cy="5816754"/>
+            <a:off x="7153958" y="684689"/>
+            <a:ext cx="5038042" cy="6140114"/>
           </a:xfrm>
           <a:prstGeom prst="rect">
             <a:avLst/>
           </a:prstGeom>
         </p:spPr>
       </p:pic>
+      <p:sp>
+        <p:nvSpPr>
+          <p:cNvPr id="5" name="ZoneTexte 4">
+            <a:extLst>
+              <a:ext uri="{FF2B5EF4-FFF2-40B4-BE49-F238E27FC236}">
+                <a16:creationId xmlns:a16="http://schemas.microsoft.com/office/drawing/2014/main" id="{FE8D7701-A565-4296-B432-8C57B9AA8FDB}"/>
+              </a:ext>
+            </a:extLst>
+          </p:cNvPr>
+          <p:cNvSpPr txBox="1"/>
+          <p:nvPr/>
+        </p:nvSpPr>
+        <p:spPr>
+          <a:xfrm>
+            <a:off x="968859" y="131584"/>
+            <a:ext cx="10254282" cy="461665"/>
+          </a:xfrm>
+          <a:prstGeom prst="rect">
+            <a:avLst/>
+          </a:prstGeom>
+          <a:noFill/>
+        </p:spPr>
+        <p:txBody>
+          <a:bodyPr wrap="none" rtlCol="0">
+            <a:spAutoFit/>
+          </a:bodyPr>
+          <a:lstStyle/>
+          <a:p>
+            <a:r>
+              <a:rPr lang="fr-FR" sz="2400" dirty="0"/>
+              <a:t>Le modèle : classe abstraite et classe héritée avec implémentation des méthodes</a:t>
+            </a:r>
+          </a:p>
+        </p:txBody>
+      </p:sp>
     </p:spTree>
     <p:extLst>
       <p:ext uri="{BB962C8B-B14F-4D97-AF65-F5344CB8AC3E}">

</xml_diff>

<commit_message>
feat : handle exceptions and correct javadoc and comments
</commit_message>
<xml_diff>
--- a/PresentationOlivierMOREL.pptx
+++ b/PresentationOlivierMOREL.pptx
@@ -12,11 +12,12 @@
     <p:sldId id="258" r:id="rId6"/>
     <p:sldId id="261" r:id="rId7"/>
     <p:sldId id="262" r:id="rId8"/>
-    <p:sldId id="263" r:id="rId9"/>
-    <p:sldId id="264" r:id="rId10"/>
-    <p:sldId id="265" r:id="rId11"/>
-    <p:sldId id="266" r:id="rId12"/>
-    <p:sldId id="267" r:id="rId13"/>
+    <p:sldId id="270" r:id="rId9"/>
+    <p:sldId id="263" r:id="rId10"/>
+    <p:sldId id="264" r:id="rId11"/>
+    <p:sldId id="265" r:id="rId12"/>
+    <p:sldId id="266" r:id="rId13"/>
+    <p:sldId id="267" r:id="rId14"/>
   </p:sldIdLst>
   <p:sldSz cx="12192000" cy="6858000"/>
   <p:notesSz cx="6858000" cy="9144000"/>
@@ -3433,10 +3434,10 @@
       </p:grpSpPr>
       <p:sp>
         <p:nvSpPr>
-          <p:cNvPr id="2" name="ZoneTexte 1">
-            <a:extLst>
-              <a:ext uri="{FF2B5EF4-FFF2-40B4-BE49-F238E27FC236}">
-                <a16:creationId xmlns:a16="http://schemas.microsoft.com/office/drawing/2014/main" id="{5318B654-42B3-43A3-A943-2FB7151BA169}"/>
+          <p:cNvPr id="5" name="ZoneTexte 4">
+            <a:extLst>
+              <a:ext uri="{FF2B5EF4-FFF2-40B4-BE49-F238E27FC236}">
+                <a16:creationId xmlns:a16="http://schemas.microsoft.com/office/drawing/2014/main" id="{FE8D7701-A565-4296-B432-8C57B9AA8FDB}"/>
               </a:ext>
             </a:extLst>
           </p:cNvPr>
@@ -3445,8 +3446,8 @@
         </p:nvSpPr>
         <p:spPr>
           <a:xfrm>
-            <a:off x="0" y="0"/>
-            <a:ext cx="12192000" cy="369332"/>
+            <a:off x="968859" y="131584"/>
+            <a:ext cx="10254282" cy="461665"/>
           </a:xfrm>
           <a:prstGeom prst="rect">
             <a:avLst/>
@@ -3454,25 +3455,24 @@
           <a:noFill/>
         </p:spPr>
         <p:txBody>
-          <a:bodyPr wrap="square" rtlCol="0">
+          <a:bodyPr wrap="none" rtlCol="0">
             <a:spAutoFit/>
           </a:bodyPr>
           <a:lstStyle/>
           <a:p>
-            <a:pPr algn="ctr"/>
-            <a:r>
-              <a:rPr lang="fr-FR" dirty="0"/>
-              <a:t>Code dans le contrôleur : utilisation des objets modèles.</a:t>
+            <a:r>
+              <a:rPr lang="fr-FR" sz="2400" dirty="0"/>
+              <a:t>Le modèle : classe abstraite et classe héritée avec implémentation des méthodes</a:t>
             </a:r>
           </a:p>
         </p:txBody>
       </p:sp>
       <p:pic>
         <p:nvPicPr>
-          <p:cNvPr id="4" name="Image 3">
-            <a:extLst>
-              <a:ext uri="{FF2B5EF4-FFF2-40B4-BE49-F238E27FC236}">
-                <a16:creationId xmlns:a16="http://schemas.microsoft.com/office/drawing/2014/main" id="{F83C293E-4BE1-4A35-9366-9DBE3D1D1B3F}"/>
+          <p:cNvPr id="3" name="Image 2">
+            <a:extLst>
+              <a:ext uri="{FF2B5EF4-FFF2-40B4-BE49-F238E27FC236}">
+                <a16:creationId xmlns:a16="http://schemas.microsoft.com/office/drawing/2014/main" id="{C9DB6EF3-AB29-4068-AE77-E6C8D61EFE45}"/>
               </a:ext>
             </a:extLst>
           </p:cNvPr>
@@ -3489,8 +3489,8 @@
         </p:blipFill>
         <p:spPr>
           <a:xfrm>
-            <a:off x="0" y="369332"/>
-            <a:ext cx="5765180" cy="3225755"/>
+            <a:off x="0" y="890587"/>
+            <a:ext cx="5495925" cy="5324475"/>
           </a:xfrm>
           <a:prstGeom prst="rect">
             <a:avLst/>
@@ -3499,10 +3499,10 @@
       </p:pic>
       <p:pic>
         <p:nvPicPr>
-          <p:cNvPr id="6" name="Image 5">
-            <a:extLst>
-              <a:ext uri="{FF2B5EF4-FFF2-40B4-BE49-F238E27FC236}">
-                <a16:creationId xmlns:a16="http://schemas.microsoft.com/office/drawing/2014/main" id="{F89AC275-D40D-43B6-89F2-C6AC1FA5EFF9}"/>
+          <p:cNvPr id="7" name="Image 6">
+            <a:extLst>
+              <a:ext uri="{FF2B5EF4-FFF2-40B4-BE49-F238E27FC236}">
+                <a16:creationId xmlns:a16="http://schemas.microsoft.com/office/drawing/2014/main" id="{1FD5708B-E99C-4F6C-85F5-5477F2261A69}"/>
               </a:ext>
             </a:extLst>
           </p:cNvPr>
@@ -3519,8 +3519,38 @@
         </p:blipFill>
         <p:spPr>
           <a:xfrm>
-            <a:off x="0" y="3595087"/>
-            <a:ext cx="8298056" cy="3225755"/>
+            <a:off x="5495925" y="131584"/>
+            <a:ext cx="6048" cy="6858000"/>
+          </a:xfrm>
+          <a:prstGeom prst="rect">
+            <a:avLst/>
+          </a:prstGeom>
+        </p:spPr>
+      </p:pic>
+      <p:pic>
+        <p:nvPicPr>
+          <p:cNvPr id="9" name="Image 8">
+            <a:extLst>
+              <a:ext uri="{FF2B5EF4-FFF2-40B4-BE49-F238E27FC236}">
+                <a16:creationId xmlns:a16="http://schemas.microsoft.com/office/drawing/2014/main" id="{18538A7E-FA35-431F-B5E4-7E2F4B6E7841}"/>
+              </a:ext>
+            </a:extLst>
+          </p:cNvPr>
+          <p:cNvPicPr>
+            <a:picLocks noChangeAspect="1"/>
+          </p:cNvPicPr>
+          <p:nvPr/>
+        </p:nvPicPr>
+        <p:blipFill>
+          <a:blip r:embed="rId4"/>
+          <a:stretch>
+            <a:fillRect/>
+          </a:stretch>
+        </p:blipFill>
+        <p:spPr>
+          <a:xfrm>
+            <a:off x="6661454" y="1014412"/>
+            <a:ext cx="4318300" cy="5141839"/>
           </a:xfrm>
           <a:prstGeom prst="rect">
             <a:avLst/>
@@ -3530,7 +3560,7 @@
     </p:spTree>
     <p:extLst>
       <p:ext uri="{BB962C8B-B14F-4D97-AF65-F5344CB8AC3E}">
-        <p14:creationId xmlns:p14="http://schemas.microsoft.com/office/powerpoint/2010/main" val="2239271569"/>
+        <p14:creationId xmlns:p14="http://schemas.microsoft.com/office/powerpoint/2010/main" val="4233947543"/>
       </p:ext>
     </p:extLst>
   </p:cSld>
@@ -3557,12 +3587,48 @@
           <a:chExt cx="0" cy="0"/>
         </a:xfrm>
       </p:grpSpPr>
+      <p:sp>
+        <p:nvSpPr>
+          <p:cNvPr id="2" name="ZoneTexte 1">
+            <a:extLst>
+              <a:ext uri="{FF2B5EF4-FFF2-40B4-BE49-F238E27FC236}">
+                <a16:creationId xmlns:a16="http://schemas.microsoft.com/office/drawing/2014/main" id="{5318B654-42B3-43A3-A943-2FB7151BA169}"/>
+              </a:ext>
+            </a:extLst>
+          </p:cNvPr>
+          <p:cNvSpPr txBox="1"/>
+          <p:nvPr/>
+        </p:nvSpPr>
+        <p:spPr>
+          <a:xfrm>
+            <a:off x="0" y="0"/>
+            <a:ext cx="12192000" cy="369332"/>
+          </a:xfrm>
+          <a:prstGeom prst="rect">
+            <a:avLst/>
+          </a:prstGeom>
+          <a:noFill/>
+        </p:spPr>
+        <p:txBody>
+          <a:bodyPr wrap="square" rtlCol="0">
+            <a:spAutoFit/>
+          </a:bodyPr>
+          <a:lstStyle/>
+          <a:p>
+            <a:pPr algn="ctr"/>
+            <a:r>
+              <a:rPr lang="fr-FR" dirty="0"/>
+              <a:t>Code ajouté dans le contrôleur : utilisation des objets modèles</a:t>
+            </a:r>
+          </a:p>
+        </p:txBody>
+      </p:sp>
       <p:pic>
         <p:nvPicPr>
-          <p:cNvPr id="3" name="Image 2">
-            <a:extLst>
-              <a:ext uri="{FF2B5EF4-FFF2-40B4-BE49-F238E27FC236}">
-                <a16:creationId xmlns:a16="http://schemas.microsoft.com/office/drawing/2014/main" id="{73652085-D36E-4A42-8D1C-A96CBB7A39C9}"/>
+          <p:cNvPr id="8" name="Image 7">
+            <a:extLst>
+              <a:ext uri="{FF2B5EF4-FFF2-40B4-BE49-F238E27FC236}">
+                <a16:creationId xmlns:a16="http://schemas.microsoft.com/office/drawing/2014/main" id="{2A4985BD-9E18-4252-B468-6EA16DFD5564}"/>
               </a:ext>
             </a:extLst>
           </p:cNvPr>
@@ -3579,20 +3645,86 @@
         </p:blipFill>
         <p:spPr>
           <a:xfrm>
-            <a:off x="0" y="825190"/>
-            <a:ext cx="5947164" cy="5207620"/>
+            <a:off x="2462212" y="566737"/>
+            <a:ext cx="7267575" cy="5724525"/>
           </a:xfrm>
           <a:prstGeom prst="rect">
             <a:avLst/>
           </a:prstGeom>
         </p:spPr>
       </p:pic>
+    </p:spTree>
+    <p:extLst>
+      <p:ext uri="{BB962C8B-B14F-4D97-AF65-F5344CB8AC3E}">
+        <p14:creationId xmlns:p14="http://schemas.microsoft.com/office/powerpoint/2010/main" val="2239271569"/>
+      </p:ext>
+    </p:extLst>
+  </p:cSld>
+  <p:clrMapOvr>
+    <a:masterClrMapping/>
+  </p:clrMapOvr>
+</p:sld>
+</file>
+
+<file path=ppt/slides/slide12.xml><?xml version="1.0" encoding="utf-8"?>
+<p:sld xmlns:a="http://schemas.openxmlformats.org/drawingml/2006/main" xmlns:r="http://schemas.openxmlformats.org/officeDocument/2006/relationships" xmlns:p="http://schemas.openxmlformats.org/presentationml/2006/main">
+  <p:cSld>
+    <p:spTree>
+      <p:nvGrpSpPr>
+        <p:cNvPr id="1" name=""/>
+        <p:cNvGrpSpPr/>
+        <p:nvPr/>
+      </p:nvGrpSpPr>
+      <p:grpSpPr>
+        <a:xfrm>
+          <a:off x="0" y="0"/>
+          <a:ext cx="0" cy="0"/>
+          <a:chOff x="0" y="0"/>
+          <a:chExt cx="0" cy="0"/>
+        </a:xfrm>
+      </p:grpSpPr>
+      <p:sp>
+        <p:nvSpPr>
+          <p:cNvPr id="6" name="ZoneTexte 5">
+            <a:extLst>
+              <a:ext uri="{FF2B5EF4-FFF2-40B4-BE49-F238E27FC236}">
+                <a16:creationId xmlns:a16="http://schemas.microsoft.com/office/drawing/2014/main" id="{932DC154-1E7A-45C2-812D-DC0DA34522F0}"/>
+              </a:ext>
+            </a:extLst>
+          </p:cNvPr>
+          <p:cNvSpPr txBox="1"/>
+          <p:nvPr/>
+        </p:nvSpPr>
+        <p:spPr>
+          <a:xfrm>
+            <a:off x="0" y="122663"/>
+            <a:ext cx="4171950" cy="646331"/>
+          </a:xfrm>
+          <a:prstGeom prst="rect">
+            <a:avLst/>
+          </a:prstGeom>
+          <a:noFill/>
+        </p:spPr>
+        <p:txBody>
+          <a:bodyPr wrap="square" rtlCol="0">
+            <a:spAutoFit/>
+          </a:bodyPr>
+          <a:lstStyle/>
+          <a:p>
+            <a:pPr algn="ctr"/>
+            <a:r>
+              <a:rPr lang="fr-FR" dirty="0"/>
+              <a:t> DAO : implémentation de l’interface pour écrire les données dans le fichier :</a:t>
+            </a:r>
+          </a:p>
+        </p:txBody>
+      </p:sp>
       <p:pic>
         <p:nvPicPr>
-          <p:cNvPr id="5" name="Image 4">
-            <a:extLst>
-              <a:ext uri="{FF2B5EF4-FFF2-40B4-BE49-F238E27FC236}">
-                <a16:creationId xmlns:a16="http://schemas.microsoft.com/office/drawing/2014/main" id="{7B1E3D66-0B7E-4CF8-A348-924A4DCAB9F7}"/>
+          <p:cNvPr id="4" name="Image 3">
+            <a:extLst>
+              <a:ext uri="{FF2B5EF4-FFF2-40B4-BE49-F238E27FC236}">
+                <a16:creationId xmlns:a16="http://schemas.microsoft.com/office/drawing/2014/main" id="{41C262A0-511C-4F08-9AC4-5A9799C6DB61}"/>
               </a:ext>
             </a:extLst>
           </p:cNvPr>
@@ -3602,57 +3734,21 @@
           <p:nvPr/>
         </p:nvPicPr>
         <p:blipFill>
-          <a:blip r:embed="rId3"/>
+          <a:blip r:embed="rId2"/>
           <a:stretch>
             <a:fillRect/>
           </a:stretch>
         </p:blipFill>
         <p:spPr>
           <a:xfrm>
-            <a:off x="6047677" y="825190"/>
-            <a:ext cx="5947164" cy="4186904"/>
+            <a:off x="4975336" y="0"/>
+            <a:ext cx="6089431" cy="6858000"/>
           </a:xfrm>
           <a:prstGeom prst="rect">
             <a:avLst/>
           </a:prstGeom>
         </p:spPr>
       </p:pic>
-      <p:sp>
-        <p:nvSpPr>
-          <p:cNvPr id="6" name="ZoneTexte 5">
-            <a:extLst>
-              <a:ext uri="{FF2B5EF4-FFF2-40B4-BE49-F238E27FC236}">
-                <a16:creationId xmlns:a16="http://schemas.microsoft.com/office/drawing/2014/main" id="{932DC154-1E7A-45C2-812D-DC0DA34522F0}"/>
-              </a:ext>
-            </a:extLst>
-          </p:cNvPr>
-          <p:cNvSpPr txBox="1"/>
-          <p:nvPr/>
-        </p:nvSpPr>
-        <p:spPr>
-          <a:xfrm>
-            <a:off x="0" y="122663"/>
-            <a:ext cx="12191999" cy="369332"/>
-          </a:xfrm>
-          <a:prstGeom prst="rect">
-            <a:avLst/>
-          </a:prstGeom>
-          <a:noFill/>
-        </p:spPr>
-        <p:txBody>
-          <a:bodyPr wrap="square" rtlCol="0">
-            <a:spAutoFit/>
-          </a:bodyPr>
-          <a:lstStyle/>
-          <a:p>
-            <a:pPr algn="ctr"/>
-            <a:r>
-              <a:rPr lang="fr-FR" dirty="0"/>
-              <a:t> DAO : implémentation de l’interface pour écrire les données dans le fichier :</a:t>
-            </a:r>
-          </a:p>
-        </p:txBody>
-      </p:sp>
     </p:spTree>
     <p:extLst>
       <p:ext uri="{BB962C8B-B14F-4D97-AF65-F5344CB8AC3E}">
@@ -3666,7 +3762,7 @@
 </p:sld>
 </file>
 
-<file path=ppt/slides/slide12.xml><?xml version="1.0" encoding="utf-8"?>
+<file path=ppt/slides/slide13.xml><?xml version="1.0" encoding="utf-8"?>
 <p:sld xmlns:a="http://schemas.openxmlformats.org/drawingml/2006/main" xmlns:r="http://schemas.openxmlformats.org/officeDocument/2006/relationships" xmlns:p="http://schemas.openxmlformats.org/presentationml/2006/main">
   <p:cSld>
     <p:spTree>
@@ -5233,7 +5329,7 @@
         </p:blipFill>
         <p:spPr>
           <a:xfrm>
-            <a:off x="4843113" y="-36000"/>
+            <a:off x="5547187" y="-27001"/>
             <a:ext cx="7305" cy="6912000"/>
           </a:xfrm>
           <a:prstGeom prst="rect">
@@ -5241,12 +5337,102 @@
           </a:prstGeom>
         </p:spPr>
       </p:pic>
+      <p:sp>
+        <p:nvSpPr>
+          <p:cNvPr id="7" name="ZoneTexte 6">
+            <a:extLst>
+              <a:ext uri="{FF2B5EF4-FFF2-40B4-BE49-F238E27FC236}">
+                <a16:creationId xmlns:a16="http://schemas.microsoft.com/office/drawing/2014/main" id="{D80E86C4-7E62-4AFB-A9B8-EDABAF87EBF7}"/>
+              </a:ext>
+            </a:extLst>
+          </p:cNvPr>
+          <p:cNvSpPr txBox="1"/>
+          <p:nvPr/>
+        </p:nvSpPr>
+        <p:spPr>
+          <a:xfrm>
+            <a:off x="288" y="27000"/>
+            <a:ext cx="5660043" cy="1354217"/>
+          </a:xfrm>
+          <a:prstGeom prst="rect">
+            <a:avLst/>
+          </a:prstGeom>
+          <a:noFill/>
+        </p:spPr>
+        <p:txBody>
+          <a:bodyPr wrap="square">
+            <a:spAutoFit/>
+          </a:bodyPr>
+          <a:lstStyle/>
+          <a:p>
+            <a:pPr>
+              <a:spcAft>
+                <a:spcPts val="600"/>
+              </a:spcAft>
+            </a:pPr>
+            <a:r>
+              <a:rPr lang="fr-FR" dirty="0"/>
+              <a:t>Le contrôleur (</a:t>
+            </a:r>
+            <a:r>
+              <a:rPr lang="fr-FR" dirty="0" err="1"/>
+              <a:t>AnalitycsController</a:t>
+            </a:r>
+            <a:r>
+              <a:rPr lang="fr-FR" dirty="0"/>
+              <a:t>) :</a:t>
+            </a:r>
+          </a:p>
+          <a:p>
+            <a:pPr marL="285750" indent="-285750">
+              <a:spcAft>
+                <a:spcPts val="300"/>
+              </a:spcAft>
+              <a:buFont typeface="Wingdings" panose="05000000000000000000" pitchFamily="2" charset="2"/>
+              <a:buChar char="Ø"/>
+            </a:pPr>
+            <a:r>
+              <a:rPr lang="fr-FR" dirty="0"/>
+              <a:t>contiendra la logique de contrôle</a:t>
+            </a:r>
+          </a:p>
+          <a:p>
+            <a:pPr marL="285750" indent="-285750">
+              <a:spcAft>
+                <a:spcPts val="300"/>
+              </a:spcAft>
+              <a:buFont typeface="Wingdings" panose="05000000000000000000" pitchFamily="2" charset="2"/>
+              <a:buChar char="Ø"/>
+            </a:pPr>
+            <a:r>
+              <a:rPr lang="fr-FR" dirty="0"/>
+              <a:t>singleton : une seule instance afin d’éviter plusieurs </a:t>
+            </a:r>
+            <a:r>
+              <a:rPr lang="fr-FR" dirty="0" err="1"/>
+              <a:t>reader</a:t>
+            </a:r>
+            <a:r>
+              <a:rPr lang="fr-FR" dirty="0"/>
+              <a:t>/</a:t>
+            </a:r>
+            <a:r>
+              <a:rPr lang="fr-FR" dirty="0" err="1"/>
+              <a:t>writer</a:t>
+            </a:r>
+            <a:r>
+              <a:rPr lang="fr-FR" dirty="0"/>
+              <a:t> sur le même fichier</a:t>
+            </a:r>
+          </a:p>
+        </p:txBody>
+      </p:sp>
       <p:pic>
         <p:nvPicPr>
-          <p:cNvPr id="8" name="Image 7">
-            <a:extLst>
-              <a:ext uri="{FF2B5EF4-FFF2-40B4-BE49-F238E27FC236}">
-                <a16:creationId xmlns:a16="http://schemas.microsoft.com/office/drawing/2014/main" id="{20FE2D40-5BD1-4762-BE01-614A4D06B5B6}"/>
+          <p:cNvPr id="16" name="Image 15">
+            <a:extLst>
+              <a:ext uri="{FF2B5EF4-FFF2-40B4-BE49-F238E27FC236}">
+                <a16:creationId xmlns:a16="http://schemas.microsoft.com/office/drawing/2014/main" id="{452441C5-7247-41B4-BEC8-065992C21D58}"/>
               </a:ext>
             </a:extLst>
           </p:cNvPr>
@@ -5263,8 +5449,8 @@
         </p:blipFill>
         <p:spPr>
           <a:xfrm>
-            <a:off x="0" y="1525836"/>
-            <a:ext cx="4823864" cy="5332164"/>
+            <a:off x="-4126" y="1381217"/>
+            <a:ext cx="5476875" cy="5010150"/>
           </a:xfrm>
           <a:prstGeom prst="rect">
             <a:avLst/>
@@ -5273,10 +5459,10 @@
       </p:pic>
       <p:pic>
         <p:nvPicPr>
-          <p:cNvPr id="12" name="Image 11">
-            <a:extLst>
-              <a:ext uri="{FF2B5EF4-FFF2-40B4-BE49-F238E27FC236}">
-                <a16:creationId xmlns:a16="http://schemas.microsoft.com/office/drawing/2014/main" id="{4B8AD7C5-569D-419A-BC1A-B8A83C21E79D}"/>
+          <p:cNvPr id="24" name="Image 23">
+            <a:extLst>
+              <a:ext uri="{FF2B5EF4-FFF2-40B4-BE49-F238E27FC236}">
+                <a16:creationId xmlns:a16="http://schemas.microsoft.com/office/drawing/2014/main" id="{03BEB98F-D187-4A63-8229-4128CB8AD57F}"/>
               </a:ext>
             </a:extLst>
           </p:cNvPr>
@@ -5293,134 +5479,14 @@
         </p:blipFill>
         <p:spPr>
           <a:xfrm>
-            <a:off x="7565231" y="4610743"/>
-            <a:ext cx="1465602" cy="2247257"/>
+            <a:off x="5628930" y="385762"/>
+            <a:ext cx="6429375" cy="5876925"/>
           </a:xfrm>
           <a:prstGeom prst="rect">
             <a:avLst/>
           </a:prstGeom>
         </p:spPr>
       </p:pic>
-      <p:pic>
-        <p:nvPicPr>
-          <p:cNvPr id="14" name="Image 13">
-            <a:extLst>
-              <a:ext uri="{FF2B5EF4-FFF2-40B4-BE49-F238E27FC236}">
-                <a16:creationId xmlns:a16="http://schemas.microsoft.com/office/drawing/2014/main" id="{BE78B581-5010-47FA-AF71-6C30E1A4CF14}"/>
-              </a:ext>
-            </a:extLst>
-          </p:cNvPr>
-          <p:cNvPicPr>
-            <a:picLocks noChangeAspect="1"/>
-          </p:cNvPicPr>
-          <p:nvPr/>
-        </p:nvPicPr>
-        <p:blipFill>
-          <a:blip r:embed="rId5"/>
-          <a:stretch>
-            <a:fillRect/>
-          </a:stretch>
-        </p:blipFill>
-        <p:spPr>
-          <a:xfrm>
-            <a:off x="4869667" y="0"/>
-            <a:ext cx="7411484" cy="4610743"/>
-          </a:xfrm>
-          <a:prstGeom prst="rect">
-            <a:avLst/>
-          </a:prstGeom>
-        </p:spPr>
-      </p:pic>
-      <p:sp>
-        <p:nvSpPr>
-          <p:cNvPr id="7" name="ZoneTexte 6">
-            <a:extLst>
-              <a:ext uri="{FF2B5EF4-FFF2-40B4-BE49-F238E27FC236}">
-                <a16:creationId xmlns:a16="http://schemas.microsoft.com/office/drawing/2014/main" id="{D80E86C4-7E62-4AFB-A9B8-EDABAF87EBF7}"/>
-              </a:ext>
-            </a:extLst>
-          </p:cNvPr>
-          <p:cNvSpPr txBox="1"/>
-          <p:nvPr/>
-        </p:nvSpPr>
-        <p:spPr>
-          <a:xfrm>
-            <a:off x="-4125" y="0"/>
-            <a:ext cx="4847238" cy="1354217"/>
-          </a:xfrm>
-          <a:prstGeom prst="rect">
-            <a:avLst/>
-          </a:prstGeom>
-          <a:noFill/>
-        </p:spPr>
-        <p:txBody>
-          <a:bodyPr wrap="square">
-            <a:spAutoFit/>
-          </a:bodyPr>
-          <a:lstStyle/>
-          <a:p>
-            <a:pPr>
-              <a:spcAft>
-                <a:spcPts val="600"/>
-              </a:spcAft>
-            </a:pPr>
-            <a:r>
-              <a:rPr lang="fr-FR" dirty="0"/>
-              <a:t>Le contrôleur (</a:t>
-            </a:r>
-            <a:r>
-              <a:rPr lang="fr-FR" dirty="0" err="1"/>
-              <a:t>AnalitycsController</a:t>
-            </a:r>
-            <a:r>
-              <a:rPr lang="fr-FR" dirty="0"/>
-              <a:t>) :</a:t>
-            </a:r>
-          </a:p>
-          <a:p>
-            <a:pPr marL="285750" indent="-285750">
-              <a:spcAft>
-                <a:spcPts val="600"/>
-              </a:spcAft>
-              <a:buFont typeface="Wingdings" panose="05000000000000000000" pitchFamily="2" charset="2"/>
-              <a:buChar char="Ø"/>
-            </a:pPr>
-            <a:r>
-              <a:rPr lang="fr-FR" dirty="0"/>
-              <a:t>contiendra la logique de contrôle</a:t>
-            </a:r>
-          </a:p>
-          <a:p>
-            <a:pPr marL="285750" indent="-285750">
-              <a:spcAft>
-                <a:spcPts val="600"/>
-              </a:spcAft>
-              <a:buFont typeface="Wingdings" panose="05000000000000000000" pitchFamily="2" charset="2"/>
-              <a:buChar char="Ø"/>
-            </a:pPr>
-            <a:r>
-              <a:rPr lang="fr-FR" dirty="0"/>
-              <a:t>singleton : une seule instance afin d’éviter plusieurs </a:t>
-            </a:r>
-            <a:r>
-              <a:rPr lang="fr-FR" dirty="0" err="1"/>
-              <a:t>reader</a:t>
-            </a:r>
-            <a:r>
-              <a:rPr lang="fr-FR" dirty="0"/>
-              <a:t>/</a:t>
-            </a:r>
-            <a:r>
-              <a:rPr lang="fr-FR" dirty="0" err="1"/>
-              <a:t>writer</a:t>
-            </a:r>
-            <a:r>
-              <a:rPr lang="fr-FR" dirty="0"/>
-              <a:t> sur le même fichier</a:t>
-            </a:r>
-          </a:p>
-        </p:txBody>
-      </p:sp>
     </p:spTree>
     <p:extLst>
       <p:ext uri="{BB962C8B-B14F-4D97-AF65-F5344CB8AC3E}">
@@ -5451,12 +5517,63 @@
           <a:chExt cx="0" cy="0"/>
         </a:xfrm>
       </p:grpSpPr>
+      <p:sp>
+        <p:nvSpPr>
+          <p:cNvPr id="6" name="ZoneTexte 5">
+            <a:extLst>
+              <a:ext uri="{FF2B5EF4-FFF2-40B4-BE49-F238E27FC236}">
+                <a16:creationId xmlns:a16="http://schemas.microsoft.com/office/drawing/2014/main" id="{5ECDF928-E529-4DEF-9744-6B547C3200BB}"/>
+              </a:ext>
+            </a:extLst>
+          </p:cNvPr>
+          <p:cNvSpPr txBox="1"/>
+          <p:nvPr/>
+        </p:nvSpPr>
+        <p:spPr>
+          <a:xfrm>
+            <a:off x="-1905" y="0"/>
+            <a:ext cx="6892197" cy="646331"/>
+          </a:xfrm>
+          <a:prstGeom prst="rect">
+            <a:avLst/>
+          </a:prstGeom>
+          <a:noFill/>
+        </p:spPr>
+        <p:txBody>
+          <a:bodyPr wrap="square">
+            <a:spAutoFit/>
+          </a:bodyPr>
+          <a:lstStyle/>
+          <a:p>
+            <a:r>
+              <a:rPr lang="fr-FR" dirty="0"/>
+              <a:t>DAO : interface (</a:t>
+            </a:r>
+            <a:r>
+              <a:rPr lang="fr-FR" dirty="0" err="1"/>
+              <a:t>ISymptomIO</a:t>
+            </a:r>
+            <a:r>
+              <a:rPr lang="fr-FR" dirty="0"/>
+              <a:t>) et implémentation (</a:t>
+            </a:r>
+            <a:r>
+              <a:rPr lang="fr-FR" dirty="0" err="1"/>
+              <a:t>SymptomReadDataFromFile</a:t>
+            </a:r>
+            <a:r>
+              <a:rPr lang="fr-FR" dirty="0"/>
+              <a:t>) :</a:t>
+            </a:r>
+          </a:p>
+        </p:txBody>
+      </p:sp>
       <p:pic>
         <p:nvPicPr>
-          <p:cNvPr id="3" name="Image 2">
-            <a:extLst>
-              <a:ext uri="{FF2B5EF4-FFF2-40B4-BE49-F238E27FC236}">
-                <a16:creationId xmlns:a16="http://schemas.microsoft.com/office/drawing/2014/main" id="{9B30A8D6-0F83-4472-AC51-386C70876241}"/>
+          <p:cNvPr id="7" name="Image 6">
+            <a:extLst>
+              <a:ext uri="{FF2B5EF4-FFF2-40B4-BE49-F238E27FC236}">
+                <a16:creationId xmlns:a16="http://schemas.microsoft.com/office/drawing/2014/main" id="{B328AAE6-05A7-42CA-BFF1-F26C64BF160D}"/>
               </a:ext>
             </a:extLst>
           </p:cNvPr>
@@ -5473,8 +5590,8 @@
         </p:blipFill>
         <p:spPr>
           <a:xfrm>
-            <a:off x="0" y="674867"/>
-            <a:ext cx="4999642" cy="6183133"/>
+            <a:off x="6417945" y="0"/>
+            <a:ext cx="7305" cy="6912000"/>
           </a:xfrm>
           <a:prstGeom prst="rect">
             <a:avLst/>
@@ -5483,10 +5600,10 @@
       </p:pic>
       <p:pic>
         <p:nvPicPr>
-          <p:cNvPr id="5" name="Image 4">
-            <a:extLst>
-              <a:ext uri="{FF2B5EF4-FFF2-40B4-BE49-F238E27FC236}">
-                <a16:creationId xmlns:a16="http://schemas.microsoft.com/office/drawing/2014/main" id="{2279C8BA-74F6-4469-AF2B-1AB9DD8AC092}"/>
+          <p:cNvPr id="4" name="Image 3">
+            <a:extLst>
+              <a:ext uri="{FF2B5EF4-FFF2-40B4-BE49-F238E27FC236}">
+                <a16:creationId xmlns:a16="http://schemas.microsoft.com/office/drawing/2014/main" id="{E3736ACE-DD1F-4D23-B7C5-5790032C101F}"/>
               </a:ext>
             </a:extLst>
           </p:cNvPr>
@@ -5503,71 +5620,20 @@
         </p:blipFill>
         <p:spPr>
           <a:xfrm>
-            <a:off x="7192359" y="0"/>
-            <a:ext cx="4858078" cy="6858000"/>
+            <a:off x="-1905" y="1065431"/>
+            <a:ext cx="6419850" cy="4352925"/>
           </a:xfrm>
           <a:prstGeom prst="rect">
             <a:avLst/>
           </a:prstGeom>
         </p:spPr>
       </p:pic>
-      <p:sp>
-        <p:nvSpPr>
-          <p:cNvPr id="6" name="ZoneTexte 5">
-            <a:extLst>
-              <a:ext uri="{FF2B5EF4-FFF2-40B4-BE49-F238E27FC236}">
-                <a16:creationId xmlns:a16="http://schemas.microsoft.com/office/drawing/2014/main" id="{5ECDF928-E529-4DEF-9744-6B547C3200BB}"/>
-              </a:ext>
-            </a:extLst>
-          </p:cNvPr>
-          <p:cNvSpPr txBox="1"/>
-          <p:nvPr/>
-        </p:nvSpPr>
-        <p:spPr>
-          <a:xfrm>
-            <a:off x="-1905" y="0"/>
-            <a:ext cx="6892197" cy="646331"/>
-          </a:xfrm>
-          <a:prstGeom prst="rect">
-            <a:avLst/>
-          </a:prstGeom>
-          <a:noFill/>
-        </p:spPr>
-        <p:txBody>
-          <a:bodyPr wrap="square">
-            <a:spAutoFit/>
-          </a:bodyPr>
-          <a:lstStyle/>
-          <a:p>
-            <a:r>
-              <a:rPr lang="fr-FR" dirty="0"/>
-              <a:t>DAO : interface (</a:t>
-            </a:r>
-            <a:r>
-              <a:rPr lang="fr-FR" dirty="0" err="1"/>
-              <a:t>ISymptomIO</a:t>
-            </a:r>
-            <a:r>
-              <a:rPr lang="fr-FR" dirty="0"/>
-              <a:t>) et implémentation (</a:t>
-            </a:r>
-            <a:r>
-              <a:rPr lang="fr-FR" dirty="0" err="1"/>
-              <a:t>SymptomReadDataFromFile</a:t>
-            </a:r>
-            <a:r>
-              <a:rPr lang="fr-FR" dirty="0"/>
-              <a:t>) :</a:t>
-            </a:r>
-          </a:p>
-        </p:txBody>
-      </p:sp>
       <p:pic>
         <p:nvPicPr>
-          <p:cNvPr id="7" name="Image 6">
-            <a:extLst>
-              <a:ext uri="{FF2B5EF4-FFF2-40B4-BE49-F238E27FC236}">
-                <a16:creationId xmlns:a16="http://schemas.microsoft.com/office/drawing/2014/main" id="{B328AAE6-05A7-42CA-BFF1-F26C64BF160D}"/>
+          <p:cNvPr id="11" name="Image 10">
+            <a:extLst>
+              <a:ext uri="{FF2B5EF4-FFF2-40B4-BE49-F238E27FC236}">
+                <a16:creationId xmlns:a16="http://schemas.microsoft.com/office/drawing/2014/main" id="{70FCACCA-1E12-4887-8012-74281607E070}"/>
               </a:ext>
             </a:extLst>
           </p:cNvPr>
@@ -5584,8 +5650,8 @@
         </p:blipFill>
         <p:spPr>
           <a:xfrm>
-            <a:off x="7037673" y="-27000"/>
-            <a:ext cx="7305" cy="6912000"/>
+            <a:off x="6425250" y="0"/>
+            <a:ext cx="5871823" cy="6858000"/>
           </a:xfrm>
           <a:prstGeom prst="rect">
             <a:avLst/>
@@ -5622,12 +5688,42 @@
           <a:chExt cx="0" cy="0"/>
         </a:xfrm>
       </p:grpSpPr>
+      <p:pic>
+        <p:nvPicPr>
+          <p:cNvPr id="3" name="Image 2">
+            <a:extLst>
+              <a:ext uri="{FF2B5EF4-FFF2-40B4-BE49-F238E27FC236}">
+                <a16:creationId xmlns:a16="http://schemas.microsoft.com/office/drawing/2014/main" id="{03499102-AB2A-4461-8160-752DA326B029}"/>
+              </a:ext>
+            </a:extLst>
+          </p:cNvPr>
+          <p:cNvPicPr>
+            <a:picLocks noChangeAspect="1"/>
+          </p:cNvPicPr>
+          <p:nvPr/>
+        </p:nvPicPr>
+        <p:blipFill>
+          <a:blip r:embed="rId2"/>
+          <a:stretch>
+            <a:fillRect/>
+          </a:stretch>
+        </p:blipFill>
+        <p:spPr>
+          <a:xfrm>
+            <a:off x="4953000" y="1671637"/>
+            <a:ext cx="2286000" cy="3514725"/>
+          </a:xfrm>
+          <a:prstGeom prst="rect">
+            <a:avLst/>
+          </a:prstGeom>
+        </p:spPr>
+      </p:pic>
       <p:sp>
         <p:nvSpPr>
           <p:cNvPr id="4" name="ZoneTexte 3">
             <a:extLst>
               <a:ext uri="{FF2B5EF4-FFF2-40B4-BE49-F238E27FC236}">
-                <a16:creationId xmlns:a16="http://schemas.microsoft.com/office/drawing/2014/main" id="{9570EB15-1DD7-4671-8AAE-6805F6685D74}"/>
+                <a16:creationId xmlns:a16="http://schemas.microsoft.com/office/drawing/2014/main" id="{7D540A37-43FA-4668-BA61-F1A2AA0A48BB}"/>
               </a:ext>
             </a:extLst>
           </p:cNvPr>
@@ -5636,8 +5732,8 @@
         </p:nvSpPr>
         <p:spPr>
           <a:xfrm>
-            <a:off x="527220" y="173959"/>
-            <a:ext cx="11165669" cy="1354217"/>
+            <a:off x="4953000" y="409575"/>
+            <a:ext cx="1349216" cy="461665"/>
           </a:xfrm>
           <a:prstGeom prst="rect">
             <a:avLst/>
@@ -5645,86 +5741,14 @@
           <a:noFill/>
         </p:spPr>
         <p:txBody>
-          <a:bodyPr wrap="square" rtlCol="0">
+          <a:bodyPr wrap="none" rtlCol="0">
             <a:spAutoFit/>
           </a:bodyPr>
           <a:lstStyle/>
           <a:p>
-            <a:pPr algn="ctr"/>
-            <a:r>
-              <a:rPr lang="fr-FR" sz="3200" dirty="0"/>
-              <a:t>2ème itération : écrire le fichier result.out par ordre alphabétique des symptômes avec leurs occurrences</a:t>
-            </a:r>
-          </a:p>
-          <a:p>
-            <a:endParaRPr lang="fr-FR" dirty="0"/>
-          </a:p>
-        </p:txBody>
-      </p:sp>
-      <p:sp>
-        <p:nvSpPr>
-          <p:cNvPr id="5" name="ZoneTexte 4">
-            <a:extLst>
-              <a:ext uri="{FF2B5EF4-FFF2-40B4-BE49-F238E27FC236}">
-                <a16:creationId xmlns:a16="http://schemas.microsoft.com/office/drawing/2014/main" id="{B578FD59-F066-4008-BF6B-A46AEFBAEFC7}"/>
-              </a:ext>
-            </a:extLst>
-          </p:cNvPr>
-          <p:cNvSpPr txBox="1"/>
-          <p:nvPr/>
-        </p:nvSpPr>
-        <p:spPr>
-          <a:xfrm>
-            <a:off x="527219" y="2200414"/>
-            <a:ext cx="11165669" cy="2908489"/>
-          </a:xfrm>
-          <a:prstGeom prst="rect">
-            <a:avLst/>
-          </a:prstGeom>
-          <a:noFill/>
-        </p:spPr>
-        <p:txBody>
-          <a:bodyPr wrap="square" rtlCol="0">
-            <a:spAutoFit/>
-          </a:bodyPr>
-          <a:lstStyle/>
-          <a:p>
-            <a:pPr>
-              <a:spcAft>
-                <a:spcPts val="600"/>
-              </a:spcAft>
-            </a:pPr>
             <a:r>
               <a:rPr lang="fr-FR" sz="2400" dirty="0"/>
-              <a:t>Le modèle en classe abstraite (Occurrence) permet de répondre à l’exigence de réemployabilité du code : un objet instancié par symptôme.</a:t>
-            </a:r>
-          </a:p>
-          <a:p>
-            <a:pPr>
-              <a:spcAft>
-                <a:spcPts val="600"/>
-              </a:spcAft>
-            </a:pPr>
-            <a:r>
-              <a:rPr lang="fr-FR" sz="2400" dirty="0"/>
-              <a:t>Les champs décrivent les caractéristiques de l’objet (nom et nombre d’occurrence) et les méthodes les actions sur les caractéristiques de l’objet (lecture et modification selon la logique métier).</a:t>
-            </a:r>
-          </a:p>
-          <a:p>
-            <a:pPr>
-              <a:spcAft>
-                <a:spcPts val="600"/>
-              </a:spcAft>
-            </a:pPr>
-            <a:r>
-              <a:rPr lang="fr-FR" sz="2400" dirty="0"/>
-              <a:t>Le constructeur permet d’initialiser les champs (nom transmis).</a:t>
-            </a:r>
-          </a:p>
-          <a:p>
-            <a:r>
-              <a:rPr lang="fr-FR" sz="2400" dirty="0"/>
-              <a:t>Cf. diapo suivante</a:t>
+              <a:t>Résultat :</a:t>
             </a:r>
           </a:p>
         </p:txBody>
@@ -5732,7 +5756,7 @@
     </p:spTree>
     <p:extLst>
       <p:ext uri="{BB962C8B-B14F-4D97-AF65-F5344CB8AC3E}">
-        <p14:creationId xmlns:p14="http://schemas.microsoft.com/office/powerpoint/2010/main" val="1554430861"/>
+        <p14:creationId xmlns:p14="http://schemas.microsoft.com/office/powerpoint/2010/main" val="1672985944"/>
       </p:ext>
     </p:extLst>
   </p:cSld>
@@ -5759,82 +5783,22 @@
           <a:chExt cx="0" cy="0"/>
         </a:xfrm>
       </p:grpSpPr>
-      <p:pic>
-        <p:nvPicPr>
-          <p:cNvPr id="4" name="Image 3">
-            <a:extLst>
-              <a:ext uri="{FF2B5EF4-FFF2-40B4-BE49-F238E27FC236}">
-                <a16:creationId xmlns:a16="http://schemas.microsoft.com/office/drawing/2014/main" id="{70B58316-7AB4-47BF-881B-DC55BA8AD599}"/>
-              </a:ext>
-            </a:extLst>
-          </p:cNvPr>
-          <p:cNvPicPr>
-            <a:picLocks noChangeAspect="1"/>
-          </p:cNvPicPr>
+      <p:sp>
+        <p:nvSpPr>
+          <p:cNvPr id="4" name="ZoneTexte 3">
+            <a:extLst>
+              <a:ext uri="{FF2B5EF4-FFF2-40B4-BE49-F238E27FC236}">
+                <a16:creationId xmlns:a16="http://schemas.microsoft.com/office/drawing/2014/main" id="{9570EB15-1DD7-4671-8AAE-6805F6685D74}"/>
+              </a:ext>
+            </a:extLst>
+          </p:cNvPr>
+          <p:cNvSpPr txBox="1"/>
           <p:nvPr/>
-        </p:nvPicPr>
-        <p:blipFill>
-          <a:blip r:embed="rId2"/>
-          <a:stretch>
-            <a:fillRect/>
-          </a:stretch>
-        </p:blipFill>
+        </p:nvSpPr>
         <p:spPr>
           <a:xfrm>
-            <a:off x="0" y="684689"/>
-            <a:ext cx="6096000" cy="6181709"/>
-          </a:xfrm>
-          <a:prstGeom prst="rect">
-            <a:avLst/>
-          </a:prstGeom>
-        </p:spPr>
-      </p:pic>
-      <p:pic>
-        <p:nvPicPr>
-          <p:cNvPr id="6" name="Image 5">
-            <a:extLst>
-              <a:ext uri="{FF2B5EF4-FFF2-40B4-BE49-F238E27FC236}">
-                <a16:creationId xmlns:a16="http://schemas.microsoft.com/office/drawing/2014/main" id="{BC67C041-B608-4C00-9301-4DF503CE1503}"/>
-              </a:ext>
-            </a:extLst>
-          </p:cNvPr>
-          <p:cNvPicPr>
-            <a:picLocks noChangeAspect="1"/>
-          </p:cNvPicPr>
-          <p:nvPr/>
-        </p:nvPicPr>
-        <p:blipFill>
-          <a:blip r:embed="rId3"/>
-          <a:stretch>
-            <a:fillRect/>
-          </a:stretch>
-        </p:blipFill>
-        <p:spPr>
-          <a:xfrm>
-            <a:off x="7153958" y="684689"/>
-            <a:ext cx="5038042" cy="6140114"/>
-          </a:xfrm>
-          <a:prstGeom prst="rect">
-            <a:avLst/>
-          </a:prstGeom>
-        </p:spPr>
-      </p:pic>
-      <p:sp>
-        <p:nvSpPr>
-          <p:cNvPr id="5" name="ZoneTexte 4">
-            <a:extLst>
-              <a:ext uri="{FF2B5EF4-FFF2-40B4-BE49-F238E27FC236}">
-                <a16:creationId xmlns:a16="http://schemas.microsoft.com/office/drawing/2014/main" id="{FE8D7701-A565-4296-B432-8C57B9AA8FDB}"/>
-              </a:ext>
-            </a:extLst>
-          </p:cNvPr>
-          <p:cNvSpPr txBox="1"/>
-          <p:nvPr/>
-        </p:nvSpPr>
-        <p:spPr>
-          <a:xfrm>
-            <a:off x="968859" y="131584"/>
-            <a:ext cx="10254282" cy="461665"/>
+            <a:off x="527220" y="173959"/>
+            <a:ext cx="11165669" cy="1354217"/>
           </a:xfrm>
           <a:prstGeom prst="rect">
             <a:avLst/>
@@ -5842,14 +5806,86 @@
           <a:noFill/>
         </p:spPr>
         <p:txBody>
-          <a:bodyPr wrap="none" rtlCol="0">
+          <a:bodyPr wrap="square" rtlCol="0">
             <a:spAutoFit/>
           </a:bodyPr>
           <a:lstStyle/>
           <a:p>
+            <a:pPr algn="ctr"/>
+            <a:r>
+              <a:rPr lang="fr-FR" sz="3200" dirty="0"/>
+              <a:t>2ème itération : écrire le fichier result.out par ordre alphabétique des symptômes avec leurs occurrences</a:t>
+            </a:r>
+          </a:p>
+          <a:p>
+            <a:endParaRPr lang="fr-FR" dirty="0"/>
+          </a:p>
+        </p:txBody>
+      </p:sp>
+      <p:sp>
+        <p:nvSpPr>
+          <p:cNvPr id="5" name="ZoneTexte 4">
+            <a:extLst>
+              <a:ext uri="{FF2B5EF4-FFF2-40B4-BE49-F238E27FC236}">
+                <a16:creationId xmlns:a16="http://schemas.microsoft.com/office/drawing/2014/main" id="{B578FD59-F066-4008-BF6B-A46AEFBAEFC7}"/>
+              </a:ext>
+            </a:extLst>
+          </p:cNvPr>
+          <p:cNvSpPr txBox="1"/>
+          <p:nvPr/>
+        </p:nvSpPr>
+        <p:spPr>
+          <a:xfrm>
+            <a:off x="527219" y="2200414"/>
+            <a:ext cx="11165669" cy="2908489"/>
+          </a:xfrm>
+          <a:prstGeom prst="rect">
+            <a:avLst/>
+          </a:prstGeom>
+          <a:noFill/>
+        </p:spPr>
+        <p:txBody>
+          <a:bodyPr wrap="square" rtlCol="0">
+            <a:spAutoFit/>
+          </a:bodyPr>
+          <a:lstStyle/>
+          <a:p>
+            <a:pPr>
+              <a:spcAft>
+                <a:spcPts val="600"/>
+              </a:spcAft>
+            </a:pPr>
             <a:r>
               <a:rPr lang="fr-FR" sz="2400" dirty="0"/>
-              <a:t>Le modèle : classe abstraite et classe héritée avec implémentation des méthodes</a:t>
+              <a:t>Le modèle en classe abstraite (Occurrence) permet de répondre à l’exigence de réemployabilité du code : un objet instancié par symptôme.</a:t>
+            </a:r>
+          </a:p>
+          <a:p>
+            <a:pPr>
+              <a:spcAft>
+                <a:spcPts val="600"/>
+              </a:spcAft>
+            </a:pPr>
+            <a:r>
+              <a:rPr lang="fr-FR" sz="2400" dirty="0"/>
+              <a:t>Les champs décrivent les caractéristiques de l’objet (nom et nombre d’occurrence) et les méthodes les actions sur les caractéristiques de l’objet (lecture et modification selon la logique métier).</a:t>
+            </a:r>
+          </a:p>
+          <a:p>
+            <a:pPr>
+              <a:spcAft>
+                <a:spcPts val="600"/>
+              </a:spcAft>
+            </a:pPr>
+            <a:r>
+              <a:rPr lang="fr-FR" sz="2400" dirty="0"/>
+              <a:t>Le constructeur permet d’initialiser les champs (nom transmis).</a:t>
+            </a:r>
+          </a:p>
+          <a:p>
+            <a:r>
+              <a:rPr lang="fr-FR" sz="2400" dirty="0"/>
+              <a:t>Cf. diapo suivante</a:t>
             </a:r>
           </a:p>
         </p:txBody>
@@ -5857,7 +5893,7 @@
     </p:spTree>
     <p:extLst>
       <p:ext uri="{BB962C8B-B14F-4D97-AF65-F5344CB8AC3E}">
-        <p14:creationId xmlns:p14="http://schemas.microsoft.com/office/powerpoint/2010/main" val="4233947543"/>
+        <p14:creationId xmlns:p14="http://schemas.microsoft.com/office/powerpoint/2010/main" val="1554430861"/>
       </p:ext>
     </p:extLst>
   </p:cSld>

</xml_diff>